<commit_message>
Improved engine part of presentation
</commit_message>
<xml_diff>
--- a/04-PresentationThirdPhase.pptx
+++ b/04-PresentationThirdPhase.pptx
@@ -5,7 +5,7 @@
     <p:sldMasterId id="2147483660" r:id="rId4"/>
   </p:sldMasterIdLst>
   <p:notesMasterIdLst>
-    <p:notesMasterId r:id="rId19"/>
+    <p:notesMasterId r:id="rId21"/>
   </p:notesMasterIdLst>
   <p:sldIdLst>
     <p:sldId id="265" r:id="rId5"/>
@@ -13,15 +13,17 @@
     <p:sldId id="310" r:id="rId7"/>
     <p:sldId id="323" r:id="rId8"/>
     <p:sldId id="311" r:id="rId9"/>
-    <p:sldId id="312" r:id="rId10"/>
-    <p:sldId id="319" r:id="rId11"/>
-    <p:sldId id="313" r:id="rId12"/>
-    <p:sldId id="320" r:id="rId13"/>
-    <p:sldId id="314" r:id="rId14"/>
-    <p:sldId id="317" r:id="rId15"/>
-    <p:sldId id="318" r:id="rId16"/>
-    <p:sldId id="322" r:id="rId17"/>
-    <p:sldId id="324" r:id="rId18"/>
+    <p:sldId id="325" r:id="rId10"/>
+    <p:sldId id="326" r:id="rId11"/>
+    <p:sldId id="312" r:id="rId12"/>
+    <p:sldId id="319" r:id="rId13"/>
+    <p:sldId id="313" r:id="rId14"/>
+    <p:sldId id="320" r:id="rId15"/>
+    <p:sldId id="314" r:id="rId16"/>
+    <p:sldId id="317" r:id="rId17"/>
+    <p:sldId id="318" r:id="rId18"/>
+    <p:sldId id="322" r:id="rId19"/>
+    <p:sldId id="324" r:id="rId20"/>
   </p:sldIdLst>
   <p:sldSz cx="12192000" cy="6858000"/>
   <p:notesSz cx="6858000" cy="9144000"/>
@@ -213,7 +215,7 @@
           <a:p>
             <a:fld id="{05052211-91C2-4B5D-9566-2C0C10015937}" type="datetimeFigureOut">
               <a:rPr lang="nl-NL" smtClean="0"/>
-              <a:t>18-6-2020</a:t>
+              <a:t>19-6-2020</a:t>
             </a:fld>
             <a:endParaRPr lang="nl-NL"/>
           </a:p>
@@ -741,7 +743,7 @@
           <a:p>
             <a:fld id="{F917F88C-BACD-4A94-B7B7-C91B49D4CB7C}" type="slidenum">
               <a:rPr lang="nl-NL" smtClean="0"/>
-              <a:t>10</a:t>
+              <a:t>12</a:t>
             </a:fld>
             <a:endParaRPr lang="nl-NL"/>
           </a:p>
@@ -834,7 +836,7 @@
           <a:p>
             <a:fld id="{F917F88C-BACD-4A94-B7B7-C91B49D4CB7C}" type="slidenum">
               <a:rPr lang="nl-NL" smtClean="0"/>
-              <a:t>11</a:t>
+              <a:t>13</a:t>
             </a:fld>
             <a:endParaRPr lang="nl-NL"/>
           </a:p>
@@ -921,7 +923,7 @@
           <a:p>
             <a:fld id="{F917F88C-BACD-4A94-B7B7-C91B49D4CB7C}" type="slidenum">
               <a:rPr lang="nl-NL" smtClean="0"/>
-              <a:t>12</a:t>
+              <a:t>14</a:t>
             </a:fld>
             <a:endParaRPr lang="nl-NL"/>
           </a:p>
@@ -1184,7 +1186,7 @@
           <a:p>
             <a:fld id="{9184DA70-C731-4C70-880D-CCD4705E623C}" type="datetime1">
               <a:rPr lang="en-US" smtClean="0"/>
-              <a:t>6/18/2020</a:t>
+              <a:t>6/19/2020</a:t>
             </a:fld>
             <a:endParaRPr lang="en-US" dirty="0"/>
           </a:p>
@@ -1372,7 +1374,7 @@
           <a:p>
             <a:fld id="{4BE1D723-8F53-4F53-90B0-1982A396982E}" type="datetime1">
               <a:rPr lang="en-US" smtClean="0"/>
-              <a:t>6/18/2020</a:t>
+              <a:t>6/19/2020</a:t>
             </a:fld>
             <a:endParaRPr lang="en-US" dirty="0"/>
           </a:p>
@@ -1745,7 +1747,7 @@
           <a:p>
             <a:fld id="{97669AF7-7BEB-44E4-9852-375E34362B5B}" type="datetime1">
               <a:rPr lang="en-US" smtClean="0"/>
-              <a:t>6/18/2020</a:t>
+              <a:t>6/19/2020</a:t>
             </a:fld>
             <a:endParaRPr lang="en-US" dirty="0"/>
           </a:p>
@@ -2000,7 +2002,7 @@
           <a:p>
             <a:fld id="{BAAAC38D-0552-4C82-B593-E6124DFADBE2}" type="datetime1">
               <a:rPr lang="en-US" smtClean="0"/>
-              <a:t>6/18/2020</a:t>
+              <a:t>6/19/2020</a:t>
             </a:fld>
             <a:endParaRPr lang="en-US" dirty="0"/>
           </a:p>
@@ -2397,7 +2399,7 @@
           <a:p>
             <a:fld id="{D9DF0F1C-5577-4ACB-BB62-DF8F3C494C7E}" type="datetime1">
               <a:rPr lang="en-US" smtClean="0"/>
-              <a:t>6/18/2020</a:t>
+              <a:t>6/19/2020</a:t>
             </a:fld>
             <a:endParaRPr lang="en-US" dirty="0"/>
           </a:p>
@@ -2533,7 +2535,7 @@
           <a:p>
             <a:fld id="{1775B394-D9F9-4F0C-B15D-605F45CB9E9F}" type="datetime1">
               <a:rPr lang="en-US" smtClean="0"/>
-              <a:t>6/18/2020</a:t>
+              <a:t>6/19/2020</a:t>
             </a:fld>
             <a:endParaRPr lang="en-US" dirty="0"/>
           </a:p>
@@ -2690,7 +2692,7 @@
           <a:p>
             <a:fld id="{39667345-2558-425A-8533-9BFDBCE15005}" type="datetime1">
               <a:rPr lang="en-US" smtClean="0"/>
-              <a:t>6/18/2020</a:t>
+              <a:t>6/19/2020</a:t>
             </a:fld>
             <a:endParaRPr lang="en-US" dirty="0"/>
           </a:p>
@@ -3019,7 +3021,7 @@
           <a:p>
             <a:fld id="{92BEA474-078D-4E9B-9B14-09A87B19DC46}" type="datetime1">
               <a:rPr lang="en-US" smtClean="0"/>
-              <a:t>6/18/2020</a:t>
+              <a:t>6/19/2020</a:t>
             </a:fld>
             <a:endParaRPr lang="en-US" dirty="0"/>
           </a:p>
@@ -3369,7 +3371,7 @@
           <a:p>
             <a:fld id="{4907D986-8816-4272-A432-0437A28A9828}" type="datetime1">
               <a:rPr lang="en-US" smtClean="0"/>
-              <a:t>6/18/2020</a:t>
+              <a:t>6/19/2020</a:t>
             </a:fld>
             <a:endParaRPr lang="en-US" dirty="0"/>
           </a:p>
@@ -3630,7 +3632,7 @@
           <a:p>
             <a:fld id="{62D6E202-B606-4609-B914-27C9371A1F6D}" type="datetime1">
               <a:rPr lang="en-US" smtClean="0"/>
-              <a:t>6/18/2020</a:t>
+              <a:t>6/19/2020</a:t>
             </a:fld>
             <a:endParaRPr lang="en-US" dirty="0"/>
           </a:p>
@@ -4749,7 +4751,7 @@
           <p:cNvPr id="2" name="Title 1">
             <a:extLst>
               <a:ext uri="{FF2B5EF4-FFF2-40B4-BE49-F238E27FC236}">
-                <a16:creationId xmlns:a16="http://schemas.microsoft.com/office/drawing/2014/main" id="{233F2E4A-DE16-334C-9AB7-734725DAC7A5}"/>
+                <a16:creationId xmlns:a16="http://schemas.microsoft.com/office/drawing/2014/main" id="{8BA4C2DD-6E22-274B-8E73-0864CCF300AE}"/>
               </a:ext>
             </a:extLst>
           </p:cNvPr>
@@ -4767,7 +4769,7 @@
           <a:p>
             <a:r>
               <a:rPr lang="en-US" dirty="0"/>
-              <a:t>UML Diagram</a:t>
+              <a:t>Bot</a:t>
             </a:r>
           </a:p>
         </p:txBody>
@@ -4777,7 +4779,7 @@
           <p:cNvPr id="3" name="Content Placeholder 2">
             <a:extLst>
               <a:ext uri="{FF2B5EF4-FFF2-40B4-BE49-F238E27FC236}">
-                <a16:creationId xmlns:a16="http://schemas.microsoft.com/office/drawing/2014/main" id="{7169AE04-0E63-2E47-B422-126D340626A6}"/>
+                <a16:creationId xmlns:a16="http://schemas.microsoft.com/office/drawing/2014/main" id="{4E3DCD13-71A0-6B4E-AD41-C79CB8F6CFFC}"/>
               </a:ext>
             </a:extLst>
           </p:cNvPr>
@@ -4795,7 +4797,7 @@
           <a:p>
             <a:r>
               <a:rPr lang="en-US" dirty="0"/>
-              <a:t>- Should we do it?</a:t>
+              <a:t>- New bot explanation</a:t>
             </a:r>
           </a:p>
         </p:txBody>
@@ -4803,7 +4805,7 @@
     </p:spTree>
     <p:extLst>
       <p:ext uri="{BB962C8B-B14F-4D97-AF65-F5344CB8AC3E}">
-        <p14:creationId xmlns:p14="http://schemas.microsoft.com/office/powerpoint/2010/main" val="3577463860"/>
+        <p14:creationId xmlns:p14="http://schemas.microsoft.com/office/powerpoint/2010/main" val="258929525"/>
       </p:ext>
     </p:extLst>
   </p:cSld>
@@ -4835,7 +4837,7 @@
           <p:cNvPr id="2" name="Title 1">
             <a:extLst>
               <a:ext uri="{FF2B5EF4-FFF2-40B4-BE49-F238E27FC236}">
-                <a16:creationId xmlns:a16="http://schemas.microsoft.com/office/drawing/2014/main" id="{5CA11336-2D88-4A4E-B47F-30DEE9950B8E}"/>
+                <a16:creationId xmlns:a16="http://schemas.microsoft.com/office/drawing/2014/main" id="{29F19A6B-CDB2-8D48-97AF-EC9F49EA2578}"/>
               </a:ext>
             </a:extLst>
           </p:cNvPr>
@@ -4853,7 +4855,7 @@
           <a:p>
             <a:r>
               <a:rPr lang="en-US" dirty="0"/>
-              <a:t>Collision Detection?</a:t>
+              <a:t>Experiments</a:t>
             </a:r>
           </a:p>
         </p:txBody>
@@ -4863,7 +4865,7 @@
           <p:cNvPr id="3" name="Content Placeholder 2">
             <a:extLst>
               <a:ext uri="{FF2B5EF4-FFF2-40B4-BE49-F238E27FC236}">
-                <a16:creationId xmlns:a16="http://schemas.microsoft.com/office/drawing/2014/main" id="{9AB3564E-A875-EA49-BF49-EEECA8BF23BB}"/>
+                <a16:creationId xmlns:a16="http://schemas.microsoft.com/office/drawing/2014/main" id="{B33325E4-832A-D040-B461-E6D8A517BFF9}"/>
               </a:ext>
             </a:extLst>
           </p:cNvPr>
@@ -4889,7 +4891,7 @@
     </p:spTree>
     <p:extLst>
       <p:ext uri="{BB962C8B-B14F-4D97-AF65-F5344CB8AC3E}">
-        <p14:creationId xmlns:p14="http://schemas.microsoft.com/office/powerpoint/2010/main" val="1886375000"/>
+        <p14:creationId xmlns:p14="http://schemas.microsoft.com/office/powerpoint/2010/main" val="3107714555"/>
       </p:ext>
     </p:extLst>
   </p:cSld>
@@ -4921,7 +4923,7 @@
           <p:cNvPr id="2" name="Title 1">
             <a:extLst>
               <a:ext uri="{FF2B5EF4-FFF2-40B4-BE49-F238E27FC236}">
-                <a16:creationId xmlns:a16="http://schemas.microsoft.com/office/drawing/2014/main" id="{538E8784-9CE9-174F-9AB5-4FEC4AC283AA}"/>
+                <a16:creationId xmlns:a16="http://schemas.microsoft.com/office/drawing/2014/main" id="{233F2E4A-DE16-334C-9AB7-734725DAC7A5}"/>
               </a:ext>
             </a:extLst>
           </p:cNvPr>
@@ -4939,7 +4941,7 @@
           <a:p>
             <a:r>
               <a:rPr lang="en-US" dirty="0"/>
-              <a:t>Save Loader system?</a:t>
+              <a:t>UML Diagram</a:t>
             </a:r>
           </a:p>
         </p:txBody>
@@ -4949,7 +4951,7 @@
           <p:cNvPr id="3" name="Content Placeholder 2">
             <a:extLst>
               <a:ext uri="{FF2B5EF4-FFF2-40B4-BE49-F238E27FC236}">
-                <a16:creationId xmlns:a16="http://schemas.microsoft.com/office/drawing/2014/main" id="{D3334042-A589-C447-8CB7-3178BDCCFAEA}"/>
+                <a16:creationId xmlns:a16="http://schemas.microsoft.com/office/drawing/2014/main" id="{7169AE04-0E63-2E47-B422-126D340626A6}"/>
               </a:ext>
             </a:extLst>
           </p:cNvPr>
@@ -4965,14 +4967,17 @@
           <a:bodyPr/>
           <a:lstStyle/>
           <a:p>
-            <a:endParaRPr lang="en-US" dirty="0"/>
+            <a:r>
+              <a:rPr lang="en-US" dirty="0"/>
+              <a:t>- Should we do it?</a:t>
+            </a:r>
           </a:p>
         </p:txBody>
       </p:sp>
     </p:spTree>
     <p:extLst>
       <p:ext uri="{BB962C8B-B14F-4D97-AF65-F5344CB8AC3E}">
-        <p14:creationId xmlns:p14="http://schemas.microsoft.com/office/powerpoint/2010/main" val="3411105790"/>
+        <p14:creationId xmlns:p14="http://schemas.microsoft.com/office/powerpoint/2010/main" val="3577463860"/>
       </p:ext>
     </p:extLst>
   </p:cSld>
@@ -5004,6 +5009,175 @@
           <p:cNvPr id="2" name="Title 1">
             <a:extLst>
               <a:ext uri="{FF2B5EF4-FFF2-40B4-BE49-F238E27FC236}">
+                <a16:creationId xmlns:a16="http://schemas.microsoft.com/office/drawing/2014/main" id="{5CA11336-2D88-4A4E-B47F-30DEE9950B8E}"/>
+              </a:ext>
+            </a:extLst>
+          </p:cNvPr>
+          <p:cNvSpPr>
+            <a:spLocks noGrp="1"/>
+          </p:cNvSpPr>
+          <p:nvPr>
+            <p:ph type="title"/>
+          </p:nvPr>
+        </p:nvSpPr>
+        <p:spPr/>
+        <p:txBody>
+          <a:bodyPr/>
+          <a:lstStyle/>
+          <a:p>
+            <a:r>
+              <a:rPr lang="en-US" dirty="0"/>
+              <a:t>Collision Detection?</a:t>
+            </a:r>
+          </a:p>
+        </p:txBody>
+      </p:sp>
+      <p:sp>
+        <p:nvSpPr>
+          <p:cNvPr id="3" name="Content Placeholder 2">
+            <a:extLst>
+              <a:ext uri="{FF2B5EF4-FFF2-40B4-BE49-F238E27FC236}">
+                <a16:creationId xmlns:a16="http://schemas.microsoft.com/office/drawing/2014/main" id="{9AB3564E-A875-EA49-BF49-EEECA8BF23BB}"/>
+              </a:ext>
+            </a:extLst>
+          </p:cNvPr>
+          <p:cNvSpPr>
+            <a:spLocks noGrp="1"/>
+          </p:cNvSpPr>
+          <p:nvPr>
+            <p:ph idx="1"/>
+          </p:nvPr>
+        </p:nvSpPr>
+        <p:spPr/>
+        <p:txBody>
+          <a:bodyPr/>
+          <a:lstStyle/>
+          <a:p>
+            <a:r>
+              <a:rPr lang="en-US" dirty="0"/>
+              <a:t>- TODO</a:t>
+            </a:r>
+          </a:p>
+        </p:txBody>
+      </p:sp>
+    </p:spTree>
+    <p:extLst>
+      <p:ext uri="{BB962C8B-B14F-4D97-AF65-F5344CB8AC3E}">
+        <p14:creationId xmlns:p14="http://schemas.microsoft.com/office/powerpoint/2010/main" val="1886375000"/>
+      </p:ext>
+    </p:extLst>
+  </p:cSld>
+  <p:clrMapOvr>
+    <a:masterClrMapping/>
+  </p:clrMapOvr>
+</p:sld>
+</file>
+
+<file path=ppt/slides/slide14.xml><?xml version="1.0" encoding="utf-8"?>
+<p:sld xmlns:a="http://schemas.openxmlformats.org/drawingml/2006/main" xmlns:r="http://schemas.openxmlformats.org/officeDocument/2006/relationships" xmlns:p="http://schemas.openxmlformats.org/presentationml/2006/main">
+  <p:cSld>
+    <p:spTree>
+      <p:nvGrpSpPr>
+        <p:cNvPr id="1" name=""/>
+        <p:cNvGrpSpPr/>
+        <p:nvPr/>
+      </p:nvGrpSpPr>
+      <p:grpSpPr>
+        <a:xfrm>
+          <a:off x="0" y="0"/>
+          <a:ext cx="0" cy="0"/>
+          <a:chOff x="0" y="0"/>
+          <a:chExt cx="0" cy="0"/>
+        </a:xfrm>
+      </p:grpSpPr>
+      <p:sp>
+        <p:nvSpPr>
+          <p:cNvPr id="2" name="Title 1">
+            <a:extLst>
+              <a:ext uri="{FF2B5EF4-FFF2-40B4-BE49-F238E27FC236}">
+                <a16:creationId xmlns:a16="http://schemas.microsoft.com/office/drawing/2014/main" id="{538E8784-9CE9-174F-9AB5-4FEC4AC283AA}"/>
+              </a:ext>
+            </a:extLst>
+          </p:cNvPr>
+          <p:cNvSpPr>
+            <a:spLocks noGrp="1"/>
+          </p:cNvSpPr>
+          <p:nvPr>
+            <p:ph type="title"/>
+          </p:nvPr>
+        </p:nvSpPr>
+        <p:spPr/>
+        <p:txBody>
+          <a:bodyPr/>
+          <a:lstStyle/>
+          <a:p>
+            <a:r>
+              <a:rPr lang="en-US" dirty="0"/>
+              <a:t>Save Loader system?</a:t>
+            </a:r>
+          </a:p>
+        </p:txBody>
+      </p:sp>
+      <p:sp>
+        <p:nvSpPr>
+          <p:cNvPr id="3" name="Content Placeholder 2">
+            <a:extLst>
+              <a:ext uri="{FF2B5EF4-FFF2-40B4-BE49-F238E27FC236}">
+                <a16:creationId xmlns:a16="http://schemas.microsoft.com/office/drawing/2014/main" id="{D3334042-A589-C447-8CB7-3178BDCCFAEA}"/>
+              </a:ext>
+            </a:extLst>
+          </p:cNvPr>
+          <p:cNvSpPr>
+            <a:spLocks noGrp="1"/>
+          </p:cNvSpPr>
+          <p:nvPr>
+            <p:ph idx="1"/>
+          </p:nvPr>
+        </p:nvSpPr>
+        <p:spPr/>
+        <p:txBody>
+          <a:bodyPr/>
+          <a:lstStyle/>
+          <a:p>
+            <a:endParaRPr lang="en-US" dirty="0"/>
+          </a:p>
+        </p:txBody>
+      </p:sp>
+    </p:spTree>
+    <p:extLst>
+      <p:ext uri="{BB962C8B-B14F-4D97-AF65-F5344CB8AC3E}">
+        <p14:creationId xmlns:p14="http://schemas.microsoft.com/office/powerpoint/2010/main" val="3411105790"/>
+      </p:ext>
+    </p:extLst>
+  </p:cSld>
+  <p:clrMapOvr>
+    <a:masterClrMapping/>
+  </p:clrMapOvr>
+</p:sld>
+</file>
+
+<file path=ppt/slides/slide15.xml><?xml version="1.0" encoding="utf-8"?>
+<p:sld xmlns:a="http://schemas.openxmlformats.org/drawingml/2006/main" xmlns:r="http://schemas.openxmlformats.org/officeDocument/2006/relationships" xmlns:p="http://schemas.openxmlformats.org/presentationml/2006/main">
+  <p:cSld>
+    <p:spTree>
+      <p:nvGrpSpPr>
+        <p:cNvPr id="1" name=""/>
+        <p:cNvGrpSpPr/>
+        <p:nvPr/>
+      </p:nvGrpSpPr>
+      <p:grpSpPr>
+        <a:xfrm>
+          <a:off x="0" y="0"/>
+          <a:ext cx="0" cy="0"/>
+          <a:chOff x="0" y="0"/>
+          <a:chExt cx="0" cy="0"/>
+        </a:xfrm>
+      </p:grpSpPr>
+      <p:sp>
+        <p:nvSpPr>
+          <p:cNvPr id="2" name="Title 1">
+            <a:extLst>
+              <a:ext uri="{FF2B5EF4-FFF2-40B4-BE49-F238E27FC236}">
                 <a16:creationId xmlns:a16="http://schemas.microsoft.com/office/drawing/2014/main" id="{AE509FE0-01FE-484D-9253-00E27C5034A6}"/>
               </a:ext>
             </a:extLst>
@@ -5065,7 +5239,7 @@
 </p:sld>
 </file>
 
-<file path=ppt/slides/slide14.xml><?xml version="1.0" encoding="utf-8"?>
+<file path=ppt/slides/slide16.xml><?xml version="1.0" encoding="utf-8"?>
 <p:sld xmlns:a="http://schemas.openxmlformats.org/drawingml/2006/main" xmlns:r="http://schemas.openxmlformats.org/officeDocument/2006/relationships" xmlns:p="http://schemas.openxmlformats.org/presentationml/2006/main">
   <p:cSld>
     <p:spTree>
@@ -5737,7 +5911,7 @@
         </p:spPr>
         <p:txBody>
           <a:bodyPr>
-            <a:normAutofit/>
+            <a:normAutofit fontScale="62500" lnSpcReduction="20000"/>
           </a:bodyPr>
           <a:lstStyle/>
           <a:p>
@@ -5747,8 +5921,101 @@
                   <a:srgbClr val="FFFFFF"/>
                 </a:solidFill>
               </a:rPr>
-              <a:t>We wrote our own game engine based on OpenGL. This means that we made everything from creating a window, a way to render our 3D world, allowing the use of textures, adding a system for importing 3D models, lighting calculations, a third person camera and so on our selves.</a:t>
-            </a:r>
+              <a:t>We have made our own </a:t>
+            </a:r>
+            <a:r>
+              <a:rPr lang="en-US" sz="1800" dirty="0" err="1">
+                <a:solidFill>
+                  <a:srgbClr val="FFFFFF"/>
+                </a:solidFill>
+              </a:rPr>
+              <a:t>openGL</a:t>
+            </a:r>
+            <a:r>
+              <a:rPr lang="en-US" sz="1800" dirty="0">
+                <a:solidFill>
+                  <a:srgbClr val="FFFFFF"/>
+                </a:solidFill>
+              </a:rPr>
+              <a:t>-based game engine with support for the following features:</a:t>
+            </a:r>
+          </a:p>
+          <a:p>
+            <a:r>
+              <a:rPr lang="en-US" sz="1800" dirty="0">
+                <a:solidFill>
+                  <a:srgbClr val="FFFFFF"/>
+                </a:solidFill>
+              </a:rPr>
+              <a:t>Dynamic terrain generation</a:t>
+            </a:r>
+          </a:p>
+          <a:p>
+            <a:r>
+              <a:rPr lang="en-US" sz="1800" dirty="0">
+                <a:solidFill>
+                  <a:srgbClr val="FFFFFF"/>
+                </a:solidFill>
+              </a:rPr>
+              <a:t>Real-time editing</a:t>
+            </a:r>
+          </a:p>
+          <a:p>
+            <a:r>
+              <a:rPr lang="en-US" sz="1800" dirty="0">
+                <a:solidFill>
+                  <a:srgbClr val="FFFFFF"/>
+                </a:solidFill>
+              </a:rPr>
+              <a:t>Collision detection</a:t>
+            </a:r>
+          </a:p>
+          <a:p>
+            <a:r>
+              <a:rPr lang="en-US" sz="1800" dirty="0">
+                <a:solidFill>
+                  <a:srgbClr val="FFFFFF"/>
+                </a:solidFill>
+              </a:rPr>
+              <a:t>Realistic lighting</a:t>
+            </a:r>
+          </a:p>
+          <a:p>
+            <a:r>
+              <a:rPr lang="en-US" sz="1800" dirty="0">
+                <a:solidFill>
+                  <a:srgbClr val="FFFFFF"/>
+                </a:solidFill>
+              </a:rPr>
+              <a:t>Water with special effects (du/dv maps, reflections, depth effect)</a:t>
+            </a:r>
+          </a:p>
+          <a:p>
+            <a:r>
+              <a:rPr lang="en-US" sz="1800" dirty="0">
+                <a:solidFill>
+                  <a:srgbClr val="FFFFFF"/>
+                </a:solidFill>
+              </a:rPr>
+              <a:t>3D model support (.obj)</a:t>
+            </a:r>
+          </a:p>
+          <a:p>
+            <a:r>
+              <a:rPr lang="en-US" sz="1800" dirty="0">
+                <a:solidFill>
+                  <a:srgbClr val="FFFFFF"/>
+                </a:solidFill>
+              </a:rPr>
+              <a:t>Third person camera</a:t>
+            </a:r>
+          </a:p>
+          <a:p>
+            <a:endParaRPr lang="en-US" sz="1800" dirty="0">
+              <a:solidFill>
+                <a:srgbClr val="FFFFFF"/>
+              </a:solidFill>
+            </a:endParaRPr>
           </a:p>
           <a:p>
             <a:endParaRPr lang="en-US" sz="1800" dirty="0">
@@ -5784,7 +6051,7 @@
         </p:blipFill>
         <p:spPr>
           <a:xfrm>
-            <a:off x="4742017" y="1517039"/>
+            <a:off x="4742017" y="1531787"/>
             <a:ext cx="6798082" cy="3823921"/>
           </a:xfrm>
           <a:prstGeom prst="rect">
@@ -5943,6 +6210,14 @@
 <file path=ppt/slides/slide6.xml><?xml version="1.0" encoding="utf-8"?>
 <p:sld xmlns:a="http://schemas.openxmlformats.org/drawingml/2006/main" xmlns:r="http://schemas.openxmlformats.org/officeDocument/2006/relationships" xmlns:p="http://schemas.openxmlformats.org/presentationml/2006/main">
   <p:cSld>
+    <p:bg>
+      <p:bgPr>
+        <a:solidFill>
+          <a:schemeClr val="bg1"/>
+        </a:solidFill>
+        <a:effectLst/>
+      </p:bgPr>
+    </p:bg>
     <p:spTree>
       <p:nvGrpSpPr>
         <p:cNvPr id="1" name=""/>
@@ -5959,10 +6234,65 @@
       </p:grpSpPr>
       <p:sp>
         <p:nvSpPr>
+          <p:cNvPr id="14" name="Rectangle 13">
+            <a:extLst>
+              <a:ext uri="{FF2B5EF4-FFF2-40B4-BE49-F238E27FC236}">
+                <a16:creationId xmlns:a16="http://schemas.microsoft.com/office/drawing/2014/main" id="{E844E128-FF69-4E9F-8327-6B504B3C5AE1}"/>
+              </a:ext>
+              <a:ext uri="{C183D7F6-B498-43B3-948B-1728B52AA6E4}">
+                <adec:decorative xmlns:adec="http://schemas.microsoft.com/office/drawing/2017/decorative" val="1"/>
+              </a:ext>
+            </a:extLst>
+          </p:cNvPr>
+          <p:cNvSpPr>
+            <a:spLocks noGrp="1" noRot="1" noChangeAspect="1" noMove="1" noResize="1" noEditPoints="1" noAdjustHandles="1" noChangeArrowheads="1" noChangeShapeType="1" noTextEdit="1"/>
+          </p:cNvSpPr>
+          <p:nvPr>
+            <p:extLst>
+              <p:ext uri="{386F3935-93C4-4BCD-93E2-E3B085C9AB24}">
+                <p16:designElem xmlns:p16="http://schemas.microsoft.com/office/powerpoint/2015/main" val="1"/>
+              </p:ext>
+            </p:extLst>
+          </p:nvPr>
+        </p:nvSpPr>
+        <p:spPr bwMode="white">
+          <a:xfrm>
+            <a:off x="15" y="0"/>
+            <a:ext cx="12191985" cy="6858000"/>
+          </a:xfrm>
+          <a:prstGeom prst="rect">
+            <a:avLst/>
+          </a:prstGeom>
+          <a:solidFill>
+            <a:srgbClr val="262626"/>
+          </a:solidFill>
+          <a:ln>
+            <a:noFill/>
+          </a:ln>
+        </p:spPr>
+        <p:style>
+          <a:lnRef idx="2">
+            <a:schemeClr val="accent1">
+              <a:shade val="50000"/>
+            </a:schemeClr>
+          </a:lnRef>
+          <a:fillRef idx="1">
+            <a:schemeClr val="accent1"/>
+          </a:fillRef>
+          <a:effectRef idx="0">
+            <a:schemeClr val="accent1"/>
+          </a:effectRef>
+          <a:fontRef idx="minor">
+            <a:schemeClr val="lt1"/>
+          </a:fontRef>
+        </p:style>
+      </p:sp>
+      <p:sp>
+        <p:nvSpPr>
           <p:cNvPr id="2" name="Title 1">
             <a:extLst>
               <a:ext uri="{FF2B5EF4-FFF2-40B4-BE49-F238E27FC236}">
-                <a16:creationId xmlns:a16="http://schemas.microsoft.com/office/drawing/2014/main" id="{200E7CE6-2441-3C46-9FC0-54953D57A541}"/>
+                <a16:creationId xmlns:a16="http://schemas.microsoft.com/office/drawing/2014/main" id="{6DC84F3E-FD66-4E15-9705-5AF74366E55D}"/>
               </a:ext>
             </a:extLst>
           </p:cNvPr>
@@ -5973,24 +6303,92 @@
             <p:ph type="title"/>
           </p:nvPr>
         </p:nvSpPr>
-        <p:spPr/>
-        <p:txBody>
-          <a:bodyPr/>
-          <a:lstStyle/>
-          <a:p>
-            <a:r>
-              <a:rPr lang="en-US" dirty="0"/>
-              <a:t>Physics</a:t>
-            </a:r>
-          </a:p>
-        </p:txBody>
-      </p:sp>
+        <p:spPr>
+          <a:xfrm>
+            <a:off x="1097280" y="516835"/>
+            <a:ext cx="5977937" cy="1666501"/>
+          </a:xfrm>
+        </p:spPr>
+        <p:txBody>
+          <a:bodyPr>
+            <a:normAutofit/>
+          </a:bodyPr>
+          <a:lstStyle/>
+          <a:p>
+            <a:r>
+              <a:rPr lang="en-US" sz="4000">
+                <a:solidFill>
+                  <a:srgbClr val="FFFFFF"/>
+                </a:solidFill>
+              </a:rPr>
+              <a:t>Terrain generation</a:t>
+            </a:r>
+            <a:endParaRPr lang="nl-NL" sz="4000">
+              <a:solidFill>
+                <a:srgbClr val="FFFFFF"/>
+              </a:solidFill>
+            </a:endParaRPr>
+          </a:p>
+        </p:txBody>
+      </p:sp>
+      <p:cxnSp>
+        <p:nvCxnSpPr>
+          <p:cNvPr id="16" name="Straight Connector 15">
+            <a:extLst>
+              <a:ext uri="{FF2B5EF4-FFF2-40B4-BE49-F238E27FC236}">
+                <a16:creationId xmlns:a16="http://schemas.microsoft.com/office/drawing/2014/main" id="{055CEADF-09EA-423C-8C45-F94AF44D5AF0}"/>
+              </a:ext>
+              <a:ext uri="{C183D7F6-B498-43B3-948B-1728B52AA6E4}">
+                <adec:decorative xmlns:adec="http://schemas.microsoft.com/office/drawing/2017/decorative" val="1"/>
+              </a:ext>
+            </a:extLst>
+          </p:cNvPr>
+          <p:cNvCxnSpPr>
+            <a:cxnSpLocks noGrp="1" noRot="1" noChangeAspect="1" noMove="1" noResize="1" noEditPoints="1" noAdjustHandles="1" noChangeArrowheads="1" noChangeShapeType="1"/>
+          </p:cNvCxnSpPr>
+          <p:nvPr>
+            <p:extLst>
+              <p:ext uri="{386F3935-93C4-4BCD-93E2-E3B085C9AB24}">
+                <p16:designElem xmlns:p16="http://schemas.microsoft.com/office/powerpoint/2015/main" val="1"/>
+              </p:ext>
+            </p:extLst>
+          </p:nvPr>
+        </p:nvCxnSpPr>
+        <p:spPr>
+          <a:xfrm>
+            <a:off x="1215896" y="2353592"/>
+            <a:ext cx="5303520" cy="0"/>
+          </a:xfrm>
+          <a:prstGeom prst="line">
+            <a:avLst/>
+          </a:prstGeom>
+          <a:ln w="19050">
+            <a:solidFill>
+              <a:schemeClr val="accent1"/>
+            </a:solidFill>
+          </a:ln>
+        </p:spPr>
+        <p:style>
+          <a:lnRef idx="1">
+            <a:schemeClr val="accent1"/>
+          </a:lnRef>
+          <a:fillRef idx="0">
+            <a:schemeClr val="accent1"/>
+          </a:fillRef>
+          <a:effectRef idx="0">
+            <a:schemeClr val="accent1"/>
+          </a:effectRef>
+          <a:fontRef idx="minor">
+            <a:schemeClr val="tx1"/>
+          </a:fontRef>
+        </p:style>
+      </p:cxnSp>
       <p:sp>
         <p:nvSpPr>
           <p:cNvPr id="3" name="Content Placeholder 2">
             <a:extLst>
               <a:ext uri="{FF2B5EF4-FFF2-40B4-BE49-F238E27FC236}">
-                <a16:creationId xmlns:a16="http://schemas.microsoft.com/office/drawing/2014/main" id="{08FF44B2-D01F-164B-9336-71FB8412FC79}"/>
+                <a16:creationId xmlns:a16="http://schemas.microsoft.com/office/drawing/2014/main" id="{67E2C6FA-7ECC-4F70-9133-D8AF06BA398A}"/>
               </a:ext>
             </a:extLst>
           </p:cNvPr>
@@ -6001,27 +6399,110 @@
             <p:ph idx="1"/>
           </p:nvPr>
         </p:nvSpPr>
-        <p:spPr/>
-        <p:txBody>
-          <a:bodyPr/>
-          <a:lstStyle/>
-          <a:p>
-            <a:r>
-              <a:rPr lang="en-US" dirty="0"/>
-              <a:t>- Flying balls explanation by Matthijs the genius</a:t>
-            </a:r>
-          </a:p>
-        </p:txBody>
-      </p:sp>
+        <p:spPr>
+          <a:xfrm>
+            <a:off x="1097279" y="2546224"/>
+            <a:ext cx="5977938" cy="3342747"/>
+          </a:xfrm>
+        </p:spPr>
+        <p:txBody>
+          <a:bodyPr>
+            <a:normAutofit/>
+          </a:bodyPr>
+          <a:lstStyle/>
+          <a:p>
+            <a:r>
+              <a:rPr lang="en-US" sz="1800">
+                <a:solidFill>
+                  <a:srgbClr val="FFFFFF"/>
+                </a:solidFill>
+              </a:rPr>
+              <a:t>Given a mathematical function with the variables x and y we can generate a terrain during runtime. </a:t>
+            </a:r>
+          </a:p>
+          <a:p>
+            <a:endParaRPr lang="en-US" sz="1800">
+              <a:solidFill>
+                <a:srgbClr val="FFFFFF"/>
+              </a:solidFill>
+            </a:endParaRPr>
+          </a:p>
+          <a:p>
+            <a:endParaRPr lang="nl-NL" sz="1800">
+              <a:solidFill>
+                <a:srgbClr val="FFFFFF"/>
+              </a:solidFill>
+            </a:endParaRPr>
+          </a:p>
+        </p:txBody>
+      </p:sp>
+      <p:pic>
+        <p:nvPicPr>
+          <p:cNvPr id="9" name="Picture 8">
+            <a:extLst>
+              <a:ext uri="{FF2B5EF4-FFF2-40B4-BE49-F238E27FC236}">
+                <a16:creationId xmlns:a16="http://schemas.microsoft.com/office/drawing/2014/main" id="{EAE68DA4-442C-4DAA-B407-33D705C64385}"/>
+              </a:ext>
+            </a:extLst>
+          </p:cNvPr>
+          <p:cNvPicPr>
+            <a:picLocks noChangeAspect="1"/>
+          </p:cNvPicPr>
+          <p:nvPr/>
+        </p:nvPicPr>
+        <p:blipFill>
+          <a:blip r:embed="rId2"/>
+          <a:srcRect/>
+          <a:stretch/>
+        </p:blipFill>
+        <p:spPr>
+          <a:xfrm>
+            <a:off x="-2" y="3429000"/>
+            <a:ext cx="6098137" cy="3429000"/>
+          </a:xfrm>
+          <a:prstGeom prst="rect">
+            <a:avLst/>
+          </a:prstGeom>
+        </p:spPr>
+      </p:pic>
+      <p:pic>
+        <p:nvPicPr>
+          <p:cNvPr id="7" name="Picture 6">
+            <a:extLst>
+              <a:ext uri="{FF2B5EF4-FFF2-40B4-BE49-F238E27FC236}">
+                <a16:creationId xmlns:a16="http://schemas.microsoft.com/office/drawing/2014/main" id="{8282C41E-2112-4A71-8D00-1E4560859BB1}"/>
+              </a:ext>
+            </a:extLst>
+          </p:cNvPr>
+          <p:cNvPicPr>
+            <a:picLocks noChangeAspect="1"/>
+          </p:cNvPicPr>
+          <p:nvPr/>
+        </p:nvPicPr>
+        <p:blipFill>
+          <a:blip r:embed="rId3"/>
+          <a:srcRect/>
+          <a:stretch/>
+        </p:blipFill>
+        <p:spPr>
+          <a:xfrm>
+            <a:off x="6096000" y="3418745"/>
+            <a:ext cx="6095985" cy="3439255"/>
+          </a:xfrm>
+          <a:prstGeom prst="rect">
+            <a:avLst/>
+          </a:prstGeom>
+        </p:spPr>
+      </p:pic>
     </p:spTree>
     <p:extLst>
       <p:ext uri="{BB962C8B-B14F-4D97-AF65-F5344CB8AC3E}">
-        <p14:creationId xmlns:p14="http://schemas.microsoft.com/office/powerpoint/2010/main" val="1901925188"/>
+        <p14:creationId xmlns:p14="http://schemas.microsoft.com/office/powerpoint/2010/main" val="832711326"/>
       </p:ext>
     </p:extLst>
   </p:cSld>
   <p:clrMapOvr>
-    <a:masterClrMapping/>
+    <a:overrideClrMapping bg1="dk1" tx1="lt1" bg2="dk2" tx2="lt2" accent1="accent1" accent2="accent2" accent3="accent3" accent4="accent4" accent5="accent5" accent6="accent6" hlink="hlink" folHlink="folHlink"/>
   </p:clrMapOvr>
 </p:sld>
 </file>
@@ -6029,6 +6510,14 @@
 <file path=ppt/slides/slide7.xml><?xml version="1.0" encoding="utf-8"?>
 <p:sld xmlns:a="http://schemas.openxmlformats.org/drawingml/2006/main" xmlns:r="http://schemas.openxmlformats.org/officeDocument/2006/relationships" xmlns:p="http://schemas.openxmlformats.org/presentationml/2006/main">
   <p:cSld>
+    <p:bg>
+      <p:bgPr>
+        <a:solidFill>
+          <a:schemeClr val="bg1"/>
+        </a:solidFill>
+        <a:effectLst/>
+      </p:bgPr>
+    </p:bg>
     <p:spTree>
       <p:nvGrpSpPr>
         <p:cNvPr id="1" name=""/>
@@ -6043,12 +6532,72 @@
           <a:chExt cx="0" cy="0"/>
         </a:xfrm>
       </p:grpSpPr>
+      <p:sp useBgFill="1">
+        <p:nvSpPr>
+          <p:cNvPr id="16" name="Rectangle 15">
+            <a:extLst>
+              <a:ext uri="{FF2B5EF4-FFF2-40B4-BE49-F238E27FC236}">
+                <a16:creationId xmlns:a16="http://schemas.microsoft.com/office/drawing/2014/main" id="{0A913F90-4522-4E66-98B7-DC02FD8BBE9F}"/>
+              </a:ext>
+              <a:ext uri="{C183D7F6-B498-43B3-948B-1728B52AA6E4}">
+                <adec:decorative xmlns:adec="http://schemas.microsoft.com/office/drawing/2017/decorative" val="1"/>
+              </a:ext>
+            </a:extLst>
+          </p:cNvPr>
+          <p:cNvSpPr>
+            <a:spLocks noGrp="1" noRot="1" noChangeAspect="1" noMove="1" noResize="1" noEditPoints="1" noAdjustHandles="1" noChangeArrowheads="1" noChangeShapeType="1" noTextEdit="1"/>
+          </p:cNvSpPr>
+          <p:nvPr>
+            <p:extLst>
+              <p:ext uri="{386F3935-93C4-4BCD-93E2-E3B085C9AB24}">
+                <p16:designElem xmlns:p16="http://schemas.microsoft.com/office/powerpoint/2015/main" val="1"/>
+              </p:ext>
+            </p:extLst>
+          </p:nvPr>
+        </p:nvSpPr>
+        <p:spPr>
+          <a:xfrm>
+            <a:off x="0" y="0"/>
+            <a:ext cx="12192001" cy="6858000"/>
+          </a:xfrm>
+          <a:prstGeom prst="rect">
+            <a:avLst/>
+          </a:prstGeom>
+          <a:ln>
+            <a:noFill/>
+          </a:ln>
+        </p:spPr>
+        <p:style>
+          <a:lnRef idx="2">
+            <a:schemeClr val="accent1">
+              <a:shade val="50000"/>
+            </a:schemeClr>
+          </a:lnRef>
+          <a:fillRef idx="1">
+            <a:schemeClr val="accent1"/>
+          </a:fillRef>
+          <a:effectRef idx="0">
+            <a:schemeClr val="accent1"/>
+          </a:effectRef>
+          <a:fontRef idx="minor">
+            <a:schemeClr val="lt1"/>
+          </a:fontRef>
+        </p:style>
+        <p:txBody>
+          <a:bodyPr rtlCol="0" anchor="ctr"/>
+          <a:lstStyle/>
+          <a:p>
+            <a:pPr algn="ctr"/>
+            <a:endParaRPr lang="en-US"/>
+          </a:p>
+        </p:txBody>
+      </p:sp>
       <p:sp>
         <p:nvSpPr>
           <p:cNvPr id="2" name="Title 1">
             <a:extLst>
               <a:ext uri="{FF2B5EF4-FFF2-40B4-BE49-F238E27FC236}">
-                <a16:creationId xmlns:a16="http://schemas.microsoft.com/office/drawing/2014/main" id="{ECC9EA66-DA16-8F4D-85C8-7C1A8AA5E8C0}"/>
+                <a16:creationId xmlns:a16="http://schemas.microsoft.com/office/drawing/2014/main" id="{B53BD68D-F464-4D27-A89D-686E01E734B7}"/>
               </a:ext>
             </a:extLst>
           </p:cNvPr>
@@ -6059,50 +6608,391 @@
             <p:ph type="title"/>
           </p:nvPr>
         </p:nvSpPr>
-        <p:spPr/>
-        <p:txBody>
-          <a:bodyPr/>
-          <a:lstStyle/>
-          <a:p>
+        <p:spPr>
+          <a:xfrm>
+            <a:off x="1097280" y="286603"/>
+            <a:ext cx="10058400" cy="1450757"/>
+          </a:xfrm>
+        </p:spPr>
+        <p:txBody>
+          <a:bodyPr>
+            <a:normAutofit/>
+          </a:bodyPr>
+          <a:lstStyle/>
+          <a:p>
+            <a:r>
+              <a:rPr lang="en-US"/>
+              <a:t>Collision detection</a:t>
+            </a:r>
+            <a:endParaRPr lang="nl-NL" dirty="0"/>
+          </a:p>
+        </p:txBody>
+      </p:sp>
+      <p:cxnSp>
+        <p:nvCxnSpPr>
+          <p:cNvPr id="18" name="Straight Connector 17">
+            <a:extLst>
+              <a:ext uri="{FF2B5EF4-FFF2-40B4-BE49-F238E27FC236}">
+                <a16:creationId xmlns:a16="http://schemas.microsoft.com/office/drawing/2014/main" id="{6B55B8CC-0F92-4837-A535-00875F255E11}"/>
+              </a:ext>
+              <a:ext uri="{C183D7F6-B498-43B3-948B-1728B52AA6E4}">
+                <adec:decorative xmlns:adec="http://schemas.microsoft.com/office/drawing/2017/decorative" val="1"/>
+              </a:ext>
+            </a:extLst>
+          </p:cNvPr>
+          <p:cNvCxnSpPr>
+            <a:cxnSpLocks noGrp="1" noRot="1" noChangeAspect="1" noMove="1" noResize="1" noEditPoints="1" noAdjustHandles="1" noChangeArrowheads="1" noChangeShapeType="1"/>
+          </p:cNvCxnSpPr>
+          <p:nvPr>
+            <p:extLst>
+              <p:ext uri="{386F3935-93C4-4BCD-93E2-E3B085C9AB24}">
+                <p16:designElem xmlns:p16="http://schemas.microsoft.com/office/powerpoint/2015/main" val="1"/>
+              </p:ext>
+            </p:extLst>
+          </p:nvPr>
+        </p:nvCxnSpPr>
+        <p:spPr>
+          <a:xfrm>
+            <a:off x="1193532" y="1897380"/>
+            <a:ext cx="9966960" cy="0"/>
+          </a:xfrm>
+          <a:prstGeom prst="line">
+            <a:avLst/>
+          </a:prstGeom>
+          <a:ln w="12700">
+            <a:solidFill>
+              <a:schemeClr val="tx1">
+                <a:lumMod val="75000"/>
+                <a:lumOff val="25000"/>
+              </a:schemeClr>
+            </a:solidFill>
+          </a:ln>
+        </p:spPr>
+        <p:style>
+          <a:lnRef idx="1">
+            <a:schemeClr val="accent1"/>
+          </a:lnRef>
+          <a:fillRef idx="0">
+            <a:schemeClr val="accent1"/>
+          </a:fillRef>
+          <a:effectRef idx="0">
+            <a:schemeClr val="accent1"/>
+          </a:effectRef>
+          <a:fontRef idx="minor">
+            <a:schemeClr val="tx1"/>
+          </a:fontRef>
+        </p:style>
+      </p:cxnSp>
+      <p:sp>
+        <p:nvSpPr>
+          <p:cNvPr id="13" name="Content Placeholder 12">
+            <a:extLst>
+              <a:ext uri="{FF2B5EF4-FFF2-40B4-BE49-F238E27FC236}">
+                <a16:creationId xmlns:a16="http://schemas.microsoft.com/office/drawing/2014/main" id="{F3B7A8B1-1037-4344-A0A6-A4126E5CE139}"/>
+              </a:ext>
+            </a:extLst>
+          </p:cNvPr>
+          <p:cNvSpPr>
+            <a:spLocks noGrp="1"/>
+          </p:cNvSpPr>
+          <p:nvPr>
+            <p:ph idx="1"/>
+          </p:nvPr>
+        </p:nvSpPr>
+        <p:spPr>
+          <a:xfrm>
+            <a:off x="1097280" y="2108201"/>
+            <a:ext cx="10058400" cy="1117441"/>
+          </a:xfrm>
+        </p:spPr>
+        <p:txBody>
+          <a:bodyPr>
+            <a:normAutofit fontScale="70000" lnSpcReduction="20000"/>
+          </a:bodyPr>
+          <a:lstStyle/>
+          <a:p>
+            <a:pPr marL="0" indent="0">
+              <a:buNone/>
+            </a:pPr>
             <a:r>
               <a:rPr lang="en-US" dirty="0"/>
-              <a:t>Experiments</a:t>
-            </a:r>
-          </a:p>
-        </p:txBody>
-      </p:sp>
-      <p:sp>
-        <p:nvSpPr>
-          <p:cNvPr id="3" name="Content Placeholder 2">
-            <a:extLst>
-              <a:ext uri="{FF2B5EF4-FFF2-40B4-BE49-F238E27FC236}">
-                <a16:creationId xmlns:a16="http://schemas.microsoft.com/office/drawing/2014/main" id="{C9558773-9B13-A84D-89BB-7F3575370622}"/>
-              </a:ext>
-            </a:extLst>
-          </p:cNvPr>
-          <p:cNvSpPr>
-            <a:spLocks noGrp="1"/>
-          </p:cNvSpPr>
-          <p:nvPr>
-            <p:ph idx="1"/>
-          </p:nvPr>
-        </p:nvSpPr>
-        <p:spPr/>
-        <p:txBody>
-          <a:bodyPr/>
-          <a:lstStyle/>
-          <a:p>
+              <a:t>Stages:</a:t>
+            </a:r>
+          </a:p>
+          <a:p>
+            <a:pPr marL="0" indent="0">
+              <a:buNone/>
+            </a:pPr>
             <a:r>
               <a:rPr lang="en-US" dirty="0"/>
-              <a:t>- TODO</a:t>
-            </a:r>
+              <a:t>1. Check if the smallest possible box around an object, that still contains every point making up the model, overlaps with that of the ball.</a:t>
+            </a:r>
+          </a:p>
+          <a:p>
+            <a:pPr marL="0" indent="0">
+              <a:buNone/>
+            </a:pPr>
+            <a:r>
+              <a:rPr lang="en-US" dirty="0"/>
+              <a:t>2. Check if the actual mesh is colliding with the ball</a:t>
+            </a:r>
+          </a:p>
+        </p:txBody>
+      </p:sp>
+      <p:pic>
+        <p:nvPicPr>
+          <p:cNvPr id="9" name="Picture 8">
+            <a:extLst>
+              <a:ext uri="{FF2B5EF4-FFF2-40B4-BE49-F238E27FC236}">
+                <a16:creationId xmlns:a16="http://schemas.microsoft.com/office/drawing/2014/main" id="{0A07C9A6-65AE-46AC-896D-7B886CA5F3ED}"/>
+              </a:ext>
+            </a:extLst>
+          </p:cNvPr>
+          <p:cNvPicPr>
+            <a:picLocks noChangeAspect="1"/>
+          </p:cNvPicPr>
+          <p:nvPr/>
+        </p:nvPicPr>
+        <p:blipFill>
+          <a:blip r:embed="rId2"/>
+          <a:srcRect/>
+          <a:stretch/>
+        </p:blipFill>
+        <p:spPr>
+          <a:xfrm>
+            <a:off x="1156083" y="3391669"/>
+            <a:ext cx="2533675" cy="2481142"/>
+          </a:xfrm>
+          <a:prstGeom prst="rect">
+            <a:avLst/>
+          </a:prstGeom>
+        </p:spPr>
+      </p:pic>
+      <p:pic>
+        <p:nvPicPr>
+          <p:cNvPr id="7" name="Picture 6">
+            <a:extLst>
+              <a:ext uri="{FF2B5EF4-FFF2-40B4-BE49-F238E27FC236}">
+                <a16:creationId xmlns:a16="http://schemas.microsoft.com/office/drawing/2014/main" id="{9A2EA1FE-F77B-4C6D-8ED3-EF9FCC49A67C}"/>
+              </a:ext>
+            </a:extLst>
+          </p:cNvPr>
+          <p:cNvPicPr>
+            <a:picLocks noChangeAspect="1"/>
+          </p:cNvPicPr>
+          <p:nvPr/>
+        </p:nvPicPr>
+        <p:blipFill>
+          <a:blip r:embed="rId3"/>
+          <a:srcRect/>
+          <a:stretch/>
+        </p:blipFill>
+        <p:spPr>
+          <a:xfrm>
+            <a:off x="5172481" y="3391669"/>
+            <a:ext cx="2067059" cy="2531428"/>
+          </a:xfrm>
+          <a:prstGeom prst="rect">
+            <a:avLst/>
+          </a:prstGeom>
+        </p:spPr>
+      </p:pic>
+      <p:pic>
+        <p:nvPicPr>
+          <p:cNvPr id="5" name="Content Placeholder 4">
+            <a:extLst>
+              <a:ext uri="{FF2B5EF4-FFF2-40B4-BE49-F238E27FC236}">
+                <a16:creationId xmlns:a16="http://schemas.microsoft.com/office/drawing/2014/main" id="{6AF4E6FB-0D00-4757-BCF7-3C3D502166DD}"/>
+              </a:ext>
+            </a:extLst>
+          </p:cNvPr>
+          <p:cNvPicPr>
+            <a:picLocks noChangeAspect="1"/>
+          </p:cNvPicPr>
+          <p:nvPr/>
+        </p:nvPicPr>
+        <p:blipFill>
+          <a:blip r:embed="rId4"/>
+          <a:srcRect/>
+          <a:stretch/>
+        </p:blipFill>
+        <p:spPr>
+          <a:xfrm>
+            <a:off x="8642216" y="3387970"/>
+            <a:ext cx="1876973" cy="2572459"/>
+          </a:xfrm>
+          <a:prstGeom prst="rect">
+            <a:avLst/>
+          </a:prstGeom>
+        </p:spPr>
+      </p:pic>
+      <p:sp>
+        <p:nvSpPr>
+          <p:cNvPr id="20" name="Rectangle 19">
+            <a:extLst>
+              <a:ext uri="{FF2B5EF4-FFF2-40B4-BE49-F238E27FC236}">
+                <a16:creationId xmlns:a16="http://schemas.microsoft.com/office/drawing/2014/main" id="{6344C6FC-AA4A-4CB4-835E-C976EBC08E63}"/>
+              </a:ext>
+              <a:ext uri="{C183D7F6-B498-43B3-948B-1728B52AA6E4}">
+                <adec:decorative xmlns:adec="http://schemas.microsoft.com/office/drawing/2017/decorative" val="1"/>
+              </a:ext>
+            </a:extLst>
+          </p:cNvPr>
+          <p:cNvSpPr>
+            <a:spLocks noGrp="1" noRot="1" noChangeAspect="1" noMove="1" noResize="1" noEditPoints="1" noAdjustHandles="1" noChangeArrowheads="1" noChangeShapeType="1" noTextEdit="1"/>
+          </p:cNvSpPr>
+          <p:nvPr>
+            <p:extLst>
+              <p:ext uri="{386F3935-93C4-4BCD-93E2-E3B085C9AB24}">
+                <p16:designElem xmlns:p16="http://schemas.microsoft.com/office/powerpoint/2015/main" val="1"/>
+              </p:ext>
+            </p:extLst>
+          </p:nvPr>
+        </p:nvSpPr>
+        <p:spPr>
+          <a:xfrm>
+            <a:off x="-1" y="6400800"/>
+            <a:ext cx="12192000" cy="457200"/>
+          </a:xfrm>
+          <a:prstGeom prst="rect">
+            <a:avLst/>
+          </a:prstGeom>
+          <a:solidFill>
+            <a:srgbClr val="262626"/>
+          </a:solidFill>
+          <a:ln>
+            <a:noFill/>
+          </a:ln>
+        </p:spPr>
+        <p:style>
+          <a:lnRef idx="2">
+            <a:schemeClr val="accent1">
+              <a:shade val="50000"/>
+            </a:schemeClr>
+          </a:lnRef>
+          <a:fillRef idx="1">
+            <a:schemeClr val="accent1"/>
+          </a:fillRef>
+          <a:effectRef idx="0">
+            <a:schemeClr val="accent1"/>
+          </a:effectRef>
+          <a:fontRef idx="minor">
+            <a:schemeClr val="lt1"/>
+          </a:fontRef>
+        </p:style>
+      </p:sp>
+      <p:sp>
+        <p:nvSpPr>
+          <p:cNvPr id="10" name="TextBox 9">
+            <a:extLst>
+              <a:ext uri="{FF2B5EF4-FFF2-40B4-BE49-F238E27FC236}">
+                <a16:creationId xmlns:a16="http://schemas.microsoft.com/office/drawing/2014/main" id="{58ED5E63-D634-405B-936B-02B078CA0A06}"/>
+              </a:ext>
+            </a:extLst>
+          </p:cNvPr>
+          <p:cNvSpPr txBox="1"/>
+          <p:nvPr/>
+        </p:nvSpPr>
+        <p:spPr>
+          <a:xfrm>
+            <a:off x="1156083" y="5902225"/>
+            <a:ext cx="1847036" cy="338554"/>
+          </a:xfrm>
+          <a:prstGeom prst="rect">
+            <a:avLst/>
+          </a:prstGeom>
+          <a:noFill/>
+        </p:spPr>
+        <p:txBody>
+          <a:bodyPr wrap="square" rtlCol="0">
+            <a:spAutoFit/>
+          </a:bodyPr>
+          <a:lstStyle/>
+          <a:p>
+            <a:r>
+              <a:rPr lang="en-US" sz="1600" dirty="0"/>
+              <a:t>No collision</a:t>
+            </a:r>
+            <a:endParaRPr lang="nl-NL" sz="1600" dirty="0"/>
+          </a:p>
+        </p:txBody>
+      </p:sp>
+      <p:sp>
+        <p:nvSpPr>
+          <p:cNvPr id="19" name="TextBox 18">
+            <a:extLst>
+              <a:ext uri="{FF2B5EF4-FFF2-40B4-BE49-F238E27FC236}">
+                <a16:creationId xmlns:a16="http://schemas.microsoft.com/office/drawing/2014/main" id="{B5DDBF74-E6DE-41A5-9126-2F43A4AA2232}"/>
+              </a:ext>
+            </a:extLst>
+          </p:cNvPr>
+          <p:cNvSpPr txBox="1"/>
+          <p:nvPr/>
+        </p:nvSpPr>
+        <p:spPr>
+          <a:xfrm>
+            <a:off x="5122368" y="5902225"/>
+            <a:ext cx="1847036" cy="338554"/>
+          </a:xfrm>
+          <a:prstGeom prst="rect">
+            <a:avLst/>
+          </a:prstGeom>
+          <a:noFill/>
+        </p:spPr>
+        <p:txBody>
+          <a:bodyPr wrap="square" rtlCol="0">
+            <a:spAutoFit/>
+          </a:bodyPr>
+          <a:lstStyle/>
+          <a:p>
+            <a:r>
+              <a:rPr lang="en-US" sz="1600" dirty="0"/>
+              <a:t>Overlapping box</a:t>
+            </a:r>
+            <a:endParaRPr lang="nl-NL" sz="1600" dirty="0"/>
+          </a:p>
+        </p:txBody>
+      </p:sp>
+      <p:sp>
+        <p:nvSpPr>
+          <p:cNvPr id="21" name="TextBox 20">
+            <a:extLst>
+              <a:ext uri="{FF2B5EF4-FFF2-40B4-BE49-F238E27FC236}">
+                <a16:creationId xmlns:a16="http://schemas.microsoft.com/office/drawing/2014/main" id="{43237E2E-2FA2-44CE-B7C4-912BDD33DD9C}"/>
+              </a:ext>
+            </a:extLst>
+          </p:cNvPr>
+          <p:cNvSpPr txBox="1"/>
+          <p:nvPr/>
+        </p:nvSpPr>
+        <p:spPr>
+          <a:xfrm>
+            <a:off x="8585041" y="5926495"/>
+            <a:ext cx="1847036" cy="338554"/>
+          </a:xfrm>
+          <a:prstGeom prst="rect">
+            <a:avLst/>
+          </a:prstGeom>
+          <a:noFill/>
+        </p:spPr>
+        <p:txBody>
+          <a:bodyPr wrap="square" rtlCol="0">
+            <a:spAutoFit/>
+          </a:bodyPr>
+          <a:lstStyle/>
+          <a:p>
+            <a:r>
+              <a:rPr lang="en-US" sz="1600" dirty="0"/>
+              <a:t>Collision</a:t>
+            </a:r>
+            <a:endParaRPr lang="nl-NL" sz="1600" dirty="0"/>
           </a:p>
         </p:txBody>
       </p:sp>
     </p:spTree>
     <p:extLst>
       <p:ext uri="{BB962C8B-B14F-4D97-AF65-F5344CB8AC3E}">
-        <p14:creationId xmlns:p14="http://schemas.microsoft.com/office/powerpoint/2010/main" val="233089366"/>
+        <p14:creationId xmlns:p14="http://schemas.microsoft.com/office/powerpoint/2010/main" val="3387947597"/>
       </p:ext>
     </p:extLst>
   </p:cSld>
@@ -6134,7 +7024,7 @@
           <p:cNvPr id="2" name="Title 1">
             <a:extLst>
               <a:ext uri="{FF2B5EF4-FFF2-40B4-BE49-F238E27FC236}">
-                <a16:creationId xmlns:a16="http://schemas.microsoft.com/office/drawing/2014/main" id="{8BA4C2DD-6E22-274B-8E73-0864CCF300AE}"/>
+                <a16:creationId xmlns:a16="http://schemas.microsoft.com/office/drawing/2014/main" id="{200E7CE6-2441-3C46-9FC0-54953D57A541}"/>
               </a:ext>
             </a:extLst>
           </p:cNvPr>
@@ -6152,7 +7042,7 @@
           <a:p>
             <a:r>
               <a:rPr lang="en-US" dirty="0"/>
-              <a:t>Bot</a:t>
+              <a:t>Physics</a:t>
             </a:r>
           </a:p>
         </p:txBody>
@@ -6162,7 +7052,7 @@
           <p:cNvPr id="3" name="Content Placeholder 2">
             <a:extLst>
               <a:ext uri="{FF2B5EF4-FFF2-40B4-BE49-F238E27FC236}">
-                <a16:creationId xmlns:a16="http://schemas.microsoft.com/office/drawing/2014/main" id="{4E3DCD13-71A0-6B4E-AD41-C79CB8F6CFFC}"/>
+                <a16:creationId xmlns:a16="http://schemas.microsoft.com/office/drawing/2014/main" id="{08FF44B2-D01F-164B-9336-71FB8412FC79}"/>
               </a:ext>
             </a:extLst>
           </p:cNvPr>
@@ -6180,7 +7070,7 @@
           <a:p>
             <a:r>
               <a:rPr lang="en-US" dirty="0"/>
-              <a:t>- New bot explanation</a:t>
+              <a:t>- Flying balls explanation by Matthijs the genius</a:t>
             </a:r>
           </a:p>
         </p:txBody>
@@ -6188,7 +7078,7 @@
     </p:spTree>
     <p:extLst>
       <p:ext uri="{BB962C8B-B14F-4D97-AF65-F5344CB8AC3E}">
-        <p14:creationId xmlns:p14="http://schemas.microsoft.com/office/powerpoint/2010/main" val="258929525"/>
+        <p14:creationId xmlns:p14="http://schemas.microsoft.com/office/powerpoint/2010/main" val="1901925188"/>
       </p:ext>
     </p:extLst>
   </p:cSld>
@@ -6220,7 +7110,7 @@
           <p:cNvPr id="2" name="Title 1">
             <a:extLst>
               <a:ext uri="{FF2B5EF4-FFF2-40B4-BE49-F238E27FC236}">
-                <a16:creationId xmlns:a16="http://schemas.microsoft.com/office/drawing/2014/main" id="{29F19A6B-CDB2-8D48-97AF-EC9F49EA2578}"/>
+                <a16:creationId xmlns:a16="http://schemas.microsoft.com/office/drawing/2014/main" id="{ECC9EA66-DA16-8F4D-85C8-7C1A8AA5E8C0}"/>
               </a:ext>
             </a:extLst>
           </p:cNvPr>
@@ -6248,7 +7138,7 @@
           <p:cNvPr id="3" name="Content Placeholder 2">
             <a:extLst>
               <a:ext uri="{FF2B5EF4-FFF2-40B4-BE49-F238E27FC236}">
-                <a16:creationId xmlns:a16="http://schemas.microsoft.com/office/drawing/2014/main" id="{B33325E4-832A-D040-B461-E6D8A517BFF9}"/>
+                <a16:creationId xmlns:a16="http://schemas.microsoft.com/office/drawing/2014/main" id="{C9558773-9B13-A84D-89BB-7F3575370622}"/>
               </a:ext>
             </a:extLst>
           </p:cNvPr>
@@ -6274,7 +7164,7 @@
     </p:spTree>
     <p:extLst>
       <p:ext uri="{BB962C8B-B14F-4D97-AF65-F5344CB8AC3E}">
-        <p14:creationId xmlns:p14="http://schemas.microsoft.com/office/powerpoint/2010/main" val="3107714555"/>
+        <p14:creationId xmlns:p14="http://schemas.microsoft.com/office/powerpoint/2010/main" val="233089366"/>
       </p:ext>
     </p:extLst>
   </p:cSld>
@@ -7127,21 +8017,21 @@
 </file>
 
 <file path=customXml/item2.xml><?xml version="1.0" encoding="utf-8"?>
+<?mso-contentType ?>
+<FormTemplates xmlns="http://schemas.microsoft.com/sharepoint/v3/contenttype/forms">
+  <Display>DocumentLibraryForm</Display>
+  <Edit>DocumentLibraryForm</Edit>
+  <New>DocumentLibraryForm</New>
+</FormTemplates>
+</file>
+
+<file path=customXml/item3.xml><?xml version="1.0" encoding="utf-8"?>
 <p:properties xmlns:p="http://schemas.microsoft.com/office/2006/metadata/properties" xmlns:xsi="http://www.w3.org/2001/XMLSchema-instance" xmlns:pc="http://schemas.microsoft.com/office/infopath/2007/PartnerControls">
   <documentManagement>
     <Status xmlns="71af3243-3dd4-4a8d-8c0d-dd76da1f02a5">Not started</Status>
     <MediaServiceKeyPoints xmlns="71af3243-3dd4-4a8d-8c0d-dd76da1f02a5" xsi:nil="true"/>
   </documentManagement>
 </p:properties>
-</file>
-
-<file path=customXml/item3.xml><?xml version="1.0" encoding="utf-8"?>
-<?mso-contentType ?>
-<FormTemplates xmlns="http://schemas.microsoft.com/sharepoint/v3/contenttype/forms">
-  <Display>DocumentLibraryForm</Display>
-  <Edit>DocumentLibraryForm</Edit>
-  <New>DocumentLibraryForm</New>
-</FormTemplates>
 </file>
 
 <file path=customXml/itemProps1.xml><?xml version="1.0" encoding="utf-8"?>
@@ -7164,6 +8054,14 @@
 </file>
 
 <file path=customXml/itemProps2.xml><?xml version="1.0" encoding="utf-8"?>
+<ds:datastoreItem xmlns:ds="http://schemas.openxmlformats.org/officeDocument/2006/customXml" ds:itemID="{3C586965-D4BF-4605-8C1C-5B8CCCAB7737}">
+  <ds:schemaRefs>
+    <ds:schemaRef ds:uri="http://schemas.microsoft.com/sharepoint/v3/contenttype/forms"/>
+  </ds:schemaRefs>
+</ds:datastoreItem>
+</file>
+
+<file path=customXml/itemProps3.xml><?xml version="1.0" encoding="utf-8"?>
 <ds:datastoreItem xmlns:ds="http://schemas.openxmlformats.org/officeDocument/2006/customXml" ds:itemID="{626E351D-C19B-467F-A5C7-085C4CECACA9}">
   <ds:schemaRefs>
     <ds:schemaRef ds:uri="http://schemas.microsoft.com/office/2006/metadata/properties"/>
@@ -7171,12 +8069,4 @@
     <ds:schemaRef ds:uri="71af3243-3dd4-4a8d-8c0d-dd76da1f02a5"/>
   </ds:schemaRefs>
 </ds:datastoreItem>
-</file>
-
-<file path=customXml/itemProps3.xml><?xml version="1.0" encoding="utf-8"?>
-<ds:datastoreItem xmlns:ds="http://schemas.openxmlformats.org/officeDocument/2006/customXml" ds:itemID="{3C586965-D4BF-4605-8C1C-5B8CCCAB7737}">
-  <ds:schemaRefs>
-    <ds:schemaRef ds:uri="http://schemas.microsoft.com/sharepoint/v3/contenttype/forms"/>
-  </ds:schemaRefs>
-</ds:datastoreItem>
 </file>
</xml_diff>

<commit_message>
small fix for the presentation
</commit_message>
<xml_diff>
--- a/04-PresentationThirdPhase.pptx
+++ b/04-PresentationThirdPhase.pptx
@@ -719,10 +719,7 @@
           <a:bodyPr/>
           <a:lstStyle/>
           <a:p>
-            <a:r>
-              <a:rPr lang="en-US" dirty="0"/>
-              <a:t>Is it a good idea to put this in the presentation?</a:t>
-            </a:r>
+            <a:endParaRPr lang="nl-NL"/>
           </a:p>
         </p:txBody>
       </p:sp>
@@ -743,7 +740,7 @@
           <a:p>
             <a:fld id="{F917F88C-BACD-4A94-B7B7-C91B49D4CB7C}" type="slidenum">
               <a:rPr lang="nl-NL" smtClean="0"/>
-              <a:t>12</a:t>
+              <a:t>7</a:t>
             </a:fld>
             <a:endParaRPr lang="nl-NL"/>
           </a:p>
@@ -752,7 +749,7 @@
     </p:spTree>
     <p:extLst>
       <p:ext uri="{BB962C8B-B14F-4D97-AF65-F5344CB8AC3E}">
-        <p14:creationId xmlns:p14="http://schemas.microsoft.com/office/powerpoint/2010/main" val="2273832958"/>
+        <p14:creationId xmlns:p14="http://schemas.microsoft.com/office/powerpoint/2010/main" val="2118906966"/>
       </p:ext>
     </p:extLst>
   </p:cSld>
@@ -808,6 +805,93 @@
           <a:p>
             <a:r>
               <a:rPr lang="en-US" dirty="0"/>
+              <a:t>Is it a good idea to put this in the presentation?</a:t>
+            </a:r>
+          </a:p>
+        </p:txBody>
+      </p:sp>
+      <p:sp>
+        <p:nvSpPr>
+          <p:cNvPr id="4" name="Slide Number Placeholder 3"/>
+          <p:cNvSpPr>
+            <a:spLocks noGrp="1"/>
+          </p:cNvSpPr>
+          <p:nvPr>
+            <p:ph type="sldNum" sz="quarter" idx="5"/>
+          </p:nvPr>
+        </p:nvSpPr>
+        <p:spPr/>
+        <p:txBody>
+          <a:bodyPr/>
+          <a:lstStyle/>
+          <a:p>
+            <a:fld id="{F917F88C-BACD-4A94-B7B7-C91B49D4CB7C}" type="slidenum">
+              <a:rPr lang="nl-NL" smtClean="0"/>
+              <a:t>12</a:t>
+            </a:fld>
+            <a:endParaRPr lang="nl-NL"/>
+          </a:p>
+        </p:txBody>
+      </p:sp>
+    </p:spTree>
+    <p:extLst>
+      <p:ext uri="{BB962C8B-B14F-4D97-AF65-F5344CB8AC3E}">
+        <p14:creationId xmlns:p14="http://schemas.microsoft.com/office/powerpoint/2010/main" val="2273832958"/>
+      </p:ext>
+    </p:extLst>
+  </p:cSld>
+  <p:clrMapOvr>
+    <a:masterClrMapping/>
+  </p:clrMapOvr>
+</p:notes>
+</file>
+
+<file path=ppt/notesSlides/notesSlide5.xml><?xml version="1.0" encoding="utf-8"?>
+<p:notes xmlns:a="http://schemas.openxmlformats.org/drawingml/2006/main" xmlns:r="http://schemas.openxmlformats.org/officeDocument/2006/relationships" xmlns:p="http://schemas.openxmlformats.org/presentationml/2006/main">
+  <p:cSld>
+    <p:spTree>
+      <p:nvGrpSpPr>
+        <p:cNvPr id="1" name=""/>
+        <p:cNvGrpSpPr/>
+        <p:nvPr/>
+      </p:nvGrpSpPr>
+      <p:grpSpPr>
+        <a:xfrm>
+          <a:off x="0" y="0"/>
+          <a:ext cx="0" cy="0"/>
+          <a:chOff x="0" y="0"/>
+          <a:chExt cx="0" cy="0"/>
+        </a:xfrm>
+      </p:grpSpPr>
+      <p:sp>
+        <p:nvSpPr>
+          <p:cNvPr id="2" name="Slide Image Placeholder 1"/>
+          <p:cNvSpPr>
+            <a:spLocks noGrp="1" noRot="1" noChangeAspect="1"/>
+          </p:cNvSpPr>
+          <p:nvPr>
+            <p:ph type="sldImg"/>
+          </p:nvPr>
+        </p:nvSpPr>
+        <p:spPr/>
+      </p:sp>
+      <p:sp>
+        <p:nvSpPr>
+          <p:cNvPr id="3" name="Notes Placeholder 2"/>
+          <p:cNvSpPr>
+            <a:spLocks noGrp="1"/>
+          </p:cNvSpPr>
+          <p:nvPr>
+            <p:ph type="body" idx="1"/>
+          </p:nvPr>
+        </p:nvSpPr>
+        <p:spPr/>
+        <p:txBody>
+          <a:bodyPr/>
+          <a:lstStyle/>
+          <a:p>
+            <a:r>
+              <a:rPr lang="en-US" dirty="0"/>
               <a:t>Since it was one of the requirements for this phase I think we should talk about it.</a:t>
             </a:r>
           </a:p>
@@ -855,7 +939,7 @@
 </p:notes>
 </file>
 
-<file path=ppt/notesSlides/notesSlide5.xml><?xml version="1.0" encoding="utf-8"?>
+<file path=ppt/notesSlides/notesSlide6.xml><?xml version="1.0" encoding="utf-8"?>
 <p:notes xmlns:a="http://schemas.openxmlformats.org/drawingml/2006/main" xmlns:r="http://schemas.openxmlformats.org/officeDocument/2006/relationships" xmlns:p="http://schemas.openxmlformats.org/presentationml/2006/main">
   <p:cSld>
     <p:spTree>
@@ -6754,7 +6838,7 @@
           <p:nvPr/>
         </p:nvPicPr>
         <p:blipFill>
-          <a:blip r:embed="rId2"/>
+          <a:blip r:embed="rId3"/>
           <a:srcRect/>
           <a:stretch/>
         </p:blipFill>
@@ -6783,7 +6867,7 @@
           <p:nvPr/>
         </p:nvPicPr>
         <p:blipFill>
-          <a:blip r:embed="rId3"/>
+          <a:blip r:embed="rId4"/>
           <a:srcRect/>
           <a:stretch/>
         </p:blipFill>
@@ -6812,7 +6896,7 @@
           <p:nvPr/>
         </p:nvPicPr>
         <p:blipFill>
-          <a:blip r:embed="rId4"/>
+          <a:blip r:embed="rId5"/>
           <a:srcRect/>
           <a:stretch/>
         </p:blipFill>
@@ -6947,7 +7031,7 @@
           <a:p>
             <a:r>
               <a:rPr lang="en-US" sz="1600" dirty="0"/>
-              <a:t>Overlapping box</a:t>
+              <a:t>Possible collision</a:t>
             </a:r>
             <a:endParaRPr lang="nl-NL" sz="1600" dirty="0"/>
           </a:p>
@@ -8017,21 +8101,21 @@
 </file>
 
 <file path=customXml/item2.xml><?xml version="1.0" encoding="utf-8"?>
+<p:properties xmlns:p="http://schemas.microsoft.com/office/2006/metadata/properties" xmlns:xsi="http://www.w3.org/2001/XMLSchema-instance" xmlns:pc="http://schemas.microsoft.com/office/infopath/2007/PartnerControls">
+  <documentManagement>
+    <Status xmlns="71af3243-3dd4-4a8d-8c0d-dd76da1f02a5">Not started</Status>
+    <MediaServiceKeyPoints xmlns="71af3243-3dd4-4a8d-8c0d-dd76da1f02a5" xsi:nil="true"/>
+  </documentManagement>
+</p:properties>
+</file>
+
+<file path=customXml/item3.xml><?xml version="1.0" encoding="utf-8"?>
 <?mso-contentType ?>
 <FormTemplates xmlns="http://schemas.microsoft.com/sharepoint/v3/contenttype/forms">
   <Display>DocumentLibraryForm</Display>
   <Edit>DocumentLibraryForm</Edit>
   <New>DocumentLibraryForm</New>
 </FormTemplates>
-</file>
-
-<file path=customXml/item3.xml><?xml version="1.0" encoding="utf-8"?>
-<p:properties xmlns:p="http://schemas.microsoft.com/office/2006/metadata/properties" xmlns:xsi="http://www.w3.org/2001/XMLSchema-instance" xmlns:pc="http://schemas.microsoft.com/office/infopath/2007/PartnerControls">
-  <documentManagement>
-    <Status xmlns="71af3243-3dd4-4a8d-8c0d-dd76da1f02a5">Not started</Status>
-    <MediaServiceKeyPoints xmlns="71af3243-3dd4-4a8d-8c0d-dd76da1f02a5" xsi:nil="true"/>
-  </documentManagement>
-</p:properties>
 </file>
 
 <file path=customXml/itemProps1.xml><?xml version="1.0" encoding="utf-8"?>
@@ -8054,14 +8138,6 @@
 </file>
 
 <file path=customXml/itemProps2.xml><?xml version="1.0" encoding="utf-8"?>
-<ds:datastoreItem xmlns:ds="http://schemas.openxmlformats.org/officeDocument/2006/customXml" ds:itemID="{3C586965-D4BF-4605-8C1C-5B8CCCAB7737}">
-  <ds:schemaRefs>
-    <ds:schemaRef ds:uri="http://schemas.microsoft.com/sharepoint/v3/contenttype/forms"/>
-  </ds:schemaRefs>
-</ds:datastoreItem>
-</file>
-
-<file path=customXml/itemProps3.xml><?xml version="1.0" encoding="utf-8"?>
 <ds:datastoreItem xmlns:ds="http://schemas.openxmlformats.org/officeDocument/2006/customXml" ds:itemID="{626E351D-C19B-467F-A5C7-085C4CECACA9}">
   <ds:schemaRefs>
     <ds:schemaRef ds:uri="http://schemas.microsoft.com/office/2006/metadata/properties"/>
@@ -8069,4 +8145,12 @@
     <ds:schemaRef ds:uri="71af3243-3dd4-4a8d-8c0d-dd76da1f02a5"/>
   </ds:schemaRefs>
 </ds:datastoreItem>
+</file>
+
+<file path=customXml/itemProps3.xml><?xml version="1.0" encoding="utf-8"?>
+<ds:datastoreItem xmlns:ds="http://schemas.openxmlformats.org/officeDocument/2006/customXml" ds:itemID="{3C586965-D4BF-4605-8C1C-5B8CCCAB7737}">
+  <ds:schemaRefs>
+    <ds:schemaRef ds:uri="http://schemas.microsoft.com/sharepoint/v3/contenttype/forms"/>
+  </ds:schemaRefs>
+</ds:datastoreItem>
 </file>
</xml_diff>

<commit_message>
Live saving/loading video for the presentation
</commit_message>
<xml_diff>
--- a/04-PresentationThirdPhase.pptx
+++ b/04-PresentationThirdPhase.pptx
@@ -5,7 +5,7 @@
     <p:sldMasterId id="2147483660" r:id="rId4"/>
   </p:sldMasterIdLst>
   <p:notesMasterIdLst>
-    <p:notesMasterId r:id="rId21"/>
+    <p:notesMasterId r:id="rId20"/>
   </p:notesMasterIdLst>
   <p:sldIdLst>
     <p:sldId id="265" r:id="rId5"/>
@@ -15,15 +15,14 @@
     <p:sldId id="311" r:id="rId9"/>
     <p:sldId id="325" r:id="rId10"/>
     <p:sldId id="326" r:id="rId11"/>
-    <p:sldId id="312" r:id="rId12"/>
-    <p:sldId id="319" r:id="rId13"/>
-    <p:sldId id="313" r:id="rId14"/>
-    <p:sldId id="320" r:id="rId15"/>
-    <p:sldId id="314" r:id="rId16"/>
+    <p:sldId id="318" r:id="rId12"/>
+    <p:sldId id="312" r:id="rId13"/>
+    <p:sldId id="319" r:id="rId14"/>
+    <p:sldId id="313" r:id="rId15"/>
+    <p:sldId id="320" r:id="rId16"/>
     <p:sldId id="317" r:id="rId17"/>
-    <p:sldId id="318" r:id="rId18"/>
-    <p:sldId id="322" r:id="rId19"/>
-    <p:sldId id="324" r:id="rId20"/>
+    <p:sldId id="322" r:id="rId18"/>
+    <p:sldId id="324" r:id="rId19"/>
   </p:sldIdLst>
   <p:sldSz cx="12192000" cy="6858000"/>
   <p:notesSz cx="6858000" cy="9144000"/>
@@ -215,7 +214,7 @@
           <a:p>
             <a:fld id="{05052211-91C2-4B5D-9566-2C0C10015937}" type="datetimeFigureOut">
               <a:rPr lang="nl-NL" smtClean="0"/>
-              <a:t>19-6-2020</a:t>
+              <a:t>20-6-2020</a:t>
             </a:fld>
             <a:endParaRPr lang="nl-NL"/>
           </a:p>
@@ -805,7 +804,7 @@
           <a:p>
             <a:r>
               <a:rPr lang="en-US" dirty="0"/>
-              <a:t>Is it a good idea to put this in the presentation?</a:t>
+              <a:t>Should it be there?</a:t>
             </a:r>
           </a:p>
         </p:txBody>
@@ -827,7 +826,7 @@
           <a:p>
             <a:fld id="{F917F88C-BACD-4A94-B7B7-C91B49D4CB7C}" type="slidenum">
               <a:rPr lang="nl-NL" smtClean="0"/>
-              <a:t>12</a:t>
+              <a:t>8</a:t>
             </a:fld>
             <a:endParaRPr lang="nl-NL"/>
           </a:p>
@@ -836,7 +835,7 @@
     </p:spTree>
     <p:extLst>
       <p:ext uri="{BB962C8B-B14F-4D97-AF65-F5344CB8AC3E}">
-        <p14:creationId xmlns:p14="http://schemas.microsoft.com/office/powerpoint/2010/main" val="2273832958"/>
+        <p14:creationId xmlns:p14="http://schemas.microsoft.com/office/powerpoint/2010/main" val="165521519"/>
       </p:ext>
     </p:extLst>
   </p:cSld>
@@ -930,93 +929,6 @@
     <p:extLst>
       <p:ext uri="{BB962C8B-B14F-4D97-AF65-F5344CB8AC3E}">
         <p14:creationId xmlns:p14="http://schemas.microsoft.com/office/powerpoint/2010/main" val="3617776286"/>
-      </p:ext>
-    </p:extLst>
-  </p:cSld>
-  <p:clrMapOvr>
-    <a:masterClrMapping/>
-  </p:clrMapOvr>
-</p:notes>
-</file>
-
-<file path=ppt/notesSlides/notesSlide6.xml><?xml version="1.0" encoding="utf-8"?>
-<p:notes xmlns:a="http://schemas.openxmlformats.org/drawingml/2006/main" xmlns:r="http://schemas.openxmlformats.org/officeDocument/2006/relationships" xmlns:p="http://schemas.openxmlformats.org/presentationml/2006/main">
-  <p:cSld>
-    <p:spTree>
-      <p:nvGrpSpPr>
-        <p:cNvPr id="1" name=""/>
-        <p:cNvGrpSpPr/>
-        <p:nvPr/>
-      </p:nvGrpSpPr>
-      <p:grpSpPr>
-        <a:xfrm>
-          <a:off x="0" y="0"/>
-          <a:ext cx="0" cy="0"/>
-          <a:chOff x="0" y="0"/>
-          <a:chExt cx="0" cy="0"/>
-        </a:xfrm>
-      </p:grpSpPr>
-      <p:sp>
-        <p:nvSpPr>
-          <p:cNvPr id="2" name="Slide Image Placeholder 1"/>
-          <p:cNvSpPr>
-            <a:spLocks noGrp="1" noRot="1" noChangeAspect="1"/>
-          </p:cNvSpPr>
-          <p:nvPr>
-            <p:ph type="sldImg"/>
-          </p:nvPr>
-        </p:nvSpPr>
-        <p:spPr/>
-      </p:sp>
-      <p:sp>
-        <p:nvSpPr>
-          <p:cNvPr id="3" name="Notes Placeholder 2"/>
-          <p:cNvSpPr>
-            <a:spLocks noGrp="1"/>
-          </p:cNvSpPr>
-          <p:nvPr>
-            <p:ph type="body" idx="1"/>
-          </p:nvPr>
-        </p:nvSpPr>
-        <p:spPr/>
-        <p:txBody>
-          <a:bodyPr/>
-          <a:lstStyle/>
-          <a:p>
-            <a:r>
-              <a:rPr lang="en-US" dirty="0"/>
-              <a:t>Should it be there?</a:t>
-            </a:r>
-          </a:p>
-        </p:txBody>
-      </p:sp>
-      <p:sp>
-        <p:nvSpPr>
-          <p:cNvPr id="4" name="Slide Number Placeholder 3"/>
-          <p:cNvSpPr>
-            <a:spLocks noGrp="1"/>
-          </p:cNvSpPr>
-          <p:nvPr>
-            <p:ph type="sldNum" sz="quarter" idx="5"/>
-          </p:nvPr>
-        </p:nvSpPr>
-        <p:spPr/>
-        <p:txBody>
-          <a:bodyPr/>
-          <a:lstStyle/>
-          <a:p>
-            <a:fld id="{F917F88C-BACD-4A94-B7B7-C91B49D4CB7C}" type="slidenum">
-              <a:rPr lang="nl-NL" smtClean="0"/>
-              <a:t>14</a:t>
-            </a:fld>
-            <a:endParaRPr lang="nl-NL"/>
-          </a:p>
-        </p:txBody>
-      </p:sp>
-    </p:spTree>
-    <p:extLst>
-      <p:ext uri="{BB962C8B-B14F-4D97-AF65-F5344CB8AC3E}">
-        <p14:creationId xmlns:p14="http://schemas.microsoft.com/office/powerpoint/2010/main" val="165521519"/>
       </p:ext>
     </p:extLst>
   </p:cSld>
@@ -1270,7 +1182,7 @@
           <a:p>
             <a:fld id="{9184DA70-C731-4C70-880D-CCD4705E623C}" type="datetime1">
               <a:rPr lang="en-US" smtClean="0"/>
-              <a:t>6/19/2020</a:t>
+              <a:t>6/20/2020</a:t>
             </a:fld>
             <a:endParaRPr lang="en-US" dirty="0"/>
           </a:p>
@@ -1458,7 +1370,7 @@
           <a:p>
             <a:fld id="{4BE1D723-8F53-4F53-90B0-1982A396982E}" type="datetime1">
               <a:rPr lang="en-US" smtClean="0"/>
-              <a:t>6/19/2020</a:t>
+              <a:t>6/20/2020</a:t>
             </a:fld>
             <a:endParaRPr lang="en-US" dirty="0"/>
           </a:p>
@@ -1831,7 +1743,7 @@
           <a:p>
             <a:fld id="{97669AF7-7BEB-44E4-9852-375E34362B5B}" type="datetime1">
               <a:rPr lang="en-US" smtClean="0"/>
-              <a:t>6/19/2020</a:t>
+              <a:t>6/20/2020</a:t>
             </a:fld>
             <a:endParaRPr lang="en-US" dirty="0"/>
           </a:p>
@@ -2086,7 +1998,7 @@
           <a:p>
             <a:fld id="{BAAAC38D-0552-4C82-B593-E6124DFADBE2}" type="datetime1">
               <a:rPr lang="en-US" smtClean="0"/>
-              <a:t>6/19/2020</a:t>
+              <a:t>6/20/2020</a:t>
             </a:fld>
             <a:endParaRPr lang="en-US" dirty="0"/>
           </a:p>
@@ -2483,7 +2395,7 @@
           <a:p>
             <a:fld id="{D9DF0F1C-5577-4ACB-BB62-DF8F3C494C7E}" type="datetime1">
               <a:rPr lang="en-US" smtClean="0"/>
-              <a:t>6/19/2020</a:t>
+              <a:t>6/20/2020</a:t>
             </a:fld>
             <a:endParaRPr lang="en-US" dirty="0"/>
           </a:p>
@@ -2619,7 +2531,7 @@
           <a:p>
             <a:fld id="{1775B394-D9F9-4F0C-B15D-605F45CB9E9F}" type="datetime1">
               <a:rPr lang="en-US" smtClean="0"/>
-              <a:t>6/19/2020</a:t>
+              <a:t>6/20/2020</a:t>
             </a:fld>
             <a:endParaRPr lang="en-US" dirty="0"/>
           </a:p>
@@ -2776,7 +2688,7 @@
           <a:p>
             <a:fld id="{39667345-2558-425A-8533-9BFDBCE15005}" type="datetime1">
               <a:rPr lang="en-US" smtClean="0"/>
-              <a:t>6/19/2020</a:t>
+              <a:t>6/20/2020</a:t>
             </a:fld>
             <a:endParaRPr lang="en-US" dirty="0"/>
           </a:p>
@@ -3105,7 +3017,7 @@
           <a:p>
             <a:fld id="{92BEA474-078D-4E9B-9B14-09A87B19DC46}" type="datetime1">
               <a:rPr lang="en-US" smtClean="0"/>
-              <a:t>6/19/2020</a:t>
+              <a:t>6/20/2020</a:t>
             </a:fld>
             <a:endParaRPr lang="en-US" dirty="0"/>
           </a:p>
@@ -3455,7 +3367,7 @@
           <a:p>
             <a:fld id="{4907D986-8816-4272-A432-0437A28A9828}" type="datetime1">
               <a:rPr lang="en-US" smtClean="0"/>
-              <a:t>6/19/2020</a:t>
+              <a:t>6/20/2020</a:t>
             </a:fld>
             <a:endParaRPr lang="en-US" dirty="0"/>
           </a:p>
@@ -3716,7 +3628,7 @@
           <a:p>
             <a:fld id="{62D6E202-B606-4609-B914-27C9371A1F6D}" type="datetime1">
               <a:rPr lang="en-US" smtClean="0"/>
-              <a:t>6/19/2020</a:t>
+              <a:t>6/20/2020</a:t>
             </a:fld>
             <a:endParaRPr lang="en-US" dirty="0"/>
           </a:p>
@@ -4835,7 +4747,7 @@
           <p:cNvPr id="2" name="Title 1">
             <a:extLst>
               <a:ext uri="{FF2B5EF4-FFF2-40B4-BE49-F238E27FC236}">
-                <a16:creationId xmlns:a16="http://schemas.microsoft.com/office/drawing/2014/main" id="{8BA4C2DD-6E22-274B-8E73-0864CCF300AE}"/>
+                <a16:creationId xmlns:a16="http://schemas.microsoft.com/office/drawing/2014/main" id="{ECC9EA66-DA16-8F4D-85C8-7C1A8AA5E8C0}"/>
               </a:ext>
             </a:extLst>
           </p:cNvPr>
@@ -4853,7 +4765,7 @@
           <a:p>
             <a:r>
               <a:rPr lang="en-US" dirty="0"/>
-              <a:t>Bot</a:t>
+              <a:t>Experiments</a:t>
             </a:r>
           </a:p>
         </p:txBody>
@@ -4863,7 +4775,7 @@
           <p:cNvPr id="3" name="Content Placeholder 2">
             <a:extLst>
               <a:ext uri="{FF2B5EF4-FFF2-40B4-BE49-F238E27FC236}">
-                <a16:creationId xmlns:a16="http://schemas.microsoft.com/office/drawing/2014/main" id="{4E3DCD13-71A0-6B4E-AD41-C79CB8F6CFFC}"/>
+                <a16:creationId xmlns:a16="http://schemas.microsoft.com/office/drawing/2014/main" id="{C9558773-9B13-A84D-89BB-7F3575370622}"/>
               </a:ext>
             </a:extLst>
           </p:cNvPr>
@@ -4881,7 +4793,7 @@
           <a:p>
             <a:r>
               <a:rPr lang="en-US" dirty="0"/>
-              <a:t>- New bot explanation</a:t>
+              <a:t>- TODO</a:t>
             </a:r>
           </a:p>
         </p:txBody>
@@ -4889,7 +4801,7 @@
     </p:spTree>
     <p:extLst>
       <p:ext uri="{BB962C8B-B14F-4D97-AF65-F5344CB8AC3E}">
-        <p14:creationId xmlns:p14="http://schemas.microsoft.com/office/powerpoint/2010/main" val="258929525"/>
+        <p14:creationId xmlns:p14="http://schemas.microsoft.com/office/powerpoint/2010/main" val="233089366"/>
       </p:ext>
     </p:extLst>
   </p:cSld>
@@ -4921,7 +4833,7 @@
           <p:cNvPr id="2" name="Title 1">
             <a:extLst>
               <a:ext uri="{FF2B5EF4-FFF2-40B4-BE49-F238E27FC236}">
-                <a16:creationId xmlns:a16="http://schemas.microsoft.com/office/drawing/2014/main" id="{29F19A6B-CDB2-8D48-97AF-EC9F49EA2578}"/>
+                <a16:creationId xmlns:a16="http://schemas.microsoft.com/office/drawing/2014/main" id="{8BA4C2DD-6E22-274B-8E73-0864CCF300AE}"/>
               </a:ext>
             </a:extLst>
           </p:cNvPr>
@@ -4939,7 +4851,7 @@
           <a:p>
             <a:r>
               <a:rPr lang="en-US" dirty="0"/>
-              <a:t>Experiments</a:t>
+              <a:t>Bot</a:t>
             </a:r>
           </a:p>
         </p:txBody>
@@ -4949,7 +4861,7 @@
           <p:cNvPr id="3" name="Content Placeholder 2">
             <a:extLst>
               <a:ext uri="{FF2B5EF4-FFF2-40B4-BE49-F238E27FC236}">
-                <a16:creationId xmlns:a16="http://schemas.microsoft.com/office/drawing/2014/main" id="{B33325E4-832A-D040-B461-E6D8A517BFF9}"/>
+                <a16:creationId xmlns:a16="http://schemas.microsoft.com/office/drawing/2014/main" id="{4E3DCD13-71A0-6B4E-AD41-C79CB8F6CFFC}"/>
               </a:ext>
             </a:extLst>
           </p:cNvPr>
@@ -4967,7 +4879,7 @@
           <a:p>
             <a:r>
               <a:rPr lang="en-US" dirty="0"/>
-              <a:t>- TODO</a:t>
+              <a:t>- New bot explanation</a:t>
             </a:r>
           </a:p>
         </p:txBody>
@@ -4975,7 +4887,7 @@
     </p:spTree>
     <p:extLst>
       <p:ext uri="{BB962C8B-B14F-4D97-AF65-F5344CB8AC3E}">
-        <p14:creationId xmlns:p14="http://schemas.microsoft.com/office/powerpoint/2010/main" val="3107714555"/>
+        <p14:creationId xmlns:p14="http://schemas.microsoft.com/office/powerpoint/2010/main" val="258929525"/>
       </p:ext>
     </p:extLst>
   </p:cSld>
@@ -5007,7 +4919,7 @@
           <p:cNvPr id="2" name="Title 1">
             <a:extLst>
               <a:ext uri="{FF2B5EF4-FFF2-40B4-BE49-F238E27FC236}">
-                <a16:creationId xmlns:a16="http://schemas.microsoft.com/office/drawing/2014/main" id="{233F2E4A-DE16-334C-9AB7-734725DAC7A5}"/>
+                <a16:creationId xmlns:a16="http://schemas.microsoft.com/office/drawing/2014/main" id="{29F19A6B-CDB2-8D48-97AF-EC9F49EA2578}"/>
               </a:ext>
             </a:extLst>
           </p:cNvPr>
@@ -5025,7 +4937,7 @@
           <a:p>
             <a:r>
               <a:rPr lang="en-US" dirty="0"/>
-              <a:t>UML Diagram</a:t>
+              <a:t>Experiments</a:t>
             </a:r>
           </a:p>
         </p:txBody>
@@ -5035,7 +4947,7 @@
           <p:cNvPr id="3" name="Content Placeholder 2">
             <a:extLst>
               <a:ext uri="{FF2B5EF4-FFF2-40B4-BE49-F238E27FC236}">
-                <a16:creationId xmlns:a16="http://schemas.microsoft.com/office/drawing/2014/main" id="{7169AE04-0E63-2E47-B422-126D340626A6}"/>
+                <a16:creationId xmlns:a16="http://schemas.microsoft.com/office/drawing/2014/main" id="{B33325E4-832A-D040-B461-E6D8A517BFF9}"/>
               </a:ext>
             </a:extLst>
           </p:cNvPr>
@@ -5053,7 +4965,7 @@
           <a:p>
             <a:r>
               <a:rPr lang="en-US" dirty="0"/>
-              <a:t>- Should we do it?</a:t>
+              <a:t>- TODO</a:t>
             </a:r>
           </a:p>
         </p:txBody>
@@ -5061,7 +4973,7 @@
     </p:spTree>
     <p:extLst>
       <p:ext uri="{BB962C8B-B14F-4D97-AF65-F5344CB8AC3E}">
-        <p14:creationId xmlns:p14="http://schemas.microsoft.com/office/powerpoint/2010/main" val="3577463860"/>
+        <p14:creationId xmlns:p14="http://schemas.microsoft.com/office/powerpoint/2010/main" val="3107714555"/>
       </p:ext>
     </p:extLst>
   </p:cSld>
@@ -5179,89 +5091,6 @@
           <p:cNvPr id="2" name="Title 1">
             <a:extLst>
               <a:ext uri="{FF2B5EF4-FFF2-40B4-BE49-F238E27FC236}">
-                <a16:creationId xmlns:a16="http://schemas.microsoft.com/office/drawing/2014/main" id="{538E8784-9CE9-174F-9AB5-4FEC4AC283AA}"/>
-              </a:ext>
-            </a:extLst>
-          </p:cNvPr>
-          <p:cNvSpPr>
-            <a:spLocks noGrp="1"/>
-          </p:cNvSpPr>
-          <p:nvPr>
-            <p:ph type="title"/>
-          </p:nvPr>
-        </p:nvSpPr>
-        <p:spPr/>
-        <p:txBody>
-          <a:bodyPr/>
-          <a:lstStyle/>
-          <a:p>
-            <a:r>
-              <a:rPr lang="en-US" dirty="0"/>
-              <a:t>Save Loader system?</a:t>
-            </a:r>
-          </a:p>
-        </p:txBody>
-      </p:sp>
-      <p:sp>
-        <p:nvSpPr>
-          <p:cNvPr id="3" name="Content Placeholder 2">
-            <a:extLst>
-              <a:ext uri="{FF2B5EF4-FFF2-40B4-BE49-F238E27FC236}">
-                <a16:creationId xmlns:a16="http://schemas.microsoft.com/office/drawing/2014/main" id="{D3334042-A589-C447-8CB7-3178BDCCFAEA}"/>
-              </a:ext>
-            </a:extLst>
-          </p:cNvPr>
-          <p:cNvSpPr>
-            <a:spLocks noGrp="1"/>
-          </p:cNvSpPr>
-          <p:nvPr>
-            <p:ph idx="1"/>
-          </p:nvPr>
-        </p:nvSpPr>
-        <p:spPr/>
-        <p:txBody>
-          <a:bodyPr/>
-          <a:lstStyle/>
-          <a:p>
-            <a:endParaRPr lang="en-US" dirty="0"/>
-          </a:p>
-        </p:txBody>
-      </p:sp>
-    </p:spTree>
-    <p:extLst>
-      <p:ext uri="{BB962C8B-B14F-4D97-AF65-F5344CB8AC3E}">
-        <p14:creationId xmlns:p14="http://schemas.microsoft.com/office/powerpoint/2010/main" val="3411105790"/>
-      </p:ext>
-    </p:extLst>
-  </p:cSld>
-  <p:clrMapOvr>
-    <a:masterClrMapping/>
-  </p:clrMapOvr>
-</p:sld>
-</file>
-
-<file path=ppt/slides/slide15.xml><?xml version="1.0" encoding="utf-8"?>
-<p:sld xmlns:a="http://schemas.openxmlformats.org/drawingml/2006/main" xmlns:r="http://schemas.openxmlformats.org/officeDocument/2006/relationships" xmlns:p="http://schemas.openxmlformats.org/presentationml/2006/main">
-  <p:cSld>
-    <p:spTree>
-      <p:nvGrpSpPr>
-        <p:cNvPr id="1" name=""/>
-        <p:cNvGrpSpPr/>
-        <p:nvPr/>
-      </p:nvGrpSpPr>
-      <p:grpSpPr>
-        <a:xfrm>
-          <a:off x="0" y="0"/>
-          <a:ext cx="0" cy="0"/>
-          <a:chOff x="0" y="0"/>
-          <a:chExt cx="0" cy="0"/>
-        </a:xfrm>
-      </p:grpSpPr>
-      <p:sp>
-        <p:nvSpPr>
-          <p:cNvPr id="2" name="Title 1">
-            <a:extLst>
-              <a:ext uri="{FF2B5EF4-FFF2-40B4-BE49-F238E27FC236}">
                 <a16:creationId xmlns:a16="http://schemas.microsoft.com/office/drawing/2014/main" id="{AE509FE0-01FE-484D-9253-00E27C5034A6}"/>
               </a:ext>
             </a:extLst>
@@ -5323,7 +5152,7 @@
 </p:sld>
 </file>
 
-<file path=ppt/slides/slide16.xml><?xml version="1.0" encoding="utf-8"?>
+<file path=ppt/slides/slide15.xml><?xml version="1.0" encoding="utf-8"?>
 <p:sld xmlns:a="http://schemas.openxmlformats.org/drawingml/2006/main" xmlns:r="http://schemas.openxmlformats.org/officeDocument/2006/relationships" xmlns:p="http://schemas.openxmlformats.org/presentationml/2006/main">
   <p:cSld>
     <p:spTree>
@@ -7108,7 +6937,7 @@
           <p:cNvPr id="2" name="Title 1">
             <a:extLst>
               <a:ext uri="{FF2B5EF4-FFF2-40B4-BE49-F238E27FC236}">
-                <a16:creationId xmlns:a16="http://schemas.microsoft.com/office/drawing/2014/main" id="{200E7CE6-2441-3C46-9FC0-54953D57A541}"/>
+                <a16:creationId xmlns:a16="http://schemas.microsoft.com/office/drawing/2014/main" id="{538E8784-9CE9-174F-9AB5-4FEC4AC283AA}"/>
               </a:ext>
             </a:extLst>
           </p:cNvPr>
@@ -7125,50 +6954,192 @@
           <a:lstStyle/>
           <a:p>
             <a:r>
-              <a:rPr lang="en-US" dirty="0"/>
-              <a:t>Physics</a:t>
-            </a:r>
-          </a:p>
-        </p:txBody>
-      </p:sp>
-      <p:sp>
-        <p:nvSpPr>
-          <p:cNvPr id="3" name="Content Placeholder 2">
-            <a:extLst>
-              <a:ext uri="{FF2B5EF4-FFF2-40B4-BE49-F238E27FC236}">
-                <a16:creationId xmlns:a16="http://schemas.microsoft.com/office/drawing/2014/main" id="{08FF44B2-D01F-164B-9336-71FB8412FC79}"/>
-              </a:ext>
-            </a:extLst>
-          </p:cNvPr>
-          <p:cNvSpPr>
-            <a:spLocks noGrp="1"/>
-          </p:cNvSpPr>
+              <a:rPr lang="en-US"/>
+              <a:t>Live saving and loading</a:t>
+            </a:r>
+            <a:endParaRPr lang="en-US" dirty="0"/>
+          </a:p>
+        </p:txBody>
+      </p:sp>
+      <p:pic>
+        <p:nvPicPr>
+          <p:cNvPr id="7" name="Online Media 6" title="Live save and load system 2x speed">
+            <a:hlinkClick r:id="" action="ppaction://media"/>
+            <a:extLst>
+              <a:ext uri="{FF2B5EF4-FFF2-40B4-BE49-F238E27FC236}">
+                <a16:creationId xmlns:a16="http://schemas.microsoft.com/office/drawing/2014/main" id="{CD8E8929-E429-4C84-954C-3C03DD6DDDD3}"/>
+              </a:ext>
+            </a:extLst>
+          </p:cNvPr>
+          <p:cNvPicPr>
+            <a:picLocks noGrp="1" noRot="1" noChangeAspect="1"/>
+          </p:cNvPicPr>
           <p:nvPr>
             <p:ph idx="1"/>
-          </p:nvPr>
-        </p:nvSpPr>
-        <p:spPr/>
-        <p:txBody>
-          <a:bodyPr/>
-          <a:lstStyle/>
-          <a:p>
-            <a:r>
-              <a:rPr lang="en-US" dirty="0"/>
-              <a:t>- Flying balls explanation by Matthijs the genius</a:t>
-            </a:r>
-          </a:p>
-        </p:txBody>
-      </p:sp>
+            <a:videoFile r:link="rId1"/>
+          </p:nvPr>
+        </p:nvPicPr>
+        <p:blipFill>
+          <a:blip r:embed="rId4"/>
+          <a:stretch>
+            <a:fillRect/>
+          </a:stretch>
+        </p:blipFill>
+        <p:spPr>
+          <a:xfrm>
+            <a:off x="2782888" y="2108200"/>
+            <a:ext cx="6686550" cy="3760788"/>
+          </a:xfrm>
+          <a:prstGeom prst="rect">
+            <a:avLst/>
+          </a:prstGeom>
+        </p:spPr>
+      </p:pic>
     </p:spTree>
     <p:extLst>
       <p:ext uri="{BB962C8B-B14F-4D97-AF65-F5344CB8AC3E}">
-        <p14:creationId xmlns:p14="http://schemas.microsoft.com/office/powerpoint/2010/main" val="1901925188"/>
+        <p14:creationId xmlns:p14="http://schemas.microsoft.com/office/powerpoint/2010/main" val="3411105790"/>
       </p:ext>
     </p:extLst>
   </p:cSld>
   <p:clrMapOvr>
     <a:masterClrMapping/>
   </p:clrMapOvr>
+  <p:timing>
+    <p:tnLst>
+      <p:par>
+        <p:cTn id="1" dur="indefinite" restart="never" nodeType="tmRoot">
+          <p:childTnLst>
+            <p:seq concurrent="1" nextAc="seek">
+              <p:cTn id="2" dur="indefinite" nodeType="mainSeq">
+                <p:childTnLst>
+                  <p:par>
+                    <p:cTn id="3" fill="hold">
+                      <p:stCondLst>
+                        <p:cond delay="indefinite"/>
+                      </p:stCondLst>
+                      <p:childTnLst>
+                        <p:par>
+                          <p:cTn id="4" fill="hold">
+                            <p:stCondLst>
+                              <p:cond delay="0"/>
+                            </p:stCondLst>
+                            <p:childTnLst>
+                              <p:par>
+                                <p:cTn id="5" presetID="1" presetClass="mediacall" presetSubtype="0" fill="hold" nodeType="clickEffect">
+                                  <p:stCondLst>
+                                    <p:cond delay="0"/>
+                                  </p:stCondLst>
+                                  <p:childTnLst>
+                                    <p:cmd type="call" cmd="playFrom(0.0)">
+                                      <p:cBhvr>
+                                        <p:cTn id="6" dur="1" fill="hold"/>
+                                        <p:tgtEl>
+                                          <p:spTgt spid="7"/>
+                                        </p:tgtEl>
+                                      </p:cBhvr>
+                                    </p:cmd>
+                                  </p:childTnLst>
+                                </p:cTn>
+                              </p:par>
+                            </p:childTnLst>
+                          </p:cTn>
+                        </p:par>
+                      </p:childTnLst>
+                    </p:cTn>
+                  </p:par>
+                </p:childTnLst>
+              </p:cTn>
+              <p:prevCondLst>
+                <p:cond evt="onPrev" delay="0">
+                  <p:tgtEl>
+                    <p:sldTgt/>
+                  </p:tgtEl>
+                </p:cond>
+              </p:prevCondLst>
+              <p:nextCondLst>
+                <p:cond evt="onNext" delay="0">
+                  <p:tgtEl>
+                    <p:sldTgt/>
+                  </p:tgtEl>
+                </p:cond>
+              </p:nextCondLst>
+            </p:seq>
+            <p:video>
+              <p:cMediaNode vol="80000">
+                <p:cTn id="7" fill="hold" display="0">
+                  <p:stCondLst>
+                    <p:cond delay="indefinite"/>
+                  </p:stCondLst>
+                </p:cTn>
+                <p:tgtEl>
+                  <p:spTgt spid="7"/>
+                </p:tgtEl>
+              </p:cMediaNode>
+            </p:video>
+            <p:seq concurrent="1" nextAc="seek">
+              <p:cTn id="8" restart="whenNotActive" fill="hold" evtFilter="cancelBubble" nodeType="interactiveSeq">
+                <p:stCondLst>
+                  <p:cond evt="onClick" delay="0">
+                    <p:tgtEl>
+                      <p:spTgt spid="7"/>
+                    </p:tgtEl>
+                  </p:cond>
+                </p:stCondLst>
+                <p:endSync evt="end" delay="0">
+                  <p:rtn val="all"/>
+                </p:endSync>
+                <p:childTnLst>
+                  <p:par>
+                    <p:cTn id="9" fill="hold">
+                      <p:stCondLst>
+                        <p:cond delay="0"/>
+                      </p:stCondLst>
+                      <p:childTnLst>
+                        <p:par>
+                          <p:cTn id="10" fill="hold">
+                            <p:stCondLst>
+                              <p:cond delay="0"/>
+                            </p:stCondLst>
+                            <p:childTnLst>
+                              <p:par>
+                                <p:cTn id="11" presetID="2" presetClass="mediacall" presetSubtype="0" fill="hold" nodeType="clickEffect">
+                                  <p:stCondLst>
+                                    <p:cond delay="0"/>
+                                  </p:stCondLst>
+                                  <p:childTnLst>
+                                    <p:cmd type="call" cmd="togglePause">
+                                      <p:cBhvr>
+                                        <p:cTn id="12" dur="1" fill="hold"/>
+                                        <p:tgtEl>
+                                          <p:spTgt spid="7"/>
+                                        </p:tgtEl>
+                                      </p:cBhvr>
+                                    </p:cmd>
+                                  </p:childTnLst>
+                                </p:cTn>
+                              </p:par>
+                            </p:childTnLst>
+                          </p:cTn>
+                        </p:par>
+                      </p:childTnLst>
+                    </p:cTn>
+                  </p:par>
+                </p:childTnLst>
+              </p:cTn>
+              <p:nextCondLst>
+                <p:cond evt="onClick" delay="0">
+                  <p:tgtEl>
+                    <p:spTgt spid="7"/>
+                  </p:tgtEl>
+                </p:cond>
+              </p:nextCondLst>
+            </p:seq>
+          </p:childTnLst>
+        </p:cTn>
+      </p:par>
+    </p:tnLst>
+  </p:timing>
 </p:sld>
 </file>
 
@@ -7194,7 +7165,7 @@
           <p:cNvPr id="2" name="Title 1">
             <a:extLst>
               <a:ext uri="{FF2B5EF4-FFF2-40B4-BE49-F238E27FC236}">
-                <a16:creationId xmlns:a16="http://schemas.microsoft.com/office/drawing/2014/main" id="{ECC9EA66-DA16-8F4D-85C8-7C1A8AA5E8C0}"/>
+                <a16:creationId xmlns:a16="http://schemas.microsoft.com/office/drawing/2014/main" id="{200E7CE6-2441-3C46-9FC0-54953D57A541}"/>
               </a:ext>
             </a:extLst>
           </p:cNvPr>
@@ -7212,7 +7183,7 @@
           <a:p>
             <a:r>
               <a:rPr lang="en-US" dirty="0"/>
-              <a:t>Experiments</a:t>
+              <a:t>Physics</a:t>
             </a:r>
           </a:p>
         </p:txBody>
@@ -7222,7 +7193,7 @@
           <p:cNvPr id="3" name="Content Placeholder 2">
             <a:extLst>
               <a:ext uri="{FF2B5EF4-FFF2-40B4-BE49-F238E27FC236}">
-                <a16:creationId xmlns:a16="http://schemas.microsoft.com/office/drawing/2014/main" id="{C9558773-9B13-A84D-89BB-7F3575370622}"/>
+                <a16:creationId xmlns:a16="http://schemas.microsoft.com/office/drawing/2014/main" id="{08FF44B2-D01F-164B-9336-71FB8412FC79}"/>
               </a:ext>
             </a:extLst>
           </p:cNvPr>
@@ -7240,7 +7211,7 @@
           <a:p>
             <a:r>
               <a:rPr lang="en-US" dirty="0"/>
-              <a:t>- TODO</a:t>
+              <a:t>- Flying balls explanation by Matthijs the genius</a:t>
             </a:r>
           </a:p>
         </p:txBody>
@@ -7248,7 +7219,7 @@
     </p:spTree>
     <p:extLst>
       <p:ext uri="{BB962C8B-B14F-4D97-AF65-F5344CB8AC3E}">
-        <p14:creationId xmlns:p14="http://schemas.microsoft.com/office/powerpoint/2010/main" val="233089366"/>
+        <p14:creationId xmlns:p14="http://schemas.microsoft.com/office/powerpoint/2010/main" val="1901925188"/>
       </p:ext>
     </p:extLst>
   </p:cSld>
@@ -8101,21 +8072,21 @@
 </file>
 
 <file path=customXml/item2.xml><?xml version="1.0" encoding="utf-8"?>
+<?mso-contentType ?>
+<FormTemplates xmlns="http://schemas.microsoft.com/sharepoint/v3/contenttype/forms">
+  <Display>DocumentLibraryForm</Display>
+  <Edit>DocumentLibraryForm</Edit>
+  <New>DocumentLibraryForm</New>
+</FormTemplates>
+</file>
+
+<file path=customXml/item3.xml><?xml version="1.0" encoding="utf-8"?>
 <p:properties xmlns:p="http://schemas.microsoft.com/office/2006/metadata/properties" xmlns:xsi="http://www.w3.org/2001/XMLSchema-instance" xmlns:pc="http://schemas.microsoft.com/office/infopath/2007/PartnerControls">
   <documentManagement>
     <Status xmlns="71af3243-3dd4-4a8d-8c0d-dd76da1f02a5">Not started</Status>
     <MediaServiceKeyPoints xmlns="71af3243-3dd4-4a8d-8c0d-dd76da1f02a5" xsi:nil="true"/>
   </documentManagement>
 </p:properties>
-</file>
-
-<file path=customXml/item3.xml><?xml version="1.0" encoding="utf-8"?>
-<?mso-contentType ?>
-<FormTemplates xmlns="http://schemas.microsoft.com/sharepoint/v3/contenttype/forms">
-  <Display>DocumentLibraryForm</Display>
-  <Edit>DocumentLibraryForm</Edit>
-  <New>DocumentLibraryForm</New>
-</FormTemplates>
 </file>
 
 <file path=customXml/itemProps1.xml><?xml version="1.0" encoding="utf-8"?>
@@ -8138,6 +8109,14 @@
 </file>
 
 <file path=customXml/itemProps2.xml><?xml version="1.0" encoding="utf-8"?>
+<ds:datastoreItem xmlns:ds="http://schemas.openxmlformats.org/officeDocument/2006/customXml" ds:itemID="{3C586965-D4BF-4605-8C1C-5B8CCCAB7737}">
+  <ds:schemaRefs>
+    <ds:schemaRef ds:uri="http://schemas.microsoft.com/sharepoint/v3/contenttype/forms"/>
+  </ds:schemaRefs>
+</ds:datastoreItem>
+</file>
+
+<file path=customXml/itemProps3.xml><?xml version="1.0" encoding="utf-8"?>
 <ds:datastoreItem xmlns:ds="http://schemas.openxmlformats.org/officeDocument/2006/customXml" ds:itemID="{626E351D-C19B-467F-A5C7-085C4CECACA9}">
   <ds:schemaRefs>
     <ds:schemaRef ds:uri="http://schemas.microsoft.com/office/2006/metadata/properties"/>
@@ -8145,12 +8124,4 @@
     <ds:schemaRef ds:uri="71af3243-3dd4-4a8d-8c0d-dd76da1f02a5"/>
   </ds:schemaRefs>
 </ds:datastoreItem>
-</file>
-
-<file path=customXml/itemProps3.xml><?xml version="1.0" encoding="utf-8"?>
-<ds:datastoreItem xmlns:ds="http://schemas.openxmlformats.org/officeDocument/2006/customXml" ds:itemID="{3C586965-D4BF-4605-8C1C-5B8CCCAB7737}">
-  <ds:schemaRefs>
-    <ds:schemaRef ds:uri="http://schemas.microsoft.com/sharepoint/v3/contenttype/forms"/>
-  </ds:schemaRefs>
-</ds:datastoreItem>
 </file>
</xml_diff>

<commit_message>
Updated slides, added sources and questions page
</commit_message>
<xml_diff>
--- a/04-PresentationThirdPhase.pptx
+++ b/04-PresentationThirdPhase.pptx
@@ -20,9 +20,9 @@
     <p:sldId id="319" r:id="rId14"/>
     <p:sldId id="313" r:id="rId15"/>
     <p:sldId id="320" r:id="rId16"/>
-    <p:sldId id="317" r:id="rId17"/>
-    <p:sldId id="322" r:id="rId18"/>
-    <p:sldId id="324" r:id="rId19"/>
+    <p:sldId id="322" r:id="rId17"/>
+    <p:sldId id="324" r:id="rId18"/>
+    <p:sldId id="327" r:id="rId19"/>
   </p:sldIdLst>
   <p:sldSz cx="12192000" cy="6858000"/>
   <p:notesSz cx="6858000" cy="9144000"/>
@@ -718,7 +718,7 @@
           <a:bodyPr/>
           <a:lstStyle/>
           <a:p>
-            <a:endParaRPr lang="nl-NL"/>
+            <a:endParaRPr lang="nl-NL" dirty="0"/>
           </a:p>
         </p:txBody>
       </p:sp>
@@ -739,7 +739,7 @@
           <a:p>
             <a:fld id="{F917F88C-BACD-4A94-B7B7-C91B49D4CB7C}" type="slidenum">
               <a:rPr lang="nl-NL" smtClean="0"/>
-              <a:t>7</a:t>
+              <a:t>4</a:t>
             </a:fld>
             <a:endParaRPr lang="nl-NL"/>
           </a:p>
@@ -748,7 +748,7 @@
     </p:spTree>
     <p:extLst>
       <p:ext uri="{BB962C8B-B14F-4D97-AF65-F5344CB8AC3E}">
-        <p14:creationId xmlns:p14="http://schemas.microsoft.com/office/powerpoint/2010/main" val="2118906966"/>
+        <p14:creationId xmlns:p14="http://schemas.microsoft.com/office/powerpoint/2010/main" val="393441275"/>
       </p:ext>
     </p:extLst>
   </p:cSld>
@@ -802,10 +802,7 @@
           <a:bodyPr/>
           <a:lstStyle/>
           <a:p>
-            <a:r>
-              <a:rPr lang="en-US" dirty="0"/>
-              <a:t>Should it be there?</a:t>
-            </a:r>
+            <a:endParaRPr lang="nl-NL"/>
           </a:p>
         </p:txBody>
       </p:sp>
@@ -826,7 +823,7 @@
           <a:p>
             <a:fld id="{F917F88C-BACD-4A94-B7B7-C91B49D4CB7C}" type="slidenum">
               <a:rPr lang="nl-NL" smtClean="0"/>
-              <a:t>8</a:t>
+              <a:t>7</a:t>
             </a:fld>
             <a:endParaRPr lang="nl-NL"/>
           </a:p>
@@ -835,7 +832,7 @@
     </p:spTree>
     <p:extLst>
       <p:ext uri="{BB962C8B-B14F-4D97-AF65-F5344CB8AC3E}">
-        <p14:creationId xmlns:p14="http://schemas.microsoft.com/office/powerpoint/2010/main" val="165521519"/>
+        <p14:creationId xmlns:p14="http://schemas.microsoft.com/office/powerpoint/2010/main" val="2118906966"/>
       </p:ext>
     </p:extLst>
   </p:cSld>
@@ -891,13 +888,7 @@
           <a:p>
             <a:r>
               <a:rPr lang="en-US" dirty="0"/>
-              <a:t>Since it was one of the requirements for this phase I think we should talk about it.</a:t>
-            </a:r>
-          </a:p>
-          <a:p>
-            <a:r>
-              <a:rPr lang="en-US" dirty="0"/>
-              <a:t>Placement of the slide to check. </a:t>
+              <a:t>Should it be there?</a:t>
             </a:r>
           </a:p>
         </p:txBody>
@@ -919,7 +910,7 @@
           <a:p>
             <a:fld id="{F917F88C-BACD-4A94-B7B7-C91B49D4CB7C}" type="slidenum">
               <a:rPr lang="nl-NL" smtClean="0"/>
-              <a:t>13</a:t>
+              <a:t>8</a:t>
             </a:fld>
             <a:endParaRPr lang="nl-NL"/>
           </a:p>
@@ -928,7 +919,91 @@
     </p:spTree>
     <p:extLst>
       <p:ext uri="{BB962C8B-B14F-4D97-AF65-F5344CB8AC3E}">
-        <p14:creationId xmlns:p14="http://schemas.microsoft.com/office/powerpoint/2010/main" val="3617776286"/>
+        <p14:creationId xmlns:p14="http://schemas.microsoft.com/office/powerpoint/2010/main" val="165521519"/>
+      </p:ext>
+    </p:extLst>
+  </p:cSld>
+  <p:clrMapOvr>
+    <a:masterClrMapping/>
+  </p:clrMapOvr>
+</p:notes>
+</file>
+
+<file path=ppt/notesSlides/notesSlide6.xml><?xml version="1.0" encoding="utf-8"?>
+<p:notes xmlns:a="http://schemas.openxmlformats.org/drawingml/2006/main" xmlns:r="http://schemas.openxmlformats.org/officeDocument/2006/relationships" xmlns:p="http://schemas.openxmlformats.org/presentationml/2006/main">
+  <p:cSld>
+    <p:spTree>
+      <p:nvGrpSpPr>
+        <p:cNvPr id="1" name=""/>
+        <p:cNvGrpSpPr/>
+        <p:nvPr/>
+      </p:nvGrpSpPr>
+      <p:grpSpPr>
+        <a:xfrm>
+          <a:off x="0" y="0"/>
+          <a:ext cx="0" cy="0"/>
+          <a:chOff x="0" y="0"/>
+          <a:chExt cx="0" cy="0"/>
+        </a:xfrm>
+      </p:grpSpPr>
+      <p:sp>
+        <p:nvSpPr>
+          <p:cNvPr id="2" name="Slide Image Placeholder 1"/>
+          <p:cNvSpPr>
+            <a:spLocks noGrp="1" noRot="1" noChangeAspect="1"/>
+          </p:cNvSpPr>
+          <p:nvPr>
+            <p:ph type="sldImg"/>
+          </p:nvPr>
+        </p:nvSpPr>
+        <p:spPr/>
+      </p:sp>
+      <p:sp>
+        <p:nvSpPr>
+          <p:cNvPr id="3" name="Notes Placeholder 2"/>
+          <p:cNvSpPr>
+            <a:spLocks noGrp="1"/>
+          </p:cNvSpPr>
+          <p:nvPr>
+            <p:ph type="body" idx="1"/>
+          </p:nvPr>
+        </p:nvSpPr>
+        <p:spPr/>
+        <p:txBody>
+          <a:bodyPr/>
+          <a:lstStyle/>
+          <a:p>
+            <a:endParaRPr lang="nl-NL"/>
+          </a:p>
+        </p:txBody>
+      </p:sp>
+      <p:sp>
+        <p:nvSpPr>
+          <p:cNvPr id="4" name="Slide Number Placeholder 3"/>
+          <p:cNvSpPr>
+            <a:spLocks noGrp="1"/>
+          </p:cNvSpPr>
+          <p:nvPr>
+            <p:ph type="sldNum" sz="quarter" idx="5"/>
+          </p:nvPr>
+        </p:nvSpPr>
+        <p:spPr/>
+        <p:txBody>
+          <a:bodyPr/>
+          <a:lstStyle/>
+          <a:p>
+            <a:fld id="{F917F88C-BACD-4A94-B7B7-C91B49D4CB7C}" type="slidenum">
+              <a:rPr lang="nl-NL" smtClean="0"/>
+              <a:t>9</a:t>
+            </a:fld>
+            <a:endParaRPr lang="nl-NL"/>
+          </a:p>
+        </p:txBody>
+      </p:sp>
+    </p:spTree>
+    <p:extLst>
+      <p:ext uri="{BB962C8B-B14F-4D97-AF65-F5344CB8AC3E}">
+        <p14:creationId xmlns:p14="http://schemas.microsoft.com/office/powerpoint/2010/main" val="3094949380"/>
       </p:ext>
     </p:extLst>
   </p:cSld>
@@ -5005,7 +5080,7 @@
           <p:cNvPr id="2" name="Title 1">
             <a:extLst>
               <a:ext uri="{FF2B5EF4-FFF2-40B4-BE49-F238E27FC236}">
-                <a16:creationId xmlns:a16="http://schemas.microsoft.com/office/drawing/2014/main" id="{5CA11336-2D88-4A4E-B47F-30DEE9950B8E}"/>
+                <a16:creationId xmlns:a16="http://schemas.microsoft.com/office/drawing/2014/main" id="{AE509FE0-01FE-484D-9253-00E27C5034A6}"/>
               </a:ext>
             </a:extLst>
           </p:cNvPr>
@@ -5023,7 +5098,7 @@
           <a:p>
             <a:r>
               <a:rPr lang="en-US" dirty="0"/>
-              <a:t>Collision Detection?</a:t>
+              <a:t>Conclusion</a:t>
             </a:r>
           </a:p>
         </p:txBody>
@@ -5033,7 +5108,7 @@
           <p:cNvPr id="3" name="Content Placeholder 2">
             <a:extLst>
               <a:ext uri="{FF2B5EF4-FFF2-40B4-BE49-F238E27FC236}">
-                <a16:creationId xmlns:a16="http://schemas.microsoft.com/office/drawing/2014/main" id="{9AB3564E-A875-EA49-BF49-EEECA8BF23BB}"/>
+                <a16:creationId xmlns:a16="http://schemas.microsoft.com/office/drawing/2014/main" id="{89B654AC-0CDE-8E40-85E6-B44275F7D14F}"/>
               </a:ext>
             </a:extLst>
           </p:cNvPr>
@@ -5049,17 +5124,14 @@
           <a:bodyPr/>
           <a:lstStyle/>
           <a:p>
-            <a:r>
-              <a:rPr lang="en-US" dirty="0"/>
-              <a:t>- TODO</a:t>
-            </a:r>
+            <a:endParaRPr lang="en-US"/>
           </a:p>
         </p:txBody>
       </p:sp>
     </p:spTree>
     <p:extLst>
       <p:ext uri="{BB962C8B-B14F-4D97-AF65-F5344CB8AC3E}">
-        <p14:creationId xmlns:p14="http://schemas.microsoft.com/office/powerpoint/2010/main" val="1886375000"/>
+        <p14:creationId xmlns:p14="http://schemas.microsoft.com/office/powerpoint/2010/main" val="2578131005"/>
       </p:ext>
     </p:extLst>
   </p:cSld>
@@ -5091,7 +5163,7 @@
           <p:cNvPr id="2" name="Title 1">
             <a:extLst>
               <a:ext uri="{FF2B5EF4-FFF2-40B4-BE49-F238E27FC236}">
-                <a16:creationId xmlns:a16="http://schemas.microsoft.com/office/drawing/2014/main" id="{AE509FE0-01FE-484D-9253-00E27C5034A6}"/>
+                <a16:creationId xmlns:a16="http://schemas.microsoft.com/office/drawing/2014/main" id="{829E259F-FE68-4055-B7BD-1312721101B5}"/>
               </a:ext>
             </a:extLst>
           </p:cNvPr>
@@ -5109,8 +5181,9 @@
           <a:p>
             <a:r>
               <a:rPr lang="en-US" dirty="0"/>
-              <a:t>Conclusion</a:t>
-            </a:r>
+              <a:t>Questions</a:t>
+            </a:r>
+            <a:endParaRPr lang="nl-NL" dirty="0"/>
           </a:p>
         </p:txBody>
       </p:sp>
@@ -5119,7 +5192,7 @@
           <p:cNvPr id="3" name="Content Placeholder 2">
             <a:extLst>
               <a:ext uri="{FF2B5EF4-FFF2-40B4-BE49-F238E27FC236}">
-                <a16:creationId xmlns:a16="http://schemas.microsoft.com/office/drawing/2014/main" id="{89B654AC-0CDE-8E40-85E6-B44275F7D14F}"/>
+                <a16:creationId xmlns:a16="http://schemas.microsoft.com/office/drawing/2014/main" id="{C9B3192F-3F18-48D2-9AD9-5FB803B1B522}"/>
               </a:ext>
             </a:extLst>
           </p:cNvPr>
@@ -5135,14 +5208,14 @@
           <a:bodyPr/>
           <a:lstStyle/>
           <a:p>
-            <a:endParaRPr lang="en-US"/>
+            <a:endParaRPr lang="nl-NL"/>
           </a:p>
         </p:txBody>
       </p:sp>
     </p:spTree>
     <p:extLst>
       <p:ext uri="{BB962C8B-B14F-4D97-AF65-F5344CB8AC3E}">
-        <p14:creationId xmlns:p14="http://schemas.microsoft.com/office/powerpoint/2010/main" val="2578131005"/>
+        <p14:creationId xmlns:p14="http://schemas.microsoft.com/office/powerpoint/2010/main" val="566507608"/>
       </p:ext>
     </p:extLst>
   </p:cSld>
@@ -5174,7 +5247,7 @@
           <p:cNvPr id="2" name="Title 1">
             <a:extLst>
               <a:ext uri="{FF2B5EF4-FFF2-40B4-BE49-F238E27FC236}">
-                <a16:creationId xmlns:a16="http://schemas.microsoft.com/office/drawing/2014/main" id="{829E259F-FE68-4055-B7BD-1312721101B5}"/>
+                <a16:creationId xmlns:a16="http://schemas.microsoft.com/office/drawing/2014/main" id="{83CB4DD8-CB42-424F-9E5A-2FDB23B37659}"/>
               </a:ext>
             </a:extLst>
           </p:cNvPr>
@@ -5190,7 +5263,11 @@
           <a:bodyPr/>
           <a:lstStyle/>
           <a:p>
-            <a:endParaRPr lang="nl-NL"/>
+            <a:r>
+              <a:rPr lang="en-US" dirty="0"/>
+              <a:t>Sources</a:t>
+            </a:r>
+            <a:endParaRPr lang="nl-NL" dirty="0"/>
           </a:p>
         </p:txBody>
       </p:sp>
@@ -5199,7 +5276,7 @@
           <p:cNvPr id="3" name="Content Placeholder 2">
             <a:extLst>
               <a:ext uri="{FF2B5EF4-FFF2-40B4-BE49-F238E27FC236}">
-                <a16:creationId xmlns:a16="http://schemas.microsoft.com/office/drawing/2014/main" id="{C9B3192F-3F18-48D2-9AD9-5FB803B1B522}"/>
+                <a16:creationId xmlns:a16="http://schemas.microsoft.com/office/drawing/2014/main" id="{5482C07E-4C00-4318-851C-0ABA7BC3E702}"/>
               </a:ext>
             </a:extLst>
           </p:cNvPr>
@@ -5215,14 +5292,14 @@
           <a:bodyPr/>
           <a:lstStyle/>
           <a:p>
-            <a:endParaRPr lang="nl-NL"/>
+            <a:endParaRPr lang="nl-NL" dirty="0"/>
           </a:p>
         </p:txBody>
       </p:sp>
     </p:spTree>
     <p:extLst>
       <p:ext uri="{BB962C8B-B14F-4D97-AF65-F5344CB8AC3E}">
-        <p14:creationId xmlns:p14="http://schemas.microsoft.com/office/powerpoint/2010/main" val="566507608"/>
+        <p14:creationId xmlns:p14="http://schemas.microsoft.com/office/powerpoint/2010/main" val="1912911425"/>
       </p:ext>
     </p:extLst>
   </p:cSld>
@@ -5348,6 +5425,14 @@
 <file path=ppt/slides/slide3.xml><?xml version="1.0" encoding="utf-8"?>
 <p:sld xmlns:a="http://schemas.openxmlformats.org/drawingml/2006/main" xmlns:r="http://schemas.openxmlformats.org/officeDocument/2006/relationships" xmlns:p="http://schemas.openxmlformats.org/presentationml/2006/main">
   <p:cSld>
+    <p:bg>
+      <p:bgPr>
+        <a:solidFill>
+          <a:schemeClr val="bg1"/>
+        </a:solidFill>
+        <a:effectLst/>
+      </p:bgPr>
+    </p:bg>
     <p:spTree>
       <p:nvGrpSpPr>
         <p:cNvPr id="1" name=""/>
@@ -5362,6 +5447,66 @@
           <a:chExt cx="0" cy="0"/>
         </a:xfrm>
       </p:grpSpPr>
+      <p:sp useBgFill="1">
+        <p:nvSpPr>
+          <p:cNvPr id="8" name="Rectangle 7">
+            <a:extLst>
+              <a:ext uri="{FF2B5EF4-FFF2-40B4-BE49-F238E27FC236}">
+                <a16:creationId xmlns:a16="http://schemas.microsoft.com/office/drawing/2014/main" id="{C8DD82D3-D002-45B0-B16A-82B3DA4EFDDB}"/>
+              </a:ext>
+              <a:ext uri="{C183D7F6-B498-43B3-948B-1728B52AA6E4}">
+                <adec:decorative xmlns:adec="http://schemas.microsoft.com/office/drawing/2017/decorative" val="1"/>
+              </a:ext>
+            </a:extLst>
+          </p:cNvPr>
+          <p:cNvSpPr>
+            <a:spLocks noGrp="1" noRot="1" noChangeAspect="1" noMove="1" noResize="1" noEditPoints="1" noAdjustHandles="1" noChangeArrowheads="1" noChangeShapeType="1" noTextEdit="1"/>
+          </p:cNvSpPr>
+          <p:nvPr>
+            <p:extLst>
+              <p:ext uri="{386F3935-93C4-4BCD-93E2-E3B085C9AB24}">
+                <p16:designElem xmlns:p16="http://schemas.microsoft.com/office/powerpoint/2015/main" val="1"/>
+              </p:ext>
+            </p:extLst>
+          </p:nvPr>
+        </p:nvSpPr>
+        <p:spPr>
+          <a:xfrm>
+            <a:off x="3048" y="0"/>
+            <a:ext cx="12188952" cy="6858000"/>
+          </a:xfrm>
+          <a:prstGeom prst="rect">
+            <a:avLst/>
+          </a:prstGeom>
+          <a:ln>
+            <a:noFill/>
+          </a:ln>
+        </p:spPr>
+        <p:style>
+          <a:lnRef idx="2">
+            <a:schemeClr val="accent1">
+              <a:shade val="50000"/>
+            </a:schemeClr>
+          </a:lnRef>
+          <a:fillRef idx="1">
+            <a:schemeClr val="accent1"/>
+          </a:fillRef>
+          <a:effectRef idx="0">
+            <a:schemeClr val="accent1"/>
+          </a:effectRef>
+          <a:fontRef idx="minor">
+            <a:schemeClr val="lt1"/>
+          </a:fontRef>
+        </p:style>
+        <p:txBody>
+          <a:bodyPr rtlCol="0" anchor="ctr"/>
+          <a:lstStyle/>
+          <a:p>
+            <a:pPr algn="ctr"/>
+            <a:endParaRPr lang="en-US"/>
+          </a:p>
+        </p:txBody>
+      </p:sp>
       <p:sp>
         <p:nvSpPr>
           <p:cNvPr id="2" name="Title 1">
@@ -5378,18 +5523,80 @@
             <p:ph type="title"/>
           </p:nvPr>
         </p:nvSpPr>
-        <p:spPr/>
-        <p:txBody>
-          <a:bodyPr/>
-          <a:lstStyle/>
-          <a:p>
+        <p:spPr>
+          <a:xfrm>
+            <a:off x="643468" y="643467"/>
+            <a:ext cx="3073550" cy="5126203"/>
+          </a:xfrm>
+        </p:spPr>
+        <p:txBody>
+          <a:bodyPr anchor="ctr">
+            <a:normAutofit/>
+          </a:bodyPr>
+          <a:lstStyle/>
+          <a:p>
+            <a:pPr algn="r"/>
             <a:r>
               <a:rPr lang="en-US" dirty="0"/>
               <a:t>Table of contents</a:t>
             </a:r>
-          </a:p>
-        </p:txBody>
-      </p:sp>
+            <a:endParaRPr lang="en-US"/>
+          </a:p>
+        </p:txBody>
+      </p:sp>
+      <p:cxnSp>
+        <p:nvCxnSpPr>
+          <p:cNvPr id="10" name="Straight Connector 9">
+            <a:extLst>
+              <a:ext uri="{FF2B5EF4-FFF2-40B4-BE49-F238E27FC236}">
+                <a16:creationId xmlns:a16="http://schemas.microsoft.com/office/drawing/2014/main" id="{9F09C252-16FE-4557-AD6D-BB5CA773496C}"/>
+              </a:ext>
+              <a:ext uri="{C183D7F6-B498-43B3-948B-1728B52AA6E4}">
+                <adec:decorative xmlns:adec="http://schemas.microsoft.com/office/drawing/2017/decorative" val="1"/>
+              </a:ext>
+            </a:extLst>
+          </p:cNvPr>
+          <p:cNvCxnSpPr>
+            <a:cxnSpLocks noGrp="1" noRot="1" noChangeAspect="1" noMove="1" noResize="1" noEditPoints="1" noAdjustHandles="1" noChangeArrowheads="1" noChangeShapeType="1"/>
+          </p:cNvCxnSpPr>
+          <p:nvPr>
+            <p:extLst>
+              <p:ext uri="{386F3935-93C4-4BCD-93E2-E3B085C9AB24}">
+                <p16:designElem xmlns:p16="http://schemas.microsoft.com/office/powerpoint/2015/main" val="1"/>
+              </p:ext>
+            </p:extLst>
+          </p:nvPr>
+        </p:nvCxnSpPr>
+        <p:spPr>
+          <a:xfrm>
+            <a:off x="4042052" y="1778497"/>
+            <a:ext cx="0" cy="3200400"/>
+          </a:xfrm>
+          <a:prstGeom prst="line">
+            <a:avLst/>
+          </a:prstGeom>
+          <a:ln w="19050">
+            <a:solidFill>
+              <a:schemeClr val="tx1"/>
+            </a:solidFill>
+            <a:miter lim="800000"/>
+          </a:ln>
+        </p:spPr>
+        <p:style>
+          <a:lnRef idx="1">
+            <a:schemeClr val="accent1"/>
+          </a:lnRef>
+          <a:fillRef idx="0">
+            <a:schemeClr val="accent1"/>
+          </a:fillRef>
+          <a:effectRef idx="0">
+            <a:schemeClr val="accent1"/>
+          </a:effectRef>
+          <a:fontRef idx="minor">
+            <a:schemeClr val="tx1"/>
+          </a:fontRef>
+        </p:style>
+      </p:cxnSp>
       <p:sp>
         <p:nvSpPr>
           <p:cNvPr id="3" name="Content Placeholder 2">
@@ -5406,9 +5613,16 @@
             <p:ph idx="1"/>
           </p:nvPr>
         </p:nvSpPr>
-        <p:spPr/>
-        <p:txBody>
-          <a:bodyPr/>
+        <p:spPr>
+          <a:xfrm>
+            <a:off x="4363786" y="621697"/>
+            <a:ext cx="6791894" cy="5147973"/>
+          </a:xfrm>
+        </p:spPr>
+        <p:txBody>
+          <a:bodyPr anchor="ctr">
+            <a:normAutofit/>
+          </a:bodyPr>
           <a:lstStyle/>
           <a:p>
             <a:r>
@@ -5447,6 +5661,61 @@
             </a:r>
           </a:p>
         </p:txBody>
+      </p:sp>
+      <p:sp>
+        <p:nvSpPr>
+          <p:cNvPr id="12" name="Rectangle 11">
+            <a:extLst>
+              <a:ext uri="{FF2B5EF4-FFF2-40B4-BE49-F238E27FC236}">
+                <a16:creationId xmlns:a16="http://schemas.microsoft.com/office/drawing/2014/main" id="{14552793-7DFF-4EC7-AC69-D34A75D01880}"/>
+              </a:ext>
+              <a:ext uri="{C183D7F6-B498-43B3-948B-1728B52AA6E4}">
+                <adec:decorative xmlns:adec="http://schemas.microsoft.com/office/drawing/2017/decorative" val="1"/>
+              </a:ext>
+            </a:extLst>
+          </p:cNvPr>
+          <p:cNvSpPr>
+            <a:spLocks noGrp="1" noRot="1" noChangeAspect="1" noMove="1" noResize="1" noEditPoints="1" noAdjustHandles="1" noChangeArrowheads="1" noChangeShapeType="1" noTextEdit="1"/>
+          </p:cNvSpPr>
+          <p:nvPr>
+            <p:extLst>
+              <p:ext uri="{386F3935-93C4-4BCD-93E2-E3B085C9AB24}">
+                <p16:designElem xmlns:p16="http://schemas.microsoft.com/office/powerpoint/2015/main" val="1"/>
+              </p:ext>
+            </p:extLst>
+          </p:nvPr>
+        </p:nvSpPr>
+        <p:spPr>
+          <a:xfrm>
+            <a:off x="0" y="6400800"/>
+            <a:ext cx="12192000" cy="457200"/>
+          </a:xfrm>
+          <a:prstGeom prst="rect">
+            <a:avLst/>
+          </a:prstGeom>
+          <a:solidFill>
+            <a:srgbClr val="262626"/>
+          </a:solidFill>
+          <a:ln>
+            <a:noFill/>
+          </a:ln>
+        </p:spPr>
+        <p:style>
+          <a:lnRef idx="2">
+            <a:schemeClr val="accent1">
+              <a:shade val="50000"/>
+            </a:schemeClr>
+          </a:lnRef>
+          <a:fillRef idx="1">
+            <a:schemeClr val="accent1"/>
+          </a:fillRef>
+          <a:effectRef idx="0">
+            <a:schemeClr val="accent1"/>
+          </a:effectRef>
+          <a:fontRef idx="minor">
+            <a:schemeClr val="lt1"/>
+          </a:fontRef>
+        </p:style>
       </p:sp>
     </p:spTree>
     <p:extLst>
@@ -5922,13 +6191,6 @@
               </a:rPr>
               <a:t>Third person camera</a:t>
             </a:r>
-          </a:p>
-          <a:p>
-            <a:endParaRPr lang="en-US" sz="1800" dirty="0">
-              <a:solidFill>
-                <a:srgbClr val="FFFFFF"/>
-              </a:solidFill>
-            </a:endParaRPr>
           </a:p>
           <a:p>
             <a:endParaRPr lang="en-US" sz="1800" dirty="0">
@@ -8072,21 +8334,21 @@
 </file>
 
 <file path=customXml/item2.xml><?xml version="1.0" encoding="utf-8"?>
+<p:properties xmlns:p="http://schemas.microsoft.com/office/2006/metadata/properties" xmlns:xsi="http://www.w3.org/2001/XMLSchema-instance" xmlns:pc="http://schemas.microsoft.com/office/infopath/2007/PartnerControls">
+  <documentManagement>
+    <Status xmlns="71af3243-3dd4-4a8d-8c0d-dd76da1f02a5">Not started</Status>
+    <MediaServiceKeyPoints xmlns="71af3243-3dd4-4a8d-8c0d-dd76da1f02a5" xsi:nil="true"/>
+  </documentManagement>
+</p:properties>
+</file>
+
+<file path=customXml/item3.xml><?xml version="1.0" encoding="utf-8"?>
 <?mso-contentType ?>
 <FormTemplates xmlns="http://schemas.microsoft.com/sharepoint/v3/contenttype/forms">
   <Display>DocumentLibraryForm</Display>
   <Edit>DocumentLibraryForm</Edit>
   <New>DocumentLibraryForm</New>
 </FormTemplates>
-</file>
-
-<file path=customXml/item3.xml><?xml version="1.0" encoding="utf-8"?>
-<p:properties xmlns:p="http://schemas.microsoft.com/office/2006/metadata/properties" xmlns:xsi="http://www.w3.org/2001/XMLSchema-instance" xmlns:pc="http://schemas.microsoft.com/office/infopath/2007/PartnerControls">
-  <documentManagement>
-    <Status xmlns="71af3243-3dd4-4a8d-8c0d-dd76da1f02a5">Not started</Status>
-    <MediaServiceKeyPoints xmlns="71af3243-3dd4-4a8d-8c0d-dd76da1f02a5" xsi:nil="true"/>
-  </documentManagement>
-</p:properties>
 </file>
 
 <file path=customXml/itemProps1.xml><?xml version="1.0" encoding="utf-8"?>
@@ -8109,14 +8371,6 @@
 </file>
 
 <file path=customXml/itemProps2.xml><?xml version="1.0" encoding="utf-8"?>
-<ds:datastoreItem xmlns:ds="http://schemas.openxmlformats.org/officeDocument/2006/customXml" ds:itemID="{3C586965-D4BF-4605-8C1C-5B8CCCAB7737}">
-  <ds:schemaRefs>
-    <ds:schemaRef ds:uri="http://schemas.microsoft.com/sharepoint/v3/contenttype/forms"/>
-  </ds:schemaRefs>
-</ds:datastoreItem>
-</file>
-
-<file path=customXml/itemProps3.xml><?xml version="1.0" encoding="utf-8"?>
 <ds:datastoreItem xmlns:ds="http://schemas.openxmlformats.org/officeDocument/2006/customXml" ds:itemID="{626E351D-C19B-467F-A5C7-085C4CECACA9}">
   <ds:schemaRefs>
     <ds:schemaRef ds:uri="http://schemas.microsoft.com/office/2006/metadata/properties"/>
@@ -8124,4 +8378,12 @@
     <ds:schemaRef ds:uri="71af3243-3dd4-4a8d-8c0d-dd76da1f02a5"/>
   </ds:schemaRefs>
 </ds:datastoreItem>
+</file>
+
+<file path=customXml/itemProps3.xml><?xml version="1.0" encoding="utf-8"?>
+<ds:datastoreItem xmlns:ds="http://schemas.openxmlformats.org/officeDocument/2006/customXml" ds:itemID="{3C586965-D4BF-4605-8C1C-5B8CCCAB7737}">
+  <ds:schemaRefs>
+    <ds:schemaRef ds:uri="http://schemas.microsoft.com/sharepoint/v3/contenttype/forms"/>
+  </ds:schemaRefs>
+</ds:datastoreItem>
 </file>
</xml_diff>

<commit_message>
Phase instead of phase
</commit_message>
<xml_diff>
--- a/04-PresentationThirdPhase.pptx
+++ b/04-PresentationThirdPhase.pptx
@@ -2746,11 +2746,7 @@
           <a:bodyPr/>
           <a:lstStyle/>
           <a:p>
-            <a:r>
-              <a:rPr lang="en-US" dirty="0"/>
-              <a:t>Aaron</a:t>
-            </a:r>
-            <a:endParaRPr lang="nl-NL" dirty="0"/>
+            <a:endParaRPr lang="nl-NL"/>
           </a:p>
         </p:txBody>
       </p:sp>
@@ -2771,7 +2767,7 @@
           <a:p>
             <a:fld id="{F917F88C-BACD-4A94-B7B7-C91B49D4CB7C}" type="slidenum">
               <a:rPr lang="nl-NL" smtClean="0"/>
-              <a:t>20</a:t>
+              <a:t>19</a:t>
             </a:fld>
             <a:endParaRPr lang="nl-NL"/>
           </a:p>
@@ -2780,7 +2776,7 @@
     </p:spTree>
     <p:extLst>
       <p:ext uri="{BB962C8B-B14F-4D97-AF65-F5344CB8AC3E}">
-        <p14:creationId xmlns:p14="http://schemas.microsoft.com/office/powerpoint/2010/main" val="925085918"/>
+        <p14:creationId xmlns:p14="http://schemas.microsoft.com/office/powerpoint/2010/main" val="1895606626"/>
       </p:ext>
     </p:extLst>
   </p:cSld>
@@ -2834,6 +2830,94 @@
           <a:bodyPr/>
           <a:lstStyle/>
           <a:p>
+            <a:r>
+              <a:rPr lang="en-US" dirty="0"/>
+              <a:t>Aaron</a:t>
+            </a:r>
+            <a:endParaRPr lang="nl-NL" dirty="0"/>
+          </a:p>
+        </p:txBody>
+      </p:sp>
+      <p:sp>
+        <p:nvSpPr>
+          <p:cNvPr id="4" name="Slide Number Placeholder 3"/>
+          <p:cNvSpPr>
+            <a:spLocks noGrp="1"/>
+          </p:cNvSpPr>
+          <p:nvPr>
+            <p:ph type="sldNum" sz="quarter" idx="5"/>
+          </p:nvPr>
+        </p:nvSpPr>
+        <p:spPr/>
+        <p:txBody>
+          <a:bodyPr/>
+          <a:lstStyle/>
+          <a:p>
+            <a:fld id="{F917F88C-BACD-4A94-B7B7-C91B49D4CB7C}" type="slidenum">
+              <a:rPr lang="nl-NL" smtClean="0"/>
+              <a:t>20</a:t>
+            </a:fld>
+            <a:endParaRPr lang="nl-NL"/>
+          </a:p>
+        </p:txBody>
+      </p:sp>
+    </p:spTree>
+    <p:extLst>
+      <p:ext uri="{BB962C8B-B14F-4D97-AF65-F5344CB8AC3E}">
+        <p14:creationId xmlns:p14="http://schemas.microsoft.com/office/powerpoint/2010/main" val="925085918"/>
+      </p:ext>
+    </p:extLst>
+  </p:cSld>
+  <p:clrMapOvr>
+    <a:masterClrMapping/>
+  </p:clrMapOvr>
+</p:notes>
+</file>
+
+<file path=ppt/notesSlides/notesSlide13.xml><?xml version="1.0" encoding="utf-8"?>
+<p:notes xmlns:a="http://schemas.openxmlformats.org/drawingml/2006/main" xmlns:r="http://schemas.openxmlformats.org/officeDocument/2006/relationships" xmlns:p="http://schemas.openxmlformats.org/presentationml/2006/main">
+  <p:cSld>
+    <p:spTree>
+      <p:nvGrpSpPr>
+        <p:cNvPr id="1" name=""/>
+        <p:cNvGrpSpPr/>
+        <p:nvPr/>
+      </p:nvGrpSpPr>
+      <p:grpSpPr>
+        <a:xfrm>
+          <a:off x="0" y="0"/>
+          <a:ext cx="0" cy="0"/>
+          <a:chOff x="0" y="0"/>
+          <a:chExt cx="0" cy="0"/>
+        </a:xfrm>
+      </p:grpSpPr>
+      <p:sp>
+        <p:nvSpPr>
+          <p:cNvPr id="2" name="Slide Image Placeholder 1"/>
+          <p:cNvSpPr>
+            <a:spLocks noGrp="1" noRot="1" noChangeAspect="1"/>
+          </p:cNvSpPr>
+          <p:nvPr>
+            <p:ph type="sldImg"/>
+          </p:nvPr>
+        </p:nvSpPr>
+        <p:spPr/>
+      </p:sp>
+      <p:sp>
+        <p:nvSpPr>
+          <p:cNvPr id="3" name="Notes Placeholder 2"/>
+          <p:cNvSpPr>
+            <a:spLocks noGrp="1"/>
+          </p:cNvSpPr>
+          <p:nvPr>
+            <p:ph type="body" idx="1"/>
+          </p:nvPr>
+        </p:nvSpPr>
+        <p:spPr/>
+        <p:txBody>
+          <a:bodyPr/>
+          <a:lstStyle/>
+          <a:p>
             <a:pPr marL="0" marR="0" lvl="0" indent="0" algn="l" defTabSz="914400" rtl="0" eaLnBrk="1" fontAlgn="auto" latinLnBrk="0" hangingPunct="1">
               <a:lnSpc>
                 <a:spcPct val="100000"/>
@@ -2895,7 +2979,7 @@
 </p:notes>
 </file>
 
-<file path=ppt/notesSlides/notesSlide13.xml><?xml version="1.0" encoding="utf-8"?>
+<file path=ppt/notesSlides/notesSlide14.xml><?xml version="1.0" encoding="utf-8"?>
 <p:notes xmlns:a="http://schemas.openxmlformats.org/drawingml/2006/main" xmlns:r="http://schemas.openxmlformats.org/officeDocument/2006/relationships" xmlns:p="http://schemas.openxmlformats.org/presentationml/2006/main">
   <p:cSld>
     <p:spTree>
@@ -7282,7 +7366,7 @@
                   <a:srgbClr val="FFFFFF"/>
                 </a:solidFill>
               </a:rPr>
-              <a:t>Crazy Putting phase 3</a:t>
+              <a:t>Crazy Putting Phase 3</a:t>
             </a:r>
           </a:p>
         </p:txBody>
@@ -8893,13 +8977,7 @@
                       <a:rPr lang="nl-NL" b="0" i="1" smtClean="0">
                         <a:latin typeface="Cambria Math" panose="02040503050406030204" pitchFamily="18" charset="0"/>
                       </a:rPr>
-                      <m:t>+</m:t>
-                    </m:r>
-                    <m:r>
-                      <a:rPr lang="nl-NL" b="0" i="1" smtClean="0">
-                        <a:latin typeface="Cambria Math" panose="02040503050406030204" pitchFamily="18" charset="0"/>
-                      </a:rPr>
-                      <m:t>2</m:t>
+                      <m:t>+2</m:t>
                     </m:r>
                     <m:sSub>
                       <m:sSubPr>
@@ -8930,13 +9008,7 @@
                       <a:rPr lang="nl-NL" b="0" i="1" smtClean="0">
                         <a:latin typeface="Cambria Math" panose="02040503050406030204" pitchFamily="18" charset="0"/>
                       </a:rPr>
-                      <m:t>+</m:t>
-                    </m:r>
-                    <m:r>
-                      <a:rPr lang="nl-NL" b="0" i="1" smtClean="0">
-                        <a:latin typeface="Cambria Math" panose="02040503050406030204" pitchFamily="18" charset="0"/>
-                      </a:rPr>
-                      <m:t>2</m:t>
+                      <m:t>+2</m:t>
                     </m:r>
                     <m:sSub>
                       <m:sSubPr>
@@ -9159,13 +9231,7 @@
                       <a:rPr lang="nl-NL" i="1">
                         <a:latin typeface="Cambria Math" panose="02040503050406030204" pitchFamily="18" charset="0"/>
                       </a:rPr>
-                      <m:t>+</m:t>
-                    </m:r>
-                    <m:r>
-                      <a:rPr lang="nl-NL" i="1">
-                        <a:latin typeface="Cambria Math" panose="02040503050406030204" pitchFamily="18" charset="0"/>
-                      </a:rPr>
-                      <m:t>2</m:t>
+                      <m:t>+2</m:t>
                     </m:r>
                     <m:sSub>
                       <m:sSubPr>
@@ -9196,13 +9262,7 @@
                       <a:rPr lang="nl-NL" i="1">
                         <a:latin typeface="Cambria Math" panose="02040503050406030204" pitchFamily="18" charset="0"/>
                       </a:rPr>
-                      <m:t>+</m:t>
-                    </m:r>
-                    <m:r>
-                      <a:rPr lang="nl-NL" i="1">
-                        <a:latin typeface="Cambria Math" panose="02040503050406030204" pitchFamily="18" charset="0"/>
-                      </a:rPr>
-                      <m:t>2</m:t>
+                      <m:t>+2</m:t>
                     </m:r>
                     <m:sSub>
                       <m:sSubPr>
@@ -9670,8 +9730,8 @@
           </a:p>
         </p:txBody>
       </p:sp>
-      <mc:AlternateContent xmlns:mc="http://schemas.openxmlformats.org/markup-compatibility/2006">
-        <mc:Choice xmlns:a14="http://schemas.microsoft.com/office/drawing/2010/main" Requires="a14">
+      <mc:AlternateContent xmlns:mc="http://schemas.openxmlformats.org/markup-compatibility/2006" xmlns:a14="http://schemas.microsoft.com/office/drawing/2010/main">
+        <mc:Choice Requires="a14">
           <p:sp>
             <p:nvSpPr>
               <p:cNvPr id="3" name="Content Placeholder 2">
@@ -10684,7 +10744,7 @@
             </p:txBody>
           </p:sp>
         </mc:Choice>
-        <mc:Fallback>
+        <mc:Fallback xmlns="">
           <p:sp>
             <p:nvSpPr>
               <p:cNvPr id="3" name="Content Placeholder 2">
@@ -15682,6 +15742,15 @@
 </file>
 
 <file path=customXml/item1.xml><?xml version="1.0" encoding="utf-8"?>
+<?mso-contentType ?>
+<FormTemplates xmlns="http://schemas.microsoft.com/sharepoint/v3/contenttype/forms">
+  <Display>DocumentLibraryForm</Display>
+  <Edit>DocumentLibraryForm</Edit>
+  <New>DocumentLibraryForm</New>
+</FormTemplates>
+</file>
+
+<file path=customXml/item2.xml><?xml version="1.0" encoding="utf-8"?>
 <ct:contentTypeSchema xmlns:ct="http://schemas.microsoft.com/office/2006/metadata/contentType" xmlns:ma="http://schemas.microsoft.com/office/2006/metadata/properties/metaAttributes" ct:_="" ma:_="" ma:contentTypeName="Document" ma:contentTypeID="0x01010079F111ED35F8CC479449609E8A0923A6" ma:contentTypeVersion="12" ma:contentTypeDescription="Create a new document." ma:contentTypeScope="" ma:versionID="a410dd7f93c95333ffa1b60ed6adedd1">
   <xsd:schema xmlns:xsd="http://www.w3.org/2001/XMLSchema" xmlns:xs="http://www.w3.org/2001/XMLSchema" xmlns:p="http://schemas.microsoft.com/office/2006/metadata/properties" xmlns:ns2="71af3243-3dd4-4a8d-8c0d-dd76da1f02a5" xmlns:ns3="16c05727-aa75-4e4a-9b5f-8a80a1165891" targetNamespace="http://schemas.microsoft.com/office/2006/metadata/properties" ma:root="true" ma:fieldsID="a936d9baba76aa3866493feff160faab" ns2:_="" ns3:_="">
     <xsd:import namespace="71af3243-3dd4-4a8d-8c0d-dd76da1f02a5"/>
@@ -15902,15 +15971,6 @@
 </ct:contentTypeSchema>
 </file>
 
-<file path=customXml/item2.xml><?xml version="1.0" encoding="utf-8"?>
-<?mso-contentType ?>
-<FormTemplates xmlns="http://schemas.microsoft.com/sharepoint/v3/contenttype/forms">
-  <Display>DocumentLibraryForm</Display>
-  <Edit>DocumentLibraryForm</Edit>
-  <New>DocumentLibraryForm</New>
-</FormTemplates>
-</file>
-
 <file path=customXml/item3.xml><?xml version="1.0" encoding="utf-8"?>
 <p:properties xmlns:p="http://schemas.microsoft.com/office/2006/metadata/properties" xmlns:xsi="http://www.w3.org/2001/XMLSchema-instance" xmlns:pc="http://schemas.microsoft.com/office/infopath/2007/PartnerControls">
   <documentManagement>
@@ -15921,6 +15981,14 @@
 </file>
 
 <file path=customXml/itemProps1.xml><?xml version="1.0" encoding="utf-8"?>
+<ds:datastoreItem xmlns:ds="http://schemas.openxmlformats.org/officeDocument/2006/customXml" ds:itemID="{3C586965-D4BF-4605-8C1C-5B8CCCAB7737}">
+  <ds:schemaRefs>
+    <ds:schemaRef ds:uri="http://schemas.microsoft.com/sharepoint/v3/contenttype/forms"/>
+  </ds:schemaRefs>
+</ds:datastoreItem>
+</file>
+
+<file path=customXml/itemProps2.xml><?xml version="1.0" encoding="utf-8"?>
 <ds:datastoreItem xmlns:ds="http://schemas.openxmlformats.org/officeDocument/2006/customXml" ds:itemID="{6E499CE6-06FC-4D3E-8B56-30558CC9D1A4}">
   <ds:schemaRefs>
     <ds:schemaRef ds:uri="http://schemas.microsoft.com/office/2006/metadata/contentType"/>
@@ -15939,14 +16007,6 @@
 </ds:datastoreItem>
 </file>
 
-<file path=customXml/itemProps2.xml><?xml version="1.0" encoding="utf-8"?>
-<ds:datastoreItem xmlns:ds="http://schemas.openxmlformats.org/officeDocument/2006/customXml" ds:itemID="{3C586965-D4BF-4605-8C1C-5B8CCCAB7737}">
-  <ds:schemaRefs>
-    <ds:schemaRef ds:uri="http://schemas.microsoft.com/sharepoint/v3/contenttype/forms"/>
-  </ds:schemaRefs>
-</ds:datastoreItem>
-</file>
-
 <file path=customXml/itemProps3.xml><?xml version="1.0" encoding="utf-8"?>
 <ds:datastoreItem xmlns:ds="http://schemas.openxmlformats.org/officeDocument/2006/customXml" ds:itemID="{626E351D-C19B-467F-A5C7-085C4CECACA9}">
   <ds:schemaRefs>

</xml_diff>

<commit_message>
Bouncing  ball video added to presentation
</commit_message>
<xml_diff>
--- a/04-PresentationThirdPhase.pptx
+++ b/04-PresentationThirdPhase.pptx
@@ -5,7 +5,7 @@
     <p:sldMasterId id="2147483660" r:id="rId4"/>
   </p:sldMasterIdLst>
   <p:notesMasterIdLst>
-    <p:notesMasterId r:id="rId26"/>
+    <p:notesMasterId r:id="rId27"/>
   </p:notesMasterIdLst>
   <p:sldIdLst>
     <p:sldId id="265" r:id="rId5"/>
@@ -18,17 +18,18 @@
     <p:sldId id="291" r:id="rId12"/>
     <p:sldId id="305" r:id="rId13"/>
     <p:sldId id="328" r:id="rId14"/>
-    <p:sldId id="331" r:id="rId15"/>
-    <p:sldId id="319" r:id="rId16"/>
-    <p:sldId id="330" r:id="rId17"/>
-    <p:sldId id="334" r:id="rId18"/>
-    <p:sldId id="313" r:id="rId19"/>
-    <p:sldId id="332" r:id="rId20"/>
-    <p:sldId id="333" r:id="rId21"/>
-    <p:sldId id="320" r:id="rId22"/>
-    <p:sldId id="322" r:id="rId23"/>
-    <p:sldId id="324" r:id="rId24"/>
-    <p:sldId id="327" r:id="rId25"/>
+    <p:sldId id="335" r:id="rId15"/>
+    <p:sldId id="331" r:id="rId16"/>
+    <p:sldId id="319" r:id="rId17"/>
+    <p:sldId id="330" r:id="rId18"/>
+    <p:sldId id="334" r:id="rId19"/>
+    <p:sldId id="313" r:id="rId20"/>
+    <p:sldId id="332" r:id="rId21"/>
+    <p:sldId id="333" r:id="rId22"/>
+    <p:sldId id="320" r:id="rId23"/>
+    <p:sldId id="322" r:id="rId24"/>
+    <p:sldId id="324" r:id="rId25"/>
+    <p:sldId id="327" r:id="rId26"/>
   </p:sldIdLst>
   <p:sldSz cx="12192000" cy="6858000"/>
   <p:notesSz cx="6858000" cy="9144000"/>
@@ -141,7 +142,7 @@
 <file path=ppt/charts/chart1.xml><?xml version="1.0" encoding="utf-8"?>
 <c:chartSpace xmlns:c="http://schemas.openxmlformats.org/drawingml/2006/chart" xmlns:a="http://schemas.openxmlformats.org/drawingml/2006/main" xmlns:r="http://schemas.openxmlformats.org/officeDocument/2006/relationships" xmlns:c16r2="http://schemas.microsoft.com/office/drawing/2015/06/chart">
   <c:date1904 val="0"/>
-  <c:lang val="en-GB"/>
+  <c:lang val="en-US"/>
   <c:roundedCorners val="0"/>
   <mc:AlternateContent xmlns:mc="http://schemas.openxmlformats.org/markup-compatibility/2006">
     <mc:Choice xmlns:c14="http://schemas.microsoft.com/office/drawing/2007/8/2/chart" Requires="c14">
@@ -203,7 +204,7 @@
               <a:cs typeface="+mn-cs"/>
             </a:defRPr>
           </a:pPr>
-          <a:endParaRPr lang="en-BE"/>
+          <a:endParaRPr lang="nl-NL"/>
         </a:p>
       </c:txPr>
     </c:title>
@@ -517,7 +518,7 @@
                 <a:cs typeface="+mn-cs"/>
               </a:defRPr>
             </a:pPr>
-            <a:endParaRPr lang="en-BE"/>
+            <a:endParaRPr lang="nl-NL"/>
           </a:p>
         </c:txPr>
         <c:crossAx val="690337440"/>
@@ -576,7 +577,7 @@
                 <a:cs typeface="+mn-cs"/>
               </a:defRPr>
             </a:pPr>
-            <a:endParaRPr lang="en-BE"/>
+            <a:endParaRPr lang="nl-NL"/>
           </a:p>
         </c:txPr>
         <c:crossAx val="547336896"/>
@@ -618,7 +619,7 @@
               <a:cs typeface="+mn-cs"/>
             </a:defRPr>
           </a:pPr>
-          <a:endParaRPr lang="en-BE"/>
+          <a:endParaRPr lang="nl-NL"/>
         </a:p>
       </c:txPr>
     </c:legend>
@@ -647,7 +648,7 @@
       <a:pPr>
         <a:defRPr/>
       </a:pPr>
-      <a:endParaRPr lang="en-BE"/>
+      <a:endParaRPr lang="nl-NL"/>
     </a:p>
   </c:txPr>
   <c:externalData r:id="rId3">
@@ -659,7 +660,7 @@
 <file path=ppt/charts/chart2.xml><?xml version="1.0" encoding="utf-8"?>
 <c:chartSpace xmlns:c="http://schemas.openxmlformats.org/drawingml/2006/chart" xmlns:a="http://schemas.openxmlformats.org/drawingml/2006/main" xmlns:r="http://schemas.openxmlformats.org/officeDocument/2006/relationships" xmlns:c16r2="http://schemas.microsoft.com/office/drawing/2015/06/chart">
   <c:date1904 val="0"/>
-  <c:lang val="en-GB"/>
+  <c:lang val="en-US"/>
   <c:roundedCorners val="0"/>
   <mc:AlternateContent xmlns:mc="http://schemas.openxmlformats.org/markup-compatibility/2006">
     <mc:Choice xmlns:c14="http://schemas.microsoft.com/office/drawing/2007/8/2/chart" Requires="c14">
@@ -726,7 +727,7 @@
               <a:cs typeface="+mn-cs"/>
             </a:defRPr>
           </a:pPr>
-          <a:endParaRPr lang="en-BE"/>
+          <a:endParaRPr lang="nl-NL"/>
         </a:p>
       </c:txPr>
     </c:title>
@@ -950,7 +951,7 @@
                 <a:cs typeface="+mn-cs"/>
               </a:defRPr>
             </a:pPr>
-            <a:endParaRPr lang="en-BE"/>
+            <a:endParaRPr lang="nl-NL"/>
           </a:p>
         </c:txPr>
         <c:crossAx val="641512976"/>
@@ -1009,7 +1010,7 @@
                 <a:cs typeface="+mn-cs"/>
               </a:defRPr>
             </a:pPr>
-            <a:endParaRPr lang="en-BE"/>
+            <a:endParaRPr lang="nl-NL"/>
           </a:p>
         </c:txPr>
         <c:crossAx val="723243472"/>
@@ -1051,7 +1052,7 @@
               <a:cs typeface="+mn-cs"/>
             </a:defRPr>
           </a:pPr>
-          <a:endParaRPr lang="en-BE"/>
+          <a:endParaRPr lang="nl-NL"/>
         </a:p>
       </c:txPr>
     </c:legend>
@@ -1080,7 +1081,7 @@
       <a:pPr>
         <a:defRPr/>
       </a:pPr>
-      <a:endParaRPr lang="en-BE"/>
+      <a:endParaRPr lang="nl-NL"/>
     </a:p>
   </c:txPr>
   <c:externalData r:id="rId3">
@@ -2257,7 +2258,7 @@
           <a:p>
             <a:fld id="{05052211-91C2-4B5D-9566-2C0C10015937}" type="datetimeFigureOut">
               <a:rPr lang="nl-NL" smtClean="0"/>
-              <a:t>23-06-2020</a:t>
+              <a:t>23-6-2020</a:t>
             </a:fld>
             <a:endParaRPr lang="nl-NL"/>
           </a:p>
@@ -2678,7 +2679,7 @@
           <a:p>
             <a:fld id="{F917F88C-BACD-4A94-B7B7-C91B49D4CB7C}" type="slidenum">
               <a:rPr lang="nl-NL" smtClean="0"/>
-              <a:t>18</a:t>
+              <a:t>19</a:t>
             </a:fld>
             <a:endParaRPr lang="nl-NL"/>
           </a:p>
@@ -2766,7 +2767,7 @@
           <a:p>
             <a:fld id="{F917F88C-BACD-4A94-B7B7-C91B49D4CB7C}" type="slidenum">
               <a:rPr lang="nl-NL" smtClean="0"/>
-              <a:t>19</a:t>
+              <a:t>20</a:t>
             </a:fld>
             <a:endParaRPr lang="nl-NL"/>
           </a:p>
@@ -2871,7 +2872,7 @@
           <a:p>
             <a:fld id="{F917F88C-BACD-4A94-B7B7-C91B49D4CB7C}" type="slidenum">
               <a:rPr lang="nl-NL" smtClean="0"/>
-              <a:t>20</a:t>
+              <a:t>21</a:t>
             </a:fld>
             <a:endParaRPr lang="nl-NL"/>
           </a:p>
@@ -2976,7 +2977,7 @@
           <a:p>
             <a:fld id="{F917F88C-BACD-4A94-B7B7-C91B49D4CB7C}" type="slidenum">
               <a:rPr lang="nl-NL" smtClean="0"/>
-              <a:t>21</a:t>
+              <a:t>22</a:t>
             </a:fld>
             <a:endParaRPr lang="nl-NL"/>
           </a:p>
@@ -3657,7 +3658,7 @@
           <a:p>
             <a:fld id="{F917F88C-BACD-4A94-B7B7-C91B49D4CB7C}" type="slidenum">
               <a:rPr lang="nl-NL" smtClean="0"/>
-              <a:t>12</a:t>
+              <a:t>13</a:t>
             </a:fld>
             <a:endParaRPr lang="nl-NL"/>
           </a:p>
@@ -3745,7 +3746,7 @@
           <a:p>
             <a:fld id="{F917F88C-BACD-4A94-B7B7-C91B49D4CB7C}" type="slidenum">
               <a:rPr lang="nl-NL" smtClean="0"/>
-              <a:t>13</a:t>
+              <a:t>14</a:t>
             </a:fld>
             <a:endParaRPr lang="nl-NL"/>
           </a:p>
@@ -4008,7 +4009,7 @@
           <a:p>
             <a:fld id="{9184DA70-C731-4C70-880D-CCD4705E623C}" type="datetime1">
               <a:rPr lang="en-US" smtClean="0"/>
-              <a:t>6/23/20</a:t>
+              <a:t>6/23/2020</a:t>
             </a:fld>
             <a:endParaRPr lang="en-US" dirty="0"/>
           </a:p>
@@ -4196,7 +4197,7 @@
           <a:p>
             <a:fld id="{4BE1D723-8F53-4F53-90B0-1982A396982E}" type="datetime1">
               <a:rPr lang="en-US" smtClean="0"/>
-              <a:t>6/23/20</a:t>
+              <a:t>6/23/2020</a:t>
             </a:fld>
             <a:endParaRPr lang="en-US" dirty="0"/>
           </a:p>
@@ -4569,7 +4570,7 @@
           <a:p>
             <a:fld id="{97669AF7-7BEB-44E4-9852-375E34362B5B}" type="datetime1">
               <a:rPr lang="en-US" smtClean="0"/>
-              <a:t>6/23/20</a:t>
+              <a:t>6/23/2020</a:t>
             </a:fld>
             <a:endParaRPr lang="en-US" dirty="0"/>
           </a:p>
@@ -4824,7 +4825,7 @@
           <a:p>
             <a:fld id="{BAAAC38D-0552-4C82-B593-E6124DFADBE2}" type="datetime1">
               <a:rPr lang="en-US" smtClean="0"/>
-              <a:t>6/23/20</a:t>
+              <a:t>6/23/2020</a:t>
             </a:fld>
             <a:endParaRPr lang="en-US" dirty="0"/>
           </a:p>
@@ -5221,7 +5222,7 @@
           <a:p>
             <a:fld id="{D9DF0F1C-5577-4ACB-BB62-DF8F3C494C7E}" type="datetime1">
               <a:rPr lang="en-US" smtClean="0"/>
-              <a:t>6/23/20</a:t>
+              <a:t>6/23/2020</a:t>
             </a:fld>
             <a:endParaRPr lang="en-US" dirty="0"/>
           </a:p>
@@ -5357,7 +5358,7 @@
           <a:p>
             <a:fld id="{1775B394-D9F9-4F0C-B15D-605F45CB9E9F}" type="datetime1">
               <a:rPr lang="en-US" smtClean="0"/>
-              <a:t>6/23/20</a:t>
+              <a:t>6/23/2020</a:t>
             </a:fld>
             <a:endParaRPr lang="en-US" dirty="0"/>
           </a:p>
@@ -5514,7 +5515,7 @@
           <a:p>
             <a:fld id="{39667345-2558-425A-8533-9BFDBCE15005}" type="datetime1">
               <a:rPr lang="en-US" smtClean="0"/>
-              <a:t>6/23/20</a:t>
+              <a:t>6/23/2020</a:t>
             </a:fld>
             <a:endParaRPr lang="en-US" dirty="0"/>
           </a:p>
@@ -5843,7 +5844,7 @@
           <a:p>
             <a:fld id="{92BEA474-078D-4E9B-9B14-09A87B19DC46}" type="datetime1">
               <a:rPr lang="en-US" smtClean="0"/>
-              <a:t>6/23/20</a:t>
+              <a:t>6/23/2020</a:t>
             </a:fld>
             <a:endParaRPr lang="en-US" dirty="0"/>
           </a:p>
@@ -6193,7 +6194,7 @@
           <a:p>
             <a:fld id="{4907D986-8816-4272-A432-0437A28A9828}" type="datetime1">
               <a:rPr lang="en-US" smtClean="0"/>
-              <a:t>6/23/20</a:t>
+              <a:t>6/23/2020</a:t>
             </a:fld>
             <a:endParaRPr lang="en-US" dirty="0"/>
           </a:p>
@@ -6454,7 +6455,7 @@
           <a:p>
             <a:fld id="{62D6E202-B606-4609-B914-27C9371A1F6D}" type="datetime1">
               <a:rPr lang="en-US" smtClean="0"/>
-              <a:t>6/23/20</a:t>
+              <a:t>6/23/2020</a:t>
             </a:fld>
             <a:endParaRPr lang="en-US" dirty="0"/>
           </a:p>
@@ -7852,6 +7853,14 @@
 <file path=ppt/slides/slide11.xml><?xml version="1.0" encoding="utf-8"?>
 <p:sld xmlns:a="http://schemas.openxmlformats.org/drawingml/2006/main" xmlns:r="http://schemas.openxmlformats.org/officeDocument/2006/relationships" xmlns:p="http://schemas.openxmlformats.org/presentationml/2006/main">
   <p:cSld>
+    <p:bg>
+      <p:bgPr>
+        <a:solidFill>
+          <a:schemeClr val="bg1"/>
+        </a:solidFill>
+        <a:effectLst/>
+      </p:bgPr>
+    </p:bg>
     <p:spTree>
       <p:nvGrpSpPr>
         <p:cNvPr id="1" name=""/>
@@ -7868,6 +7877,522 @@
       </p:grpSpPr>
       <p:sp>
         <p:nvSpPr>
+          <p:cNvPr id="9" name="Rectangle 8">
+            <a:extLst>
+              <a:ext uri="{FF2B5EF4-FFF2-40B4-BE49-F238E27FC236}">
+                <a16:creationId xmlns:a16="http://schemas.microsoft.com/office/drawing/2014/main" id="{39E3965E-AC41-4711-9D10-E25ABB132D86}"/>
+              </a:ext>
+              <a:ext uri="{C183D7F6-B498-43B3-948B-1728B52AA6E4}">
+                <adec:decorative xmlns:adec="http://schemas.microsoft.com/office/drawing/2017/decorative" val="1"/>
+              </a:ext>
+            </a:extLst>
+          </p:cNvPr>
+          <p:cNvSpPr>
+            <a:spLocks noGrp="1" noRot="1" noChangeAspect="1" noMove="1" noResize="1" noEditPoints="1" noAdjustHandles="1" noChangeArrowheads="1" noChangeShapeType="1" noTextEdit="1"/>
+          </p:cNvSpPr>
+          <p:nvPr>
+            <p:extLst>
+              <p:ext uri="{386F3935-93C4-4BCD-93E2-E3B085C9AB24}">
+                <p16:designElem xmlns:p16="http://schemas.microsoft.com/office/powerpoint/2015/main" val="1"/>
+              </p:ext>
+            </p:extLst>
+          </p:nvPr>
+        </p:nvSpPr>
+        <p:spPr>
+          <a:xfrm>
+            <a:off x="3175" y="6400800"/>
+            <a:ext cx="12188825" cy="457200"/>
+          </a:xfrm>
+          <a:prstGeom prst="rect">
+            <a:avLst/>
+          </a:prstGeom>
+          <a:solidFill>
+            <a:srgbClr val="262626"/>
+          </a:solidFill>
+          <a:ln>
+            <a:noFill/>
+          </a:ln>
+        </p:spPr>
+        <p:style>
+          <a:lnRef idx="2">
+            <a:schemeClr val="accent1">
+              <a:shade val="50000"/>
+            </a:schemeClr>
+          </a:lnRef>
+          <a:fillRef idx="1">
+            <a:schemeClr val="accent1"/>
+          </a:fillRef>
+          <a:effectRef idx="0">
+            <a:schemeClr val="accent1"/>
+          </a:effectRef>
+          <a:fontRef idx="minor">
+            <a:schemeClr val="lt1"/>
+          </a:fontRef>
+        </p:style>
+      </p:sp>
+      <p:cxnSp>
+        <p:nvCxnSpPr>
+          <p:cNvPr id="11" name="Straight Connector 10">
+            <a:extLst>
+              <a:ext uri="{FF2B5EF4-FFF2-40B4-BE49-F238E27FC236}">
+                <a16:creationId xmlns:a16="http://schemas.microsoft.com/office/drawing/2014/main" id="{1F5DC8C3-BA5F-4EED-BB9A-A14272BD82A1}"/>
+              </a:ext>
+              <a:ext uri="{C183D7F6-B498-43B3-948B-1728B52AA6E4}">
+                <adec:decorative xmlns:adec="http://schemas.microsoft.com/office/drawing/2017/decorative" val="1"/>
+              </a:ext>
+            </a:extLst>
+          </p:cNvPr>
+          <p:cNvCxnSpPr>
+            <a:cxnSpLocks noGrp="1" noRot="1" noChangeAspect="1" noMove="1" noResize="1" noEditPoints="1" noAdjustHandles="1" noChangeArrowheads="1" noChangeShapeType="1"/>
+          </p:cNvCxnSpPr>
+          <p:nvPr>
+            <p:extLst>
+              <p:ext uri="{386F3935-93C4-4BCD-93E2-E3B085C9AB24}">
+                <p16:designElem xmlns:p16="http://schemas.microsoft.com/office/powerpoint/2015/main" val="1"/>
+              </p:ext>
+            </p:extLst>
+          </p:nvPr>
+        </p:nvCxnSpPr>
+        <p:spPr>
+          <a:xfrm>
+            <a:off x="1207658" y="4474741"/>
+            <a:ext cx="9875520" cy="0"/>
+          </a:xfrm>
+          <a:prstGeom prst="line">
+            <a:avLst/>
+          </a:prstGeom>
+          <a:ln w="12700">
+            <a:solidFill>
+              <a:schemeClr val="tx1">
+                <a:lumMod val="75000"/>
+                <a:lumOff val="25000"/>
+              </a:schemeClr>
+            </a:solidFill>
+          </a:ln>
+        </p:spPr>
+        <p:style>
+          <a:lnRef idx="1">
+            <a:schemeClr val="accent1"/>
+          </a:lnRef>
+          <a:fillRef idx="0">
+            <a:schemeClr val="accent1"/>
+          </a:fillRef>
+          <a:effectRef idx="0">
+            <a:schemeClr val="accent1"/>
+          </a:effectRef>
+          <a:fontRef idx="minor">
+            <a:schemeClr val="tx1"/>
+          </a:fontRef>
+        </p:style>
+      </p:cxnSp>
+      <p:sp useBgFill="1">
+        <p:nvSpPr>
+          <p:cNvPr id="13" name="Rectangle 12">
+            <a:extLst>
+              <a:ext uri="{FF2B5EF4-FFF2-40B4-BE49-F238E27FC236}">
+                <a16:creationId xmlns:a16="http://schemas.microsoft.com/office/drawing/2014/main" id="{990BAFCD-EA0A-47F4-8B00-AAB1E67A90CC}"/>
+              </a:ext>
+              <a:ext uri="{C183D7F6-B498-43B3-948B-1728B52AA6E4}">
+                <adec:decorative xmlns:adec="http://schemas.microsoft.com/office/drawing/2017/decorative" val="1"/>
+              </a:ext>
+            </a:extLst>
+          </p:cNvPr>
+          <p:cNvSpPr>
+            <a:spLocks noGrp="1" noRot="1" noChangeAspect="1" noMove="1" noResize="1" noEditPoints="1" noAdjustHandles="1" noChangeArrowheads="1" noChangeShapeType="1" noTextEdit="1"/>
+          </p:cNvSpPr>
+          <p:nvPr>
+            <p:extLst>
+              <p:ext uri="{386F3935-93C4-4BCD-93E2-E3B085C9AB24}">
+                <p16:designElem xmlns:p16="http://schemas.microsoft.com/office/powerpoint/2015/main" val="1"/>
+              </p:ext>
+            </p:extLst>
+          </p:nvPr>
+        </p:nvSpPr>
+        <p:spPr>
+          <a:xfrm>
+            <a:off x="0" y="0"/>
+            <a:ext cx="12192001" cy="6858000"/>
+          </a:xfrm>
+          <a:prstGeom prst="rect">
+            <a:avLst/>
+          </a:prstGeom>
+          <a:ln>
+            <a:noFill/>
+          </a:ln>
+        </p:spPr>
+        <p:style>
+          <a:lnRef idx="2">
+            <a:schemeClr val="accent1">
+              <a:shade val="50000"/>
+            </a:schemeClr>
+          </a:lnRef>
+          <a:fillRef idx="1">
+            <a:schemeClr val="accent1"/>
+          </a:fillRef>
+          <a:effectRef idx="0">
+            <a:schemeClr val="accent1"/>
+          </a:effectRef>
+          <a:fontRef idx="minor">
+            <a:schemeClr val="lt1"/>
+          </a:fontRef>
+        </p:style>
+        <p:txBody>
+          <a:bodyPr rtlCol="0" anchor="ctr"/>
+          <a:lstStyle/>
+          <a:p>
+            <a:pPr algn="ctr"/>
+            <a:endParaRPr lang="en-US"/>
+          </a:p>
+        </p:txBody>
+      </p:sp>
+      <p:pic>
+        <p:nvPicPr>
+          <p:cNvPr id="4" name="Online Media 3" title="Bouncing ball">
+            <a:hlinkClick r:id="" action="ppaction://media"/>
+            <a:extLst>
+              <a:ext uri="{FF2B5EF4-FFF2-40B4-BE49-F238E27FC236}">
+                <a16:creationId xmlns:a16="http://schemas.microsoft.com/office/drawing/2014/main" id="{8E60426A-14EA-42C0-A149-D90DA4F2302F}"/>
+              </a:ext>
+            </a:extLst>
+          </p:cNvPr>
+          <p:cNvPicPr>
+            <a:picLocks noGrp="1" noRot="1" noChangeAspect="1"/>
+          </p:cNvPicPr>
+          <p:nvPr>
+            <p:ph idx="1"/>
+            <a:videoFile r:link="rId1"/>
+          </p:nvPr>
+        </p:nvPicPr>
+        <p:blipFill>
+          <a:blip r:embed="rId3"/>
+          <a:stretch>
+            <a:fillRect/>
+          </a:stretch>
+        </p:blipFill>
+        <p:spPr>
+          <a:xfrm>
+            <a:off x="2880029" y="643538"/>
+            <a:ext cx="6433041" cy="3618586"/>
+          </a:xfrm>
+          <a:prstGeom prst="rect">
+            <a:avLst/>
+          </a:prstGeom>
+        </p:spPr>
+      </p:pic>
+      <p:sp>
+        <p:nvSpPr>
+          <p:cNvPr id="15" name="Rectangle 14">
+            <a:extLst>
+              <a:ext uri="{FF2B5EF4-FFF2-40B4-BE49-F238E27FC236}">
+                <a16:creationId xmlns:a16="http://schemas.microsoft.com/office/drawing/2014/main" id="{2F9C61D6-37CC-4AD4-83C3-022D08874179}"/>
+              </a:ext>
+              <a:ext uri="{C183D7F6-B498-43B3-948B-1728B52AA6E4}">
+                <adec:decorative xmlns:adec="http://schemas.microsoft.com/office/drawing/2017/decorative" val="1"/>
+              </a:ext>
+            </a:extLst>
+          </p:cNvPr>
+          <p:cNvSpPr>
+            <a:spLocks noGrp="1" noRot="1" noChangeAspect="1" noMove="1" noResize="1" noEditPoints="1" noAdjustHandles="1" noChangeArrowheads="1" noChangeShapeType="1" noTextEdit="1"/>
+          </p:cNvSpPr>
+          <p:nvPr>
+            <p:extLst>
+              <p:ext uri="{386F3935-93C4-4BCD-93E2-E3B085C9AB24}">
+                <p16:designElem xmlns:p16="http://schemas.microsoft.com/office/powerpoint/2015/main" val="1"/>
+              </p:ext>
+            </p:extLst>
+          </p:nvPr>
+        </p:nvSpPr>
+        <p:spPr bwMode="white">
+          <a:xfrm>
+            <a:off x="0" y="4551037"/>
+            <a:ext cx="12192000" cy="2306963"/>
+          </a:xfrm>
+          <a:prstGeom prst="rect">
+            <a:avLst/>
+          </a:prstGeom>
+          <a:solidFill>
+            <a:srgbClr val="262626"/>
+          </a:solidFill>
+          <a:ln>
+            <a:noFill/>
+          </a:ln>
+        </p:spPr>
+        <p:style>
+          <a:lnRef idx="2">
+            <a:schemeClr val="accent1">
+              <a:shade val="50000"/>
+            </a:schemeClr>
+          </a:lnRef>
+          <a:fillRef idx="1">
+            <a:schemeClr val="accent1"/>
+          </a:fillRef>
+          <a:effectRef idx="0">
+            <a:schemeClr val="accent1"/>
+          </a:effectRef>
+          <a:fontRef idx="minor">
+            <a:schemeClr val="lt1"/>
+          </a:fontRef>
+        </p:style>
+      </p:sp>
+      <p:sp>
+        <p:nvSpPr>
+          <p:cNvPr id="2" name="Title 1">
+            <a:extLst>
+              <a:ext uri="{FF2B5EF4-FFF2-40B4-BE49-F238E27FC236}">
+                <a16:creationId xmlns:a16="http://schemas.microsoft.com/office/drawing/2014/main" id="{DD86ACE1-55D4-47C3-AD4C-2435B7525F00}"/>
+              </a:ext>
+            </a:extLst>
+          </p:cNvPr>
+          <p:cNvSpPr>
+            <a:spLocks noGrp="1"/>
+          </p:cNvSpPr>
+          <p:nvPr>
+            <p:ph type="title"/>
+          </p:nvPr>
+        </p:nvSpPr>
+        <p:spPr>
+          <a:xfrm>
+            <a:off x="632900" y="4905662"/>
+            <a:ext cx="7330353" cy="1541176"/>
+          </a:xfrm>
+        </p:spPr>
+        <p:txBody>
+          <a:bodyPr vert="horz" lIns="91440" tIns="45720" rIns="91440" bIns="45720" rtlCol="0" anchor="ctr">
+            <a:normAutofit/>
+          </a:bodyPr>
+          <a:lstStyle/>
+          <a:p>
+            <a:pPr algn="r"/>
+            <a:r>
+              <a:rPr lang="en-US" sz="4800">
+                <a:solidFill>
+                  <a:srgbClr val="FFFFFF"/>
+                </a:solidFill>
+              </a:rPr>
+              <a:t>Bouncing ball video</a:t>
+            </a:r>
+          </a:p>
+        </p:txBody>
+      </p:sp>
+      <p:cxnSp>
+        <p:nvCxnSpPr>
+          <p:cNvPr id="17" name="Straight Connector 16">
+            <a:extLst>
+              <a:ext uri="{FF2B5EF4-FFF2-40B4-BE49-F238E27FC236}">
+                <a16:creationId xmlns:a16="http://schemas.microsoft.com/office/drawing/2014/main" id="{2669285E-35F6-4010-B084-229A808458CD}"/>
+              </a:ext>
+              <a:ext uri="{C183D7F6-B498-43B3-948B-1728B52AA6E4}">
+                <adec:decorative xmlns:adec="http://schemas.microsoft.com/office/drawing/2017/decorative" val="1"/>
+              </a:ext>
+            </a:extLst>
+          </p:cNvPr>
+          <p:cNvCxnSpPr>
+            <a:cxnSpLocks noGrp="1" noRot="1" noChangeAspect="1" noMove="1" noResize="1" noEditPoints="1" noAdjustHandles="1" noChangeArrowheads="1" noChangeShapeType="1"/>
+          </p:cNvCxnSpPr>
+          <p:nvPr>
+            <p:extLst>
+              <p:ext uri="{386F3935-93C4-4BCD-93E2-E3B085C9AB24}">
+                <p16:designElem xmlns:p16="http://schemas.microsoft.com/office/powerpoint/2015/main" val="1"/>
+              </p:ext>
+            </p:extLst>
+          </p:nvPr>
+        </p:nvCxnSpPr>
+        <p:spPr>
+          <a:xfrm rot="16200000">
+            <a:off x="7532847" y="5676251"/>
+            <a:ext cx="1188720" cy="0"/>
+          </a:xfrm>
+          <a:prstGeom prst="line">
+            <a:avLst/>
+          </a:prstGeom>
+          <a:ln w="19050">
+            <a:solidFill>
+              <a:schemeClr val="accent1"/>
+            </a:solidFill>
+          </a:ln>
+        </p:spPr>
+        <p:style>
+          <a:lnRef idx="1">
+            <a:schemeClr val="accent1"/>
+          </a:lnRef>
+          <a:fillRef idx="0">
+            <a:schemeClr val="accent1"/>
+          </a:fillRef>
+          <a:effectRef idx="0">
+            <a:schemeClr val="accent1"/>
+          </a:effectRef>
+          <a:fontRef idx="minor">
+            <a:schemeClr val="tx1"/>
+          </a:fontRef>
+        </p:style>
+      </p:cxnSp>
+    </p:spTree>
+    <p:extLst>
+      <p:ext uri="{BB962C8B-B14F-4D97-AF65-F5344CB8AC3E}">
+        <p14:creationId xmlns:p14="http://schemas.microsoft.com/office/powerpoint/2010/main" val="798634937"/>
+      </p:ext>
+    </p:extLst>
+  </p:cSld>
+  <p:clrMapOvr>
+    <a:masterClrMapping/>
+  </p:clrMapOvr>
+  <p:timing>
+    <p:tnLst>
+      <p:par>
+        <p:cTn id="1" dur="indefinite" restart="never" nodeType="tmRoot">
+          <p:childTnLst>
+            <p:seq concurrent="1" nextAc="seek">
+              <p:cTn id="2" dur="indefinite" nodeType="mainSeq">
+                <p:childTnLst>
+                  <p:par>
+                    <p:cTn id="3" fill="hold">
+                      <p:stCondLst>
+                        <p:cond delay="indefinite"/>
+                      </p:stCondLst>
+                      <p:childTnLst>
+                        <p:par>
+                          <p:cTn id="4" fill="hold">
+                            <p:stCondLst>
+                              <p:cond delay="0"/>
+                            </p:stCondLst>
+                            <p:childTnLst>
+                              <p:par>
+                                <p:cTn id="5" presetID="1" presetClass="mediacall" presetSubtype="0" fill="hold" nodeType="clickEffect">
+                                  <p:stCondLst>
+                                    <p:cond delay="0"/>
+                                  </p:stCondLst>
+                                  <p:childTnLst>
+                                    <p:cmd type="call" cmd="playFrom(0.0)">
+                                      <p:cBhvr>
+                                        <p:cTn id="6" dur="1" fill="hold"/>
+                                        <p:tgtEl>
+                                          <p:spTgt spid="4"/>
+                                        </p:tgtEl>
+                                      </p:cBhvr>
+                                    </p:cmd>
+                                  </p:childTnLst>
+                                </p:cTn>
+                              </p:par>
+                            </p:childTnLst>
+                          </p:cTn>
+                        </p:par>
+                      </p:childTnLst>
+                    </p:cTn>
+                  </p:par>
+                </p:childTnLst>
+              </p:cTn>
+              <p:prevCondLst>
+                <p:cond evt="onPrev" delay="0">
+                  <p:tgtEl>
+                    <p:sldTgt/>
+                  </p:tgtEl>
+                </p:cond>
+              </p:prevCondLst>
+              <p:nextCondLst>
+                <p:cond evt="onNext" delay="0">
+                  <p:tgtEl>
+                    <p:sldTgt/>
+                  </p:tgtEl>
+                </p:cond>
+              </p:nextCondLst>
+            </p:seq>
+            <p:video>
+              <p:cMediaNode vol="80000">
+                <p:cTn id="7" fill="hold" display="0">
+                  <p:stCondLst>
+                    <p:cond delay="indefinite"/>
+                  </p:stCondLst>
+                </p:cTn>
+                <p:tgtEl>
+                  <p:spTgt spid="4"/>
+                </p:tgtEl>
+              </p:cMediaNode>
+            </p:video>
+            <p:seq concurrent="1" nextAc="seek">
+              <p:cTn id="8" restart="whenNotActive" fill="hold" evtFilter="cancelBubble" nodeType="interactiveSeq">
+                <p:stCondLst>
+                  <p:cond evt="onClick" delay="0">
+                    <p:tgtEl>
+                      <p:spTgt spid="4"/>
+                    </p:tgtEl>
+                  </p:cond>
+                </p:stCondLst>
+                <p:endSync evt="end" delay="0">
+                  <p:rtn val="all"/>
+                </p:endSync>
+                <p:childTnLst>
+                  <p:par>
+                    <p:cTn id="9" fill="hold">
+                      <p:stCondLst>
+                        <p:cond delay="0"/>
+                      </p:stCondLst>
+                      <p:childTnLst>
+                        <p:par>
+                          <p:cTn id="10" fill="hold">
+                            <p:stCondLst>
+                              <p:cond delay="0"/>
+                            </p:stCondLst>
+                            <p:childTnLst>
+                              <p:par>
+                                <p:cTn id="11" presetID="2" presetClass="mediacall" presetSubtype="0" fill="hold" nodeType="clickEffect">
+                                  <p:stCondLst>
+                                    <p:cond delay="0"/>
+                                  </p:stCondLst>
+                                  <p:childTnLst>
+                                    <p:cmd type="call" cmd="togglePause">
+                                      <p:cBhvr>
+                                        <p:cTn id="12" dur="1" fill="hold"/>
+                                        <p:tgtEl>
+                                          <p:spTgt spid="4"/>
+                                        </p:tgtEl>
+                                      </p:cBhvr>
+                                    </p:cmd>
+                                  </p:childTnLst>
+                                </p:cTn>
+                              </p:par>
+                            </p:childTnLst>
+                          </p:cTn>
+                        </p:par>
+                      </p:childTnLst>
+                    </p:cTn>
+                  </p:par>
+                </p:childTnLst>
+              </p:cTn>
+              <p:nextCondLst>
+                <p:cond evt="onClick" delay="0">
+                  <p:tgtEl>
+                    <p:spTgt spid="4"/>
+                  </p:tgtEl>
+                </p:cond>
+              </p:nextCondLst>
+            </p:seq>
+          </p:childTnLst>
+        </p:cTn>
+      </p:par>
+    </p:tnLst>
+  </p:timing>
+</p:sld>
+</file>
+
+<file path=ppt/slides/slide12.xml><?xml version="1.0" encoding="utf-8"?>
+<p:sld xmlns:a="http://schemas.openxmlformats.org/drawingml/2006/main" xmlns:r="http://schemas.openxmlformats.org/officeDocument/2006/relationships" xmlns:p="http://schemas.openxmlformats.org/presentationml/2006/main">
+  <p:cSld>
+    <p:spTree>
+      <p:nvGrpSpPr>
+        <p:cNvPr id="1" name=""/>
+        <p:cNvGrpSpPr/>
+        <p:nvPr/>
+      </p:nvGrpSpPr>
+      <p:grpSpPr>
+        <a:xfrm>
+          <a:off x="0" y="0"/>
+          <a:ext cx="0" cy="0"/>
+          <a:chOff x="0" y="0"/>
+          <a:chExt cx="0" cy="0"/>
+        </a:xfrm>
+      </p:grpSpPr>
+      <p:sp>
+        <p:nvSpPr>
           <p:cNvPr id="2" name="Title 1">
             <a:extLst>
               <a:ext uri="{FF2B5EF4-FFF2-40B4-BE49-F238E27FC236}">
@@ -7895,8 +8420,8 @@
           </a:p>
         </p:txBody>
       </p:sp>
-      <mc:AlternateContent xmlns:mc="http://schemas.openxmlformats.org/markup-compatibility/2006">
-        <mc:Choice xmlns:a14="http://schemas.microsoft.com/office/drawing/2010/main" Requires="a14">
+      <mc:AlternateContent xmlns:mc="http://schemas.openxmlformats.org/markup-compatibility/2006" xmlns:a14="http://schemas.microsoft.com/office/drawing/2010/main">
+        <mc:Choice Requires="a14">
           <p:sp>
             <p:nvSpPr>
               <p:cNvPr id="3" name="Content Placeholder 2">
@@ -8911,7 +9436,7 @@
             </p:txBody>
           </p:sp>
         </mc:Choice>
-        <mc:Fallback>
+        <mc:Fallback xmlns="">
           <p:sp>
             <p:nvSpPr>
               <p:cNvPr id="3" name="Content Placeholder 2">
@@ -8964,95 +9489,6 @@
 </p:sld>
 </file>
 
-<file path=ppt/slides/slide12.xml><?xml version="1.0" encoding="utf-8"?>
-<p:sld xmlns:a="http://schemas.openxmlformats.org/drawingml/2006/main" xmlns:r="http://schemas.openxmlformats.org/officeDocument/2006/relationships" xmlns:p="http://schemas.openxmlformats.org/presentationml/2006/main">
-  <p:cSld>
-    <p:spTree>
-      <p:nvGrpSpPr>
-        <p:cNvPr id="1" name=""/>
-        <p:cNvGrpSpPr/>
-        <p:nvPr/>
-      </p:nvGrpSpPr>
-      <p:grpSpPr>
-        <a:xfrm>
-          <a:off x="0" y="0"/>
-          <a:ext cx="0" cy="0"/>
-          <a:chOff x="0" y="0"/>
-          <a:chExt cx="0" cy="0"/>
-        </a:xfrm>
-      </p:grpSpPr>
-      <p:sp>
-        <p:nvSpPr>
-          <p:cNvPr id="2" name="Title 1">
-            <a:extLst>
-              <a:ext uri="{FF2B5EF4-FFF2-40B4-BE49-F238E27FC236}">
-                <a16:creationId xmlns:a16="http://schemas.microsoft.com/office/drawing/2014/main" id="{ECC9EA66-DA16-8F4D-85C8-7C1A8AA5E8C0}"/>
-              </a:ext>
-            </a:extLst>
-          </p:cNvPr>
-          <p:cNvSpPr>
-            <a:spLocks noGrp="1"/>
-          </p:cNvSpPr>
-          <p:nvPr>
-            <p:ph type="title"/>
-          </p:nvPr>
-        </p:nvSpPr>
-        <p:spPr/>
-        <p:txBody>
-          <a:bodyPr/>
-          <a:lstStyle/>
-          <a:p>
-            <a:r>
-              <a:rPr lang="en-US" dirty="0"/>
-              <a:t>Precision experiment</a:t>
-            </a:r>
-          </a:p>
-        </p:txBody>
-      </p:sp>
-      <p:graphicFrame>
-        <p:nvGraphicFramePr>
-          <p:cNvPr id="10" name="Content Placeholder 9">
-            <a:extLst>
-              <a:ext uri="{FF2B5EF4-FFF2-40B4-BE49-F238E27FC236}">
-                <a16:creationId xmlns:a16="http://schemas.microsoft.com/office/drawing/2014/main" id="{3AEE1C2D-5E0D-4DC5-AAC3-615B534E0A83}"/>
-              </a:ext>
-            </a:extLst>
-          </p:cNvPr>
-          <p:cNvGraphicFramePr>
-            <a:graphicFrameLocks noGrp="1"/>
-          </p:cNvGraphicFramePr>
-          <p:nvPr>
-            <p:ph idx="1"/>
-            <p:extLst>
-              <p:ext uri="{D42A27DB-BD31-4B8C-83A1-F6EECF244321}">
-                <p14:modId xmlns:p14="http://schemas.microsoft.com/office/powerpoint/2010/main" val="3157494902"/>
-              </p:ext>
-            </p:extLst>
-          </p:nvPr>
-        </p:nvGraphicFramePr>
-        <p:xfrm>
-          <a:off x="1096963" y="2108200"/>
-          <a:ext cx="10058400" cy="3760788"/>
-        </p:xfrm>
-        <a:graphic>
-          <a:graphicData uri="http://schemas.openxmlformats.org/drawingml/2006/chart">
-            <c:chart xmlns:c="http://schemas.openxmlformats.org/drawingml/2006/chart" xmlns:r="http://schemas.openxmlformats.org/officeDocument/2006/relationships" r:id="rId3"/>
-          </a:graphicData>
-        </a:graphic>
-      </p:graphicFrame>
-    </p:spTree>
-    <p:extLst>
-      <p:ext uri="{BB962C8B-B14F-4D97-AF65-F5344CB8AC3E}">
-        <p14:creationId xmlns:p14="http://schemas.microsoft.com/office/powerpoint/2010/main" val="233089366"/>
-      </p:ext>
-    </p:extLst>
-  </p:cSld>
-  <p:clrMapOvr>
-    <a:masterClrMapping/>
-  </p:clrMapOvr>
-</p:sld>
-</file>
-
 <file path=ppt/slides/slide13.xml><?xml version="1.0" encoding="utf-8"?>
 <p:sld xmlns:a="http://schemas.openxmlformats.org/drawingml/2006/main" xmlns:r="http://schemas.openxmlformats.org/officeDocument/2006/relationships" xmlns:p="http://schemas.openxmlformats.org/presentationml/2006/main">
   <p:cSld>
@@ -9093,17 +9529,17 @@
           <a:p>
             <a:r>
               <a:rPr lang="en-US" dirty="0"/>
-              <a:t>Speed experiment</a:t>
+              <a:t>Precision experiment</a:t>
             </a:r>
           </a:p>
         </p:txBody>
       </p:sp>
       <p:graphicFrame>
         <p:nvGraphicFramePr>
-          <p:cNvPr id="6" name="Content Placeholder 5">
+          <p:cNvPr id="10" name="Content Placeholder 9">
             <a:extLst>
               <a:ext uri="{FF2B5EF4-FFF2-40B4-BE49-F238E27FC236}">
-                <a16:creationId xmlns:a16="http://schemas.microsoft.com/office/drawing/2014/main" id="{12FFDC9B-A7DC-4EAD-85ED-D1DC46C73A1C}"/>
+                <a16:creationId xmlns:a16="http://schemas.microsoft.com/office/drawing/2014/main" id="{3AEE1C2D-5E0D-4DC5-AAC3-615B534E0A83}"/>
               </a:ext>
             </a:extLst>
           </p:cNvPr>
@@ -9114,7 +9550,7 @@
             <p:ph idx="1"/>
             <p:extLst>
               <p:ext uri="{D42A27DB-BD31-4B8C-83A1-F6EECF244321}">
-                <p14:modId xmlns:p14="http://schemas.microsoft.com/office/powerpoint/2010/main" val="438617812"/>
+                <p14:modId xmlns:p14="http://schemas.microsoft.com/office/powerpoint/2010/main" val="3157494902"/>
               </p:ext>
             </p:extLst>
           </p:nvPr>
@@ -9132,7 +9568,7 @@
     </p:spTree>
     <p:extLst>
       <p:ext uri="{BB962C8B-B14F-4D97-AF65-F5344CB8AC3E}">
-        <p14:creationId xmlns:p14="http://schemas.microsoft.com/office/powerpoint/2010/main" val="2360495450"/>
+        <p14:creationId xmlns:p14="http://schemas.microsoft.com/office/powerpoint/2010/main" val="233089366"/>
       </p:ext>
     </p:extLst>
   </p:cSld>
@@ -9164,6 +9600,95 @@
           <p:cNvPr id="2" name="Title 1">
             <a:extLst>
               <a:ext uri="{FF2B5EF4-FFF2-40B4-BE49-F238E27FC236}">
+                <a16:creationId xmlns:a16="http://schemas.microsoft.com/office/drawing/2014/main" id="{ECC9EA66-DA16-8F4D-85C8-7C1A8AA5E8C0}"/>
+              </a:ext>
+            </a:extLst>
+          </p:cNvPr>
+          <p:cNvSpPr>
+            <a:spLocks noGrp="1"/>
+          </p:cNvSpPr>
+          <p:nvPr>
+            <p:ph type="title"/>
+          </p:nvPr>
+        </p:nvSpPr>
+        <p:spPr/>
+        <p:txBody>
+          <a:bodyPr/>
+          <a:lstStyle/>
+          <a:p>
+            <a:r>
+              <a:rPr lang="en-US" dirty="0"/>
+              <a:t>Speed experiment</a:t>
+            </a:r>
+          </a:p>
+        </p:txBody>
+      </p:sp>
+      <p:graphicFrame>
+        <p:nvGraphicFramePr>
+          <p:cNvPr id="6" name="Content Placeholder 5">
+            <a:extLst>
+              <a:ext uri="{FF2B5EF4-FFF2-40B4-BE49-F238E27FC236}">
+                <a16:creationId xmlns:a16="http://schemas.microsoft.com/office/drawing/2014/main" id="{12FFDC9B-A7DC-4EAD-85ED-D1DC46C73A1C}"/>
+              </a:ext>
+            </a:extLst>
+          </p:cNvPr>
+          <p:cNvGraphicFramePr>
+            <a:graphicFrameLocks noGrp="1"/>
+          </p:cNvGraphicFramePr>
+          <p:nvPr>
+            <p:ph idx="1"/>
+            <p:extLst>
+              <p:ext uri="{D42A27DB-BD31-4B8C-83A1-F6EECF244321}">
+                <p14:modId xmlns:p14="http://schemas.microsoft.com/office/powerpoint/2010/main" val="438617812"/>
+              </p:ext>
+            </p:extLst>
+          </p:nvPr>
+        </p:nvGraphicFramePr>
+        <p:xfrm>
+          <a:off x="1096963" y="2108200"/>
+          <a:ext cx="10058400" cy="3760788"/>
+        </p:xfrm>
+        <a:graphic>
+          <a:graphicData uri="http://schemas.openxmlformats.org/drawingml/2006/chart">
+            <c:chart xmlns:c="http://schemas.openxmlformats.org/drawingml/2006/chart" xmlns:r="http://schemas.openxmlformats.org/officeDocument/2006/relationships" r:id="rId3"/>
+          </a:graphicData>
+        </a:graphic>
+      </p:graphicFrame>
+    </p:spTree>
+    <p:extLst>
+      <p:ext uri="{BB962C8B-B14F-4D97-AF65-F5344CB8AC3E}">
+        <p14:creationId xmlns:p14="http://schemas.microsoft.com/office/powerpoint/2010/main" val="2360495450"/>
+      </p:ext>
+    </p:extLst>
+  </p:cSld>
+  <p:clrMapOvr>
+    <a:masterClrMapping/>
+  </p:clrMapOvr>
+</p:sld>
+</file>
+
+<file path=ppt/slides/slide15.xml><?xml version="1.0" encoding="utf-8"?>
+<p:sld xmlns:a="http://schemas.openxmlformats.org/drawingml/2006/main" xmlns:r="http://schemas.openxmlformats.org/officeDocument/2006/relationships" xmlns:p="http://schemas.openxmlformats.org/presentationml/2006/main">
+  <p:cSld>
+    <p:spTree>
+      <p:nvGrpSpPr>
+        <p:cNvPr id="1" name=""/>
+        <p:cNvGrpSpPr/>
+        <p:nvPr/>
+      </p:nvGrpSpPr>
+      <p:grpSpPr>
+        <a:xfrm>
+          <a:off x="0" y="0"/>
+          <a:ext cx="0" cy="0"/>
+          <a:chOff x="0" y="0"/>
+          <a:chExt cx="0" cy="0"/>
+        </a:xfrm>
+      </p:grpSpPr>
+      <p:sp>
+        <p:nvSpPr>
+          <p:cNvPr id="2" name="Title 1">
+            <a:extLst>
+              <a:ext uri="{FF2B5EF4-FFF2-40B4-BE49-F238E27FC236}">
                 <a16:creationId xmlns:a16="http://schemas.microsoft.com/office/drawing/2014/main" id="{4CEE2087-2294-43E9-95E7-87FCAA28D723}"/>
               </a:ext>
             </a:extLst>
@@ -9244,7 +9769,7 @@
 </p:sld>
 </file>
 
-<file path=ppt/slides/slide15.xml><?xml version="1.0" encoding="utf-8"?>
+<file path=ppt/slides/slide16.xml><?xml version="1.0" encoding="utf-8"?>
 <p:sld xmlns:a="http://schemas.openxmlformats.org/drawingml/2006/main" xmlns:r="http://schemas.openxmlformats.org/officeDocument/2006/relationships" xmlns:p="http://schemas.openxmlformats.org/presentationml/2006/main">
   <p:cSld>
     <p:bg>
@@ -9606,7 +10131,7 @@
 </p:sld>
 </file>
 
-<file path=ppt/slides/slide16.xml><?xml version="1.0" encoding="utf-8"?>
+<file path=ppt/slides/slide17.xml><?xml version="1.0" encoding="utf-8"?>
 <p:sld xmlns:a="http://schemas.openxmlformats.org/drawingml/2006/main" xmlns:r="http://schemas.openxmlformats.org/officeDocument/2006/relationships" xmlns:p="http://schemas.openxmlformats.org/presentationml/2006/main">
   <p:cSld>
     <p:bg>
@@ -10098,90 +10623,6 @@
 </p:sld>
 </file>
 
-<file path=ppt/slides/slide17.xml><?xml version="1.0" encoding="utf-8"?>
-<p:sld xmlns:a="http://schemas.openxmlformats.org/drawingml/2006/main" xmlns:r="http://schemas.openxmlformats.org/officeDocument/2006/relationships" xmlns:p="http://schemas.openxmlformats.org/presentationml/2006/main">
-  <p:cSld>
-    <p:spTree>
-      <p:nvGrpSpPr>
-        <p:cNvPr id="1" name=""/>
-        <p:cNvGrpSpPr/>
-        <p:nvPr/>
-      </p:nvGrpSpPr>
-      <p:grpSpPr>
-        <a:xfrm>
-          <a:off x="0" y="0"/>
-          <a:ext cx="0" cy="0"/>
-          <a:chOff x="0" y="0"/>
-          <a:chExt cx="0" cy="0"/>
-        </a:xfrm>
-      </p:grpSpPr>
-      <p:sp>
-        <p:nvSpPr>
-          <p:cNvPr id="2" name="Title 1">
-            <a:extLst>
-              <a:ext uri="{FF2B5EF4-FFF2-40B4-BE49-F238E27FC236}">
-                <a16:creationId xmlns:a16="http://schemas.microsoft.com/office/drawing/2014/main" id="{6A017E4A-2ABC-4269-A259-9DB5FCFA878A}"/>
-              </a:ext>
-            </a:extLst>
-          </p:cNvPr>
-          <p:cNvSpPr>
-            <a:spLocks noGrp="1"/>
-          </p:cNvSpPr>
-          <p:nvPr>
-            <p:ph type="title"/>
-          </p:nvPr>
-        </p:nvSpPr>
-        <p:spPr/>
-        <p:txBody>
-          <a:bodyPr/>
-          <a:lstStyle/>
-          <a:p>
-            <a:r>
-              <a:rPr lang="en-US" dirty="0"/>
-              <a:t>A* Bot</a:t>
-            </a:r>
-            <a:endParaRPr lang="nl-NL" dirty="0"/>
-          </a:p>
-        </p:txBody>
-      </p:sp>
-      <p:sp>
-        <p:nvSpPr>
-          <p:cNvPr id="3" name="Content Placeholder 2">
-            <a:extLst>
-              <a:ext uri="{FF2B5EF4-FFF2-40B4-BE49-F238E27FC236}">
-                <a16:creationId xmlns:a16="http://schemas.microsoft.com/office/drawing/2014/main" id="{6FB12979-3BAA-4143-9ED9-BBBD2B8C1F83}"/>
-              </a:ext>
-            </a:extLst>
-          </p:cNvPr>
-          <p:cNvSpPr>
-            <a:spLocks noGrp="1"/>
-          </p:cNvSpPr>
-          <p:nvPr>
-            <p:ph idx="1"/>
-          </p:nvPr>
-        </p:nvSpPr>
-        <p:spPr/>
-        <p:txBody>
-          <a:bodyPr/>
-          <a:lstStyle/>
-          <a:p>
-            <a:endParaRPr lang="nl-NL"/>
-          </a:p>
-        </p:txBody>
-      </p:sp>
-    </p:spTree>
-    <p:extLst>
-      <p:ext uri="{BB962C8B-B14F-4D97-AF65-F5344CB8AC3E}">
-        <p14:creationId xmlns:p14="http://schemas.microsoft.com/office/powerpoint/2010/main" val="1199054610"/>
-      </p:ext>
-    </p:extLst>
-  </p:cSld>
-  <p:clrMapOvr>
-    <a:masterClrMapping/>
-  </p:clrMapOvr>
-</p:sld>
-</file>
-
 <file path=ppt/slides/slide18.xml><?xml version="1.0" encoding="utf-8"?>
 <p:sld xmlns:a="http://schemas.openxmlformats.org/drawingml/2006/main" xmlns:r="http://schemas.openxmlformats.org/officeDocument/2006/relationships" xmlns:p="http://schemas.openxmlformats.org/presentationml/2006/main">
   <p:cSld>
@@ -10204,7 +10645,7 @@
           <p:cNvPr id="2" name="Title 1">
             <a:extLst>
               <a:ext uri="{FF2B5EF4-FFF2-40B4-BE49-F238E27FC236}">
-                <a16:creationId xmlns:a16="http://schemas.microsoft.com/office/drawing/2014/main" id="{29F19A6B-CDB2-8D48-97AF-EC9F49EA2578}"/>
+                <a16:creationId xmlns:a16="http://schemas.microsoft.com/office/drawing/2014/main" id="{6A017E4A-2ABC-4269-A259-9DB5FCFA878A}"/>
               </a:ext>
             </a:extLst>
           </p:cNvPr>
@@ -10222,8 +10663,9 @@
           <a:p>
             <a:r>
               <a:rPr lang="en-US" dirty="0"/>
-              <a:t>Experiment</a:t>
-            </a:r>
+              <a:t>A* Bot</a:t>
+            </a:r>
+            <a:endParaRPr lang="nl-NL" dirty="0"/>
           </a:p>
         </p:txBody>
       </p:sp>
@@ -10232,7 +10674,7 @@
           <p:cNvPr id="3" name="Content Placeholder 2">
             <a:extLst>
               <a:ext uri="{FF2B5EF4-FFF2-40B4-BE49-F238E27FC236}">
-                <a16:creationId xmlns:a16="http://schemas.microsoft.com/office/drawing/2014/main" id="{B33325E4-832A-D040-B461-E6D8A517BFF9}"/>
+                <a16:creationId xmlns:a16="http://schemas.microsoft.com/office/drawing/2014/main" id="{6FB12979-3BAA-4143-9ED9-BBBD2B8C1F83}"/>
               </a:ext>
             </a:extLst>
           </p:cNvPr>
@@ -10248,14 +10690,14 @@
           <a:bodyPr/>
           <a:lstStyle/>
           <a:p>
-            <a:endParaRPr lang="en-US" dirty="0"/>
+            <a:endParaRPr lang="nl-NL"/>
           </a:p>
         </p:txBody>
       </p:sp>
     </p:spTree>
     <p:extLst>
       <p:ext uri="{BB962C8B-B14F-4D97-AF65-F5344CB8AC3E}">
-        <p14:creationId xmlns:p14="http://schemas.microsoft.com/office/powerpoint/2010/main" val="3107714555"/>
+        <p14:creationId xmlns:p14="http://schemas.microsoft.com/office/powerpoint/2010/main" val="1199054610"/>
       </p:ext>
     </p:extLst>
   </p:cSld>
@@ -10287,7 +10729,7 @@
           <p:cNvPr id="2" name="Title 1">
             <a:extLst>
               <a:ext uri="{FF2B5EF4-FFF2-40B4-BE49-F238E27FC236}">
-                <a16:creationId xmlns:a16="http://schemas.microsoft.com/office/drawing/2014/main" id="{AE509FE0-01FE-484D-9253-00E27C5034A6}"/>
+                <a16:creationId xmlns:a16="http://schemas.microsoft.com/office/drawing/2014/main" id="{29F19A6B-CDB2-8D48-97AF-EC9F49EA2578}"/>
               </a:ext>
             </a:extLst>
           </p:cNvPr>
@@ -10305,7 +10747,7 @@
           <a:p>
             <a:r>
               <a:rPr lang="en-US" dirty="0"/>
-              <a:t>Conclusion</a:t>
+              <a:t>Experiment</a:t>
             </a:r>
           </a:p>
         </p:txBody>
@@ -10315,7 +10757,7 @@
           <p:cNvPr id="3" name="Content Placeholder 2">
             <a:extLst>
               <a:ext uri="{FF2B5EF4-FFF2-40B4-BE49-F238E27FC236}">
-                <a16:creationId xmlns:a16="http://schemas.microsoft.com/office/drawing/2014/main" id="{89B654AC-0CDE-8E40-85E6-B44275F7D14F}"/>
+                <a16:creationId xmlns:a16="http://schemas.microsoft.com/office/drawing/2014/main" id="{B33325E4-832A-D040-B461-E6D8A517BFF9}"/>
               </a:ext>
             </a:extLst>
           </p:cNvPr>
@@ -10331,61 +10773,14 @@
           <a:bodyPr/>
           <a:lstStyle/>
           <a:p>
-            <a:pPr>
-              <a:buFont typeface="Wingdings" panose="05000000000000000000" pitchFamily="2" charset="2"/>
-              <a:buChar char="v"/>
-            </a:pPr>
-            <a:r>
-              <a:rPr lang="en-US" dirty="0"/>
-              <a:t> Graphics engine</a:t>
-            </a:r>
-          </a:p>
-          <a:p>
-            <a:pPr>
-              <a:buFont typeface="Wingdings" panose="05000000000000000000" pitchFamily="2" charset="2"/>
-              <a:buChar char="v"/>
-            </a:pPr>
-            <a:r>
-              <a:rPr lang="en-US" dirty="0"/>
-              <a:t> Collision detection</a:t>
-            </a:r>
-          </a:p>
-          <a:p>
-            <a:pPr>
-              <a:buFont typeface="Wingdings" panose="05000000000000000000" pitchFamily="2" charset="2"/>
-              <a:buChar char="v"/>
-            </a:pPr>
-            <a:r>
-              <a:rPr lang="en-US" dirty="0"/>
-              <a:t> Physics solvers</a:t>
-            </a:r>
-          </a:p>
-          <a:p>
-            <a:pPr>
-              <a:buFont typeface="Wingdings" panose="05000000000000000000" pitchFamily="2" charset="2"/>
-              <a:buChar char="v"/>
-            </a:pPr>
-            <a:r>
-              <a:rPr lang="en-US" dirty="0"/>
-              <a:t> Flying and bouncing balls</a:t>
-            </a:r>
-          </a:p>
-          <a:p>
-            <a:pPr>
-              <a:buFont typeface="Wingdings" panose="05000000000000000000" pitchFamily="2" charset="2"/>
-              <a:buChar char="v"/>
-            </a:pPr>
-            <a:r>
-              <a:rPr lang="en-US" dirty="0"/>
-              <a:t> AI</a:t>
-            </a:r>
+            <a:endParaRPr lang="en-US" dirty="0"/>
           </a:p>
         </p:txBody>
       </p:sp>
     </p:spTree>
     <p:extLst>
       <p:ext uri="{BB962C8B-B14F-4D97-AF65-F5344CB8AC3E}">
-        <p14:creationId xmlns:p14="http://schemas.microsoft.com/office/powerpoint/2010/main" val="2578131005"/>
+        <p14:creationId xmlns:p14="http://schemas.microsoft.com/office/powerpoint/2010/main" val="3107714555"/>
       </p:ext>
     </p:extLst>
   </p:cSld>
@@ -10551,6 +10946,136 @@
           <p:cNvPr id="2" name="Title 1">
             <a:extLst>
               <a:ext uri="{FF2B5EF4-FFF2-40B4-BE49-F238E27FC236}">
+                <a16:creationId xmlns:a16="http://schemas.microsoft.com/office/drawing/2014/main" id="{AE509FE0-01FE-484D-9253-00E27C5034A6}"/>
+              </a:ext>
+            </a:extLst>
+          </p:cNvPr>
+          <p:cNvSpPr>
+            <a:spLocks noGrp="1"/>
+          </p:cNvSpPr>
+          <p:nvPr>
+            <p:ph type="title"/>
+          </p:nvPr>
+        </p:nvSpPr>
+        <p:spPr/>
+        <p:txBody>
+          <a:bodyPr/>
+          <a:lstStyle/>
+          <a:p>
+            <a:r>
+              <a:rPr lang="en-US" dirty="0"/>
+              <a:t>Conclusion</a:t>
+            </a:r>
+          </a:p>
+        </p:txBody>
+      </p:sp>
+      <p:sp>
+        <p:nvSpPr>
+          <p:cNvPr id="3" name="Content Placeholder 2">
+            <a:extLst>
+              <a:ext uri="{FF2B5EF4-FFF2-40B4-BE49-F238E27FC236}">
+                <a16:creationId xmlns:a16="http://schemas.microsoft.com/office/drawing/2014/main" id="{89B654AC-0CDE-8E40-85E6-B44275F7D14F}"/>
+              </a:ext>
+            </a:extLst>
+          </p:cNvPr>
+          <p:cNvSpPr>
+            <a:spLocks noGrp="1"/>
+          </p:cNvSpPr>
+          <p:nvPr>
+            <p:ph idx="1"/>
+          </p:nvPr>
+        </p:nvSpPr>
+        <p:spPr/>
+        <p:txBody>
+          <a:bodyPr/>
+          <a:lstStyle/>
+          <a:p>
+            <a:pPr>
+              <a:buFont typeface="Wingdings" panose="05000000000000000000" pitchFamily="2" charset="2"/>
+              <a:buChar char="v"/>
+            </a:pPr>
+            <a:r>
+              <a:rPr lang="en-US" dirty="0"/>
+              <a:t> Graphics engine</a:t>
+            </a:r>
+          </a:p>
+          <a:p>
+            <a:pPr>
+              <a:buFont typeface="Wingdings" panose="05000000000000000000" pitchFamily="2" charset="2"/>
+              <a:buChar char="v"/>
+            </a:pPr>
+            <a:r>
+              <a:rPr lang="en-US" dirty="0"/>
+              <a:t> Collision detection</a:t>
+            </a:r>
+          </a:p>
+          <a:p>
+            <a:pPr>
+              <a:buFont typeface="Wingdings" panose="05000000000000000000" pitchFamily="2" charset="2"/>
+              <a:buChar char="v"/>
+            </a:pPr>
+            <a:r>
+              <a:rPr lang="en-US" dirty="0"/>
+              <a:t> Physics solvers</a:t>
+            </a:r>
+          </a:p>
+          <a:p>
+            <a:pPr>
+              <a:buFont typeface="Wingdings" panose="05000000000000000000" pitchFamily="2" charset="2"/>
+              <a:buChar char="v"/>
+            </a:pPr>
+            <a:r>
+              <a:rPr lang="en-US" dirty="0"/>
+              <a:t> Flying and bouncing balls</a:t>
+            </a:r>
+          </a:p>
+          <a:p>
+            <a:pPr>
+              <a:buFont typeface="Wingdings" panose="05000000000000000000" pitchFamily="2" charset="2"/>
+              <a:buChar char="v"/>
+            </a:pPr>
+            <a:r>
+              <a:rPr lang="en-US" dirty="0"/>
+              <a:t> AI</a:t>
+            </a:r>
+          </a:p>
+        </p:txBody>
+      </p:sp>
+    </p:spTree>
+    <p:extLst>
+      <p:ext uri="{BB962C8B-B14F-4D97-AF65-F5344CB8AC3E}">
+        <p14:creationId xmlns:p14="http://schemas.microsoft.com/office/powerpoint/2010/main" val="2578131005"/>
+      </p:ext>
+    </p:extLst>
+  </p:cSld>
+  <p:clrMapOvr>
+    <a:masterClrMapping/>
+  </p:clrMapOvr>
+</p:sld>
+</file>
+
+<file path=ppt/slides/slide21.xml><?xml version="1.0" encoding="utf-8"?>
+<p:sld xmlns:a="http://schemas.openxmlformats.org/drawingml/2006/main" xmlns:r="http://schemas.openxmlformats.org/officeDocument/2006/relationships" xmlns:p="http://schemas.openxmlformats.org/presentationml/2006/main">
+  <p:cSld>
+    <p:spTree>
+      <p:nvGrpSpPr>
+        <p:cNvPr id="1" name=""/>
+        <p:cNvGrpSpPr/>
+        <p:nvPr/>
+      </p:nvGrpSpPr>
+      <p:grpSpPr>
+        <a:xfrm>
+          <a:off x="0" y="0"/>
+          <a:ext cx="0" cy="0"/>
+          <a:chOff x="0" y="0"/>
+          <a:chExt cx="0" cy="0"/>
+        </a:xfrm>
+      </p:grpSpPr>
+      <p:sp>
+        <p:nvSpPr>
+          <p:cNvPr id="2" name="Title 1">
+            <a:extLst>
+              <a:ext uri="{FF2B5EF4-FFF2-40B4-BE49-F238E27FC236}">
                 <a16:creationId xmlns:a16="http://schemas.microsoft.com/office/drawing/2014/main" id="{829E259F-FE68-4055-B7BD-1312721101B5}"/>
               </a:ext>
             </a:extLst>
@@ -10613,7 +11138,7 @@
 </p:sld>
 </file>
 
-<file path=ppt/slides/slide21.xml><?xml version="1.0" encoding="utf-8"?>
+<file path=ppt/slides/slide22.xml><?xml version="1.0" encoding="utf-8"?>
 <p:sld xmlns:a="http://schemas.openxmlformats.org/drawingml/2006/main" xmlns:r="http://schemas.openxmlformats.org/officeDocument/2006/relationships" xmlns:p="http://schemas.openxmlformats.org/presentationml/2006/main">
   <p:cSld>
     <p:spTree>
@@ -15400,21 +15925,21 @@
 </file>
 
 <file path=customXml/item1.xml><?xml version="1.0" encoding="utf-8"?>
+<?mso-contentType ?>
+<FormTemplates xmlns="http://schemas.microsoft.com/sharepoint/v3/contenttype/forms">
+  <Display>DocumentLibraryForm</Display>
+  <Edit>DocumentLibraryForm</Edit>
+  <New>DocumentLibraryForm</New>
+</FormTemplates>
+</file>
+
+<file path=customXml/item2.xml><?xml version="1.0" encoding="utf-8"?>
 <p:properties xmlns:p="http://schemas.microsoft.com/office/2006/metadata/properties" xmlns:xsi="http://www.w3.org/2001/XMLSchema-instance" xmlns:pc="http://schemas.microsoft.com/office/infopath/2007/PartnerControls">
   <documentManagement>
     <Status xmlns="71af3243-3dd4-4a8d-8c0d-dd76da1f02a5">Not started</Status>
     <MediaServiceKeyPoints xmlns="71af3243-3dd4-4a8d-8c0d-dd76da1f02a5" xsi:nil="true"/>
   </documentManagement>
 </p:properties>
-</file>
-
-<file path=customXml/item2.xml><?xml version="1.0" encoding="utf-8"?>
-<?mso-contentType ?>
-<FormTemplates xmlns="http://schemas.microsoft.com/sharepoint/v3/contenttype/forms">
-  <Display>DocumentLibraryForm</Display>
-  <Edit>DocumentLibraryForm</Edit>
-  <New>DocumentLibraryForm</New>
-</FormTemplates>
 </file>
 
 <file path=customXml/item3.xml><?xml version="1.0" encoding="utf-8"?>
@@ -15639,19 +16164,19 @@
 </file>
 
 <file path=customXml/itemProps1.xml><?xml version="1.0" encoding="utf-8"?>
+<ds:datastoreItem xmlns:ds="http://schemas.openxmlformats.org/officeDocument/2006/customXml" ds:itemID="{3C586965-D4BF-4605-8C1C-5B8CCCAB7737}">
+  <ds:schemaRefs>
+    <ds:schemaRef ds:uri="http://schemas.microsoft.com/sharepoint/v3/contenttype/forms"/>
+  </ds:schemaRefs>
+</ds:datastoreItem>
+</file>
+
+<file path=customXml/itemProps2.xml><?xml version="1.0" encoding="utf-8"?>
 <ds:datastoreItem xmlns:ds="http://schemas.openxmlformats.org/officeDocument/2006/customXml" ds:itemID="{626E351D-C19B-467F-A5C7-085C4CECACA9}">
   <ds:schemaRefs>
     <ds:schemaRef ds:uri="http://schemas.microsoft.com/office/2006/metadata/properties"/>
     <ds:schemaRef ds:uri="http://schemas.microsoft.com/office/infopath/2007/PartnerControls"/>
     <ds:schemaRef ds:uri="71af3243-3dd4-4a8d-8c0d-dd76da1f02a5"/>
-  </ds:schemaRefs>
-</ds:datastoreItem>
-</file>
-
-<file path=customXml/itemProps2.xml><?xml version="1.0" encoding="utf-8"?>
-<ds:datastoreItem xmlns:ds="http://schemas.openxmlformats.org/officeDocument/2006/customXml" ds:itemID="{3C586965-D4BF-4605-8C1C-5B8CCCAB7737}">
-  <ds:schemaRefs>
-    <ds:schemaRef ds:uri="http://schemas.microsoft.com/sharepoint/v3/contenttype/forms"/>
   </ds:schemaRefs>
 </ds:datastoreItem>
 </file>

</xml_diff>